<commit_message>
Update Notes; Translation Presentation
</commit_message>
<xml_diff>
--- a/OpenMP_Folien.pptx
+++ b/OpenMP_Folien.pptx
@@ -5,7 +5,7 @@
     <p:sldMasterId id="2147483648" r:id="rId1"/>
   </p:sldMasterIdLst>
   <p:notesMasterIdLst>
-    <p:notesMasterId r:id="rId20"/>
+    <p:notesMasterId r:id="rId21"/>
   </p:notesMasterIdLst>
   <p:sldIdLst>
     <p:sldId id="256" r:id="rId2"/>
@@ -26,6 +26,7 @@
     <p:sldId id="267" r:id="rId17"/>
     <p:sldId id="268" r:id="rId18"/>
     <p:sldId id="269" r:id="rId19"/>
+    <p:sldId id="275" r:id="rId20"/>
   </p:sldIdLst>
   <p:sldSz cx="12192000" cy="6858000"/>
   <p:notesSz cx="6858000" cy="9144000"/>
@@ -214,7 +215,7 @@
           <a:p>
             <a:fld id="{AD5FCB38-51A2-4D62-8717-5BE0EDC2993F}" type="datetimeFigureOut">
               <a:rPr lang="de-DE" smtClean="0"/>
-              <a:t>10.02.2020</a:t>
+              <a:t>12.02.20</a:t>
             </a:fld>
             <a:endParaRPr lang="de-DE"/>
           </a:p>
@@ -372,7 +373,7 @@
           <a:p>
             <a:fld id="{67F32239-C198-46BF-8243-3DEE8544CFAA}" type="slidenum">
               <a:rPr lang="de-DE" smtClean="0"/>
-              <a:t>‹#›</a:t>
+              <a:t>‹Nr.›</a:t>
             </a:fld>
             <a:endParaRPr lang="de-DE"/>
           </a:p>
@@ -1050,6 +1051,546 @@
 </p:notes>
 </file>
 
+<file path=ppt/notesSlides/notesSlide6.xml><?xml version="1.0" encoding="utf-8"?>
+<p:notes xmlns:a="http://schemas.openxmlformats.org/drawingml/2006/main" xmlns:r="http://schemas.openxmlformats.org/officeDocument/2006/relationships" xmlns:p="http://schemas.openxmlformats.org/presentationml/2006/main">
+  <p:cSld>
+    <p:spTree>
+      <p:nvGrpSpPr>
+        <p:cNvPr id="1" name=""/>
+        <p:cNvGrpSpPr/>
+        <p:nvPr/>
+      </p:nvGrpSpPr>
+      <p:grpSpPr>
+        <a:xfrm>
+          <a:off x="0" y="0"/>
+          <a:ext cx="0" cy="0"/>
+          <a:chOff x="0" y="0"/>
+          <a:chExt cx="0" cy="0"/>
+        </a:xfrm>
+      </p:grpSpPr>
+      <p:sp>
+        <p:nvSpPr>
+          <p:cNvPr id="2" name="Folienbildplatzhalter 1"/>
+          <p:cNvSpPr>
+            <a:spLocks noGrp="1" noRot="1" noChangeAspect="1"/>
+          </p:cNvSpPr>
+          <p:nvPr>
+            <p:ph type="sldImg"/>
+          </p:nvPr>
+        </p:nvSpPr>
+        <p:spPr/>
+      </p:sp>
+      <p:sp>
+        <p:nvSpPr>
+          <p:cNvPr id="3" name="Notizenplatzhalter 2"/>
+          <p:cNvSpPr>
+            <a:spLocks noGrp="1"/>
+          </p:cNvSpPr>
+          <p:nvPr>
+            <p:ph type="body" idx="1"/>
+          </p:nvPr>
+        </p:nvSpPr>
+        <p:spPr/>
+        <p:txBody>
+          <a:bodyPr/>
+          <a:lstStyle/>
+          <a:p>
+            <a:r>
+              <a:rPr lang="de-DE" sz="1200" b="0" i="0" kern="1200" dirty="0" err="1">
+                <a:solidFill>
+                  <a:schemeClr val="tx1"/>
+                </a:solidFill>
+                <a:effectLst/>
+                <a:latin typeface="+mn-lt"/>
+                <a:ea typeface="+mn-ea"/>
+                <a:cs typeface="+mn-cs"/>
+              </a:rPr>
+              <a:t>Let’s</a:t>
+            </a:r>
+            <a:r>
+              <a:rPr lang="de-DE" sz="1200" b="0" i="0" kern="1200" dirty="0">
+                <a:solidFill>
+                  <a:schemeClr val="tx1"/>
+                </a:solidFill>
+                <a:effectLst/>
+                <a:latin typeface="+mn-lt"/>
+                <a:ea typeface="+mn-ea"/>
+                <a:cs typeface="+mn-cs"/>
+              </a:rPr>
+              <a:t> </a:t>
+            </a:r>
+            <a:r>
+              <a:rPr lang="de-DE" sz="1200" b="0" i="0" kern="1200" dirty="0" err="1">
+                <a:solidFill>
+                  <a:schemeClr val="tx1"/>
+                </a:solidFill>
+                <a:effectLst/>
+                <a:latin typeface="+mn-lt"/>
+                <a:ea typeface="+mn-ea"/>
+                <a:cs typeface="+mn-cs"/>
+              </a:rPr>
+              <a:t>compute</a:t>
+            </a:r>
+            <a:r>
+              <a:rPr lang="de-DE" sz="1200" b="0" i="0" kern="1200" dirty="0">
+                <a:solidFill>
+                  <a:schemeClr val="tx1"/>
+                </a:solidFill>
+                <a:effectLst/>
+                <a:latin typeface="+mn-lt"/>
+                <a:ea typeface="+mn-ea"/>
+                <a:cs typeface="+mn-cs"/>
+              </a:rPr>
+              <a:t> Fresnel </a:t>
+            </a:r>
+            <a:r>
+              <a:rPr lang="de-DE" sz="1200" b="0" i="0" kern="1200" dirty="0" err="1">
+                <a:solidFill>
+                  <a:schemeClr val="tx1"/>
+                </a:solidFill>
+                <a:effectLst/>
+                <a:latin typeface="+mn-lt"/>
+                <a:ea typeface="+mn-ea"/>
+                <a:cs typeface="+mn-cs"/>
+              </a:rPr>
+              <a:t>equations</a:t>
+            </a:r>
+            <a:r>
+              <a:rPr lang="de-DE" sz="1200" b="0" i="0" kern="1200" dirty="0">
+                <a:solidFill>
+                  <a:schemeClr val="tx1"/>
+                </a:solidFill>
+                <a:effectLst/>
+                <a:latin typeface="+mn-lt"/>
+                <a:ea typeface="+mn-ea"/>
+                <a:cs typeface="+mn-cs"/>
+              </a:rPr>
+              <a:t> </a:t>
+            </a:r>
+            <a:r>
+              <a:rPr lang="de-DE" sz="1200" b="0" i="0" kern="1200" dirty="0" err="1">
+                <a:solidFill>
+                  <a:schemeClr val="tx1"/>
+                </a:solidFill>
+                <a:effectLst/>
+                <a:latin typeface="+mn-lt"/>
+                <a:ea typeface="+mn-ea"/>
+                <a:cs typeface="+mn-cs"/>
+              </a:rPr>
+              <a:t>that</a:t>
+            </a:r>
+            <a:r>
+              <a:rPr lang="de-DE" sz="1200" b="0" i="0" kern="1200" dirty="0">
+                <a:solidFill>
+                  <a:schemeClr val="tx1"/>
+                </a:solidFill>
+                <a:effectLst/>
+                <a:latin typeface="+mn-lt"/>
+                <a:ea typeface="+mn-ea"/>
+                <a:cs typeface="+mn-cs"/>
+              </a:rPr>
+              <a:t> </a:t>
+            </a:r>
+            <a:r>
+              <a:rPr lang="de-DE" sz="1200" b="0" i="0" kern="1200" dirty="0" err="1">
+                <a:solidFill>
+                  <a:schemeClr val="tx1"/>
+                </a:solidFill>
+                <a:effectLst/>
+                <a:latin typeface="+mn-lt"/>
+                <a:ea typeface="+mn-ea"/>
+                <a:cs typeface="+mn-cs"/>
+              </a:rPr>
+              <a:t>describe</a:t>
+            </a:r>
+            <a:r>
+              <a:rPr lang="de-DE" sz="1200" b="0" i="0" kern="1200" dirty="0">
+                <a:solidFill>
+                  <a:schemeClr val="tx1"/>
+                </a:solidFill>
+                <a:effectLst/>
+                <a:latin typeface="+mn-lt"/>
+                <a:ea typeface="+mn-ea"/>
+                <a:cs typeface="+mn-cs"/>
+              </a:rPr>
+              <a:t> </a:t>
+            </a:r>
+            <a:r>
+              <a:rPr lang="de-DE" sz="1200" b="0" i="0" kern="1200" dirty="0" err="1">
+                <a:solidFill>
+                  <a:schemeClr val="tx1"/>
+                </a:solidFill>
+                <a:effectLst/>
+                <a:latin typeface="+mn-lt"/>
+                <a:ea typeface="+mn-ea"/>
+                <a:cs typeface="+mn-cs"/>
+              </a:rPr>
+              <a:t>reflection</a:t>
+            </a:r>
+            <a:r>
+              <a:rPr lang="de-DE" sz="1200" b="0" i="0" kern="1200" dirty="0">
+                <a:solidFill>
+                  <a:schemeClr val="tx1"/>
+                </a:solidFill>
+                <a:effectLst/>
+                <a:latin typeface="+mn-lt"/>
+                <a:ea typeface="+mn-ea"/>
+                <a:cs typeface="+mn-cs"/>
+              </a:rPr>
+              <a:t> </a:t>
+            </a:r>
+            <a:r>
+              <a:rPr lang="de-DE" sz="1200" b="0" i="0" kern="1200" dirty="0" err="1">
+                <a:solidFill>
+                  <a:schemeClr val="tx1"/>
+                </a:solidFill>
+                <a:effectLst/>
+                <a:latin typeface="+mn-lt"/>
+                <a:ea typeface="+mn-ea"/>
+                <a:cs typeface="+mn-cs"/>
+              </a:rPr>
+              <a:t>and</a:t>
+            </a:r>
+            <a:r>
+              <a:rPr lang="de-DE" sz="1200" b="0" i="0" kern="1200" dirty="0">
+                <a:solidFill>
+                  <a:schemeClr val="tx1"/>
+                </a:solidFill>
+                <a:effectLst/>
+                <a:latin typeface="+mn-lt"/>
+                <a:ea typeface="+mn-ea"/>
+                <a:cs typeface="+mn-cs"/>
+              </a:rPr>
+              <a:t> </a:t>
+            </a:r>
+            <a:r>
+              <a:rPr lang="de-DE" sz="1200" b="0" i="0" kern="1200" dirty="0" err="1">
+                <a:solidFill>
+                  <a:schemeClr val="tx1"/>
+                </a:solidFill>
+                <a:effectLst/>
+                <a:latin typeface="+mn-lt"/>
+                <a:ea typeface="+mn-ea"/>
+                <a:cs typeface="+mn-cs"/>
+              </a:rPr>
+              <a:t>refraction</a:t>
+            </a:r>
+            <a:r>
+              <a:rPr lang="de-DE" sz="1200" b="0" i="0" kern="1200" dirty="0">
+                <a:solidFill>
+                  <a:schemeClr val="tx1"/>
+                </a:solidFill>
+                <a:effectLst/>
+                <a:latin typeface="+mn-lt"/>
+                <a:ea typeface="+mn-ea"/>
+                <a:cs typeface="+mn-cs"/>
+              </a:rPr>
+              <a:t> </a:t>
+            </a:r>
+            <a:r>
+              <a:rPr lang="de-DE" sz="1200" b="0" i="0" kern="1200" dirty="0" err="1">
+                <a:solidFill>
+                  <a:schemeClr val="tx1"/>
+                </a:solidFill>
+                <a:effectLst/>
+                <a:latin typeface="+mn-lt"/>
+                <a:ea typeface="+mn-ea"/>
+                <a:cs typeface="+mn-cs"/>
+              </a:rPr>
+              <a:t>of</a:t>
+            </a:r>
+            <a:r>
+              <a:rPr lang="de-DE" sz="1200" b="0" i="0" kern="1200" dirty="0">
+                <a:solidFill>
+                  <a:schemeClr val="tx1"/>
+                </a:solidFill>
+                <a:effectLst/>
+                <a:latin typeface="+mn-lt"/>
+                <a:ea typeface="+mn-ea"/>
+                <a:cs typeface="+mn-cs"/>
+              </a:rPr>
+              <a:t> light at uniform </a:t>
+            </a:r>
+            <a:r>
+              <a:rPr lang="de-DE" sz="1200" b="0" i="0" kern="1200" dirty="0" err="1">
+                <a:solidFill>
+                  <a:schemeClr val="tx1"/>
+                </a:solidFill>
+                <a:effectLst/>
+                <a:latin typeface="+mn-lt"/>
+                <a:ea typeface="+mn-ea"/>
+                <a:cs typeface="+mn-cs"/>
+              </a:rPr>
+              <a:t>planar</a:t>
+            </a:r>
+            <a:r>
+              <a:rPr lang="de-DE" sz="1200" b="0" i="0" kern="1200" dirty="0">
+                <a:solidFill>
+                  <a:schemeClr val="tx1"/>
+                </a:solidFill>
+                <a:effectLst/>
+                <a:latin typeface="+mn-lt"/>
+                <a:ea typeface="+mn-ea"/>
+                <a:cs typeface="+mn-cs"/>
+              </a:rPr>
+              <a:t> </a:t>
+            </a:r>
+            <a:r>
+              <a:rPr lang="de-DE" sz="1200" b="0" i="0" kern="1200" dirty="0" err="1">
+                <a:solidFill>
+                  <a:schemeClr val="tx1"/>
+                </a:solidFill>
+                <a:effectLst/>
+                <a:latin typeface="+mn-lt"/>
+                <a:ea typeface="+mn-ea"/>
+                <a:cs typeface="+mn-cs"/>
+              </a:rPr>
+              <a:t>interfaces</a:t>
+            </a:r>
+            <a:r>
+              <a:rPr lang="de-DE" sz="1200" b="0" i="0" kern="1200" dirty="0">
+                <a:solidFill>
+                  <a:schemeClr val="tx1"/>
+                </a:solidFill>
+                <a:effectLst/>
+                <a:latin typeface="+mn-lt"/>
+                <a:ea typeface="+mn-ea"/>
+                <a:cs typeface="+mn-cs"/>
+              </a:rPr>
+              <a:t>. </a:t>
+            </a:r>
+            <a:r>
+              <a:rPr lang="de-DE" sz="1200" b="0" i="0" kern="1200" dirty="0" err="1">
+                <a:solidFill>
+                  <a:schemeClr val="tx1"/>
+                </a:solidFill>
+                <a:effectLst/>
+                <a:latin typeface="+mn-lt"/>
+                <a:ea typeface="+mn-ea"/>
+                <a:cs typeface="+mn-cs"/>
+              </a:rPr>
+              <a:t>It’s</a:t>
+            </a:r>
+            <a:r>
+              <a:rPr lang="de-DE" sz="1200" b="0" i="0" kern="1200" dirty="0">
+                <a:solidFill>
+                  <a:schemeClr val="tx1"/>
+                </a:solidFill>
+                <a:effectLst/>
+                <a:latin typeface="+mn-lt"/>
+                <a:ea typeface="+mn-ea"/>
+                <a:cs typeface="+mn-cs"/>
+              </a:rPr>
+              <a:t> a </a:t>
+            </a:r>
+            <a:r>
+              <a:rPr lang="de-DE" sz="1200" b="0" i="0" kern="1200" dirty="0" err="1">
+                <a:solidFill>
+                  <a:schemeClr val="tx1"/>
+                </a:solidFill>
+                <a:effectLst/>
+                <a:latin typeface="+mn-lt"/>
+                <a:ea typeface="+mn-ea"/>
+                <a:cs typeface="+mn-cs"/>
+              </a:rPr>
+              <a:t>popular</a:t>
+            </a:r>
+            <a:r>
+              <a:rPr lang="de-DE" sz="1200" b="0" i="0" kern="1200" dirty="0">
+                <a:solidFill>
+                  <a:schemeClr val="tx1"/>
+                </a:solidFill>
+                <a:effectLst/>
+                <a:latin typeface="+mn-lt"/>
+                <a:ea typeface="+mn-ea"/>
+                <a:cs typeface="+mn-cs"/>
+              </a:rPr>
+              <a:t> </a:t>
+            </a:r>
+            <a:r>
+              <a:rPr lang="de-DE" sz="1200" b="0" i="0" kern="1200" dirty="0" err="1">
+                <a:solidFill>
+                  <a:schemeClr val="tx1"/>
+                </a:solidFill>
+                <a:effectLst/>
+                <a:latin typeface="+mn-lt"/>
+                <a:ea typeface="+mn-ea"/>
+                <a:cs typeface="+mn-cs"/>
+              </a:rPr>
+              <a:t>technique</a:t>
+            </a:r>
+            <a:r>
+              <a:rPr lang="de-DE" sz="1200" b="0" i="0" kern="1200" dirty="0">
+                <a:solidFill>
+                  <a:schemeClr val="tx1"/>
+                </a:solidFill>
+                <a:effectLst/>
+                <a:latin typeface="+mn-lt"/>
+                <a:ea typeface="+mn-ea"/>
+                <a:cs typeface="+mn-cs"/>
+              </a:rPr>
+              <a:t> </a:t>
+            </a:r>
+            <a:r>
+              <a:rPr lang="de-DE" sz="1200" b="0" i="0" kern="1200" dirty="0" err="1">
+                <a:solidFill>
+                  <a:schemeClr val="tx1"/>
+                </a:solidFill>
+                <a:effectLst/>
+                <a:latin typeface="+mn-lt"/>
+                <a:ea typeface="+mn-ea"/>
+                <a:cs typeface="+mn-cs"/>
+              </a:rPr>
+              <a:t>for</a:t>
+            </a:r>
+            <a:r>
+              <a:rPr lang="de-DE" sz="1200" b="0" i="0" kern="1200" dirty="0">
+                <a:solidFill>
+                  <a:schemeClr val="tx1"/>
+                </a:solidFill>
+                <a:effectLst/>
+                <a:latin typeface="+mn-lt"/>
+                <a:ea typeface="+mn-ea"/>
+                <a:cs typeface="+mn-cs"/>
+              </a:rPr>
+              <a:t> </a:t>
+            </a:r>
+            <a:r>
+              <a:rPr lang="de-DE" sz="1200" b="0" i="0" kern="1200" dirty="0" err="1">
+                <a:solidFill>
+                  <a:schemeClr val="tx1"/>
+                </a:solidFill>
+                <a:effectLst/>
+                <a:latin typeface="+mn-lt"/>
+                <a:ea typeface="+mn-ea"/>
+                <a:cs typeface="+mn-cs"/>
+              </a:rPr>
+              <a:t>generating</a:t>
+            </a:r>
+            <a:r>
+              <a:rPr lang="de-DE" sz="1200" b="0" i="0" kern="1200" dirty="0">
+                <a:solidFill>
+                  <a:schemeClr val="tx1"/>
+                </a:solidFill>
+                <a:effectLst/>
+                <a:latin typeface="+mn-lt"/>
+                <a:ea typeface="+mn-ea"/>
+                <a:cs typeface="+mn-cs"/>
+              </a:rPr>
+              <a:t> </a:t>
+            </a:r>
+            <a:r>
+              <a:rPr lang="de-DE" sz="1200" b="0" i="0" kern="1200" dirty="0" err="1">
+                <a:solidFill>
+                  <a:schemeClr val="tx1"/>
+                </a:solidFill>
+                <a:effectLst/>
+                <a:latin typeface="+mn-lt"/>
+                <a:ea typeface="+mn-ea"/>
+                <a:cs typeface="+mn-cs"/>
+              </a:rPr>
+              <a:t>realistic</a:t>
+            </a:r>
+            <a:r>
+              <a:rPr lang="de-DE" sz="1200" b="0" i="0" kern="1200" dirty="0">
+                <a:solidFill>
+                  <a:schemeClr val="tx1"/>
+                </a:solidFill>
+                <a:effectLst/>
+                <a:latin typeface="+mn-lt"/>
+                <a:ea typeface="+mn-ea"/>
+                <a:cs typeface="+mn-cs"/>
+              </a:rPr>
+              <a:t> </a:t>
+            </a:r>
+            <a:r>
+              <a:rPr lang="de-DE" sz="1200" b="0" i="0" kern="1200" dirty="0" err="1">
+                <a:solidFill>
+                  <a:schemeClr val="tx1"/>
+                </a:solidFill>
+                <a:effectLst/>
+                <a:latin typeface="+mn-lt"/>
+                <a:ea typeface="+mn-ea"/>
+                <a:cs typeface="+mn-cs"/>
+              </a:rPr>
+              <a:t>lightning</a:t>
+            </a:r>
+            <a:r>
+              <a:rPr lang="de-DE" sz="1200" b="0" i="0" kern="1200" dirty="0">
+                <a:solidFill>
+                  <a:schemeClr val="tx1"/>
+                </a:solidFill>
+                <a:effectLst/>
+                <a:latin typeface="+mn-lt"/>
+                <a:ea typeface="+mn-ea"/>
+                <a:cs typeface="+mn-cs"/>
+              </a:rPr>
+              <a:t> in 3D </a:t>
+            </a:r>
+            <a:r>
+              <a:rPr lang="de-DE" sz="1200" b="0" i="0" kern="1200" dirty="0" err="1">
+                <a:solidFill>
+                  <a:schemeClr val="tx1"/>
+                </a:solidFill>
+                <a:effectLst/>
+                <a:latin typeface="+mn-lt"/>
+                <a:ea typeface="+mn-ea"/>
+                <a:cs typeface="+mn-cs"/>
+              </a:rPr>
+              <a:t>games</a:t>
+            </a:r>
+            <a:r>
+              <a:rPr lang="de-DE" sz="1200" b="0" i="0" kern="1200" dirty="0">
+                <a:solidFill>
+                  <a:schemeClr val="tx1"/>
+                </a:solidFill>
+                <a:effectLst/>
+                <a:latin typeface="+mn-lt"/>
+                <a:ea typeface="+mn-ea"/>
+                <a:cs typeface="+mn-cs"/>
+              </a:rPr>
+              <a:t>.</a:t>
+            </a:r>
+            <a:endParaRPr lang="en-US" dirty="0"/>
+          </a:p>
+        </p:txBody>
+      </p:sp>
+      <p:sp>
+        <p:nvSpPr>
+          <p:cNvPr id="4" name="Foliennummernplatzhalter 3"/>
+          <p:cNvSpPr>
+            <a:spLocks noGrp="1"/>
+          </p:cNvSpPr>
+          <p:nvPr>
+            <p:ph type="sldNum" sz="quarter" idx="5"/>
+          </p:nvPr>
+        </p:nvSpPr>
+        <p:spPr/>
+        <p:txBody>
+          <a:bodyPr/>
+          <a:lstStyle/>
+          <a:p>
+            <a:fld id="{67F32239-C198-46BF-8243-3DEE8544CFAA}" type="slidenum">
+              <a:rPr lang="de-DE" smtClean="0"/>
+              <a:t>18</a:t>
+            </a:fld>
+            <a:endParaRPr lang="de-DE"/>
+          </a:p>
+        </p:txBody>
+      </p:sp>
+    </p:spTree>
+    <p:extLst>
+      <p:ext uri="{BB962C8B-B14F-4D97-AF65-F5344CB8AC3E}">
+        <p14:creationId xmlns:p14="http://schemas.microsoft.com/office/powerpoint/2010/main" val="884171446"/>
+      </p:ext>
+    </p:extLst>
+  </p:cSld>
+  <p:clrMapOvr>
+    <a:masterClrMapping/>
+  </p:clrMapOvr>
+</p:notes>
+</file>
+
 <file path=ppt/slideLayouts/slideLayout1.xml><?xml version="1.0" encoding="utf-8"?>
 <p:sldLayout xmlns:a="http://schemas.openxmlformats.org/drawingml/2006/main" xmlns:r="http://schemas.openxmlformats.org/officeDocument/2006/relationships" xmlns:p="http://schemas.openxmlformats.org/presentationml/2006/main" type="title" preserve="1">
   <p:cSld name="Titelfolie">
@@ -1197,7 +1738,7 @@
           <a:p>
             <a:fld id="{B5E8A55B-A329-4846-8D76-CA2F32F53923}" type="datetimeFigureOut">
               <a:rPr lang="de-DE" smtClean="0"/>
-              <a:t>10.02.2020</a:t>
+              <a:t>12.02.20</a:t>
             </a:fld>
             <a:endParaRPr lang="de-DE"/>
           </a:p>
@@ -1251,7 +1792,7 @@
           <a:p>
             <a:fld id="{75C7E5CD-9B5C-4805-A7DF-0ED0E58D07B8}" type="slidenum">
               <a:rPr lang="de-DE" smtClean="0"/>
-              <a:t>‹#›</a:t>
+              <a:t>‹Nr.›</a:t>
             </a:fld>
             <a:endParaRPr lang="de-DE"/>
           </a:p>
@@ -1395,7 +1936,7 @@
           <a:p>
             <a:fld id="{B5E8A55B-A329-4846-8D76-CA2F32F53923}" type="datetimeFigureOut">
               <a:rPr lang="de-DE" smtClean="0"/>
-              <a:t>10.02.2020</a:t>
+              <a:t>12.02.20</a:t>
             </a:fld>
             <a:endParaRPr lang="de-DE"/>
           </a:p>
@@ -1449,7 +1990,7 @@
           <a:p>
             <a:fld id="{75C7E5CD-9B5C-4805-A7DF-0ED0E58D07B8}" type="slidenum">
               <a:rPr lang="de-DE" smtClean="0"/>
-              <a:t>‹#›</a:t>
+              <a:t>‹Nr.›</a:t>
             </a:fld>
             <a:endParaRPr lang="de-DE"/>
           </a:p>
@@ -1603,7 +2144,7 @@
           <a:p>
             <a:fld id="{B5E8A55B-A329-4846-8D76-CA2F32F53923}" type="datetimeFigureOut">
               <a:rPr lang="de-DE" smtClean="0"/>
-              <a:t>10.02.2020</a:t>
+              <a:t>12.02.20</a:t>
             </a:fld>
             <a:endParaRPr lang="de-DE"/>
           </a:p>
@@ -1657,7 +2198,7 @@
           <a:p>
             <a:fld id="{75C7E5CD-9B5C-4805-A7DF-0ED0E58D07B8}" type="slidenum">
               <a:rPr lang="de-DE" smtClean="0"/>
-              <a:t>‹#›</a:t>
+              <a:t>‹Nr.›</a:t>
             </a:fld>
             <a:endParaRPr lang="de-DE"/>
           </a:p>
@@ -1801,7 +2342,7 @@
           <a:p>
             <a:fld id="{B5E8A55B-A329-4846-8D76-CA2F32F53923}" type="datetimeFigureOut">
               <a:rPr lang="de-DE" smtClean="0"/>
-              <a:t>10.02.2020</a:t>
+              <a:t>12.02.20</a:t>
             </a:fld>
             <a:endParaRPr lang="de-DE"/>
           </a:p>
@@ -1855,7 +2396,7 @@
           <a:p>
             <a:fld id="{75C7E5CD-9B5C-4805-A7DF-0ED0E58D07B8}" type="slidenum">
               <a:rPr lang="de-DE" smtClean="0"/>
-              <a:t>‹#›</a:t>
+              <a:t>‹Nr.›</a:t>
             </a:fld>
             <a:endParaRPr lang="de-DE"/>
           </a:p>
@@ -2076,7 +2617,7 @@
           <a:p>
             <a:fld id="{B5E8A55B-A329-4846-8D76-CA2F32F53923}" type="datetimeFigureOut">
               <a:rPr lang="de-DE" smtClean="0"/>
-              <a:t>10.02.2020</a:t>
+              <a:t>12.02.20</a:t>
             </a:fld>
             <a:endParaRPr lang="de-DE"/>
           </a:p>
@@ -2130,7 +2671,7 @@
           <a:p>
             <a:fld id="{75C7E5CD-9B5C-4805-A7DF-0ED0E58D07B8}" type="slidenum">
               <a:rPr lang="de-DE" smtClean="0"/>
-              <a:t>‹#›</a:t>
+              <a:t>‹Nr.›</a:t>
             </a:fld>
             <a:endParaRPr lang="de-DE"/>
           </a:p>
@@ -2341,7 +2882,7 @@
           <a:p>
             <a:fld id="{B5E8A55B-A329-4846-8D76-CA2F32F53923}" type="datetimeFigureOut">
               <a:rPr lang="de-DE" smtClean="0"/>
-              <a:t>10.02.2020</a:t>
+              <a:t>12.02.20</a:t>
             </a:fld>
             <a:endParaRPr lang="de-DE"/>
           </a:p>
@@ -2395,7 +2936,7 @@
           <a:p>
             <a:fld id="{75C7E5CD-9B5C-4805-A7DF-0ED0E58D07B8}" type="slidenum">
               <a:rPr lang="de-DE" smtClean="0"/>
-              <a:t>‹#›</a:t>
+              <a:t>‹Nr.›</a:t>
             </a:fld>
             <a:endParaRPr lang="de-DE"/>
           </a:p>
@@ -2753,7 +3294,7 @@
           <a:p>
             <a:fld id="{B5E8A55B-A329-4846-8D76-CA2F32F53923}" type="datetimeFigureOut">
               <a:rPr lang="de-DE" smtClean="0"/>
-              <a:t>10.02.2020</a:t>
+              <a:t>12.02.20</a:t>
             </a:fld>
             <a:endParaRPr lang="de-DE"/>
           </a:p>
@@ -2807,7 +3348,7 @@
           <a:p>
             <a:fld id="{75C7E5CD-9B5C-4805-A7DF-0ED0E58D07B8}" type="slidenum">
               <a:rPr lang="de-DE" smtClean="0"/>
-              <a:t>‹#›</a:t>
+              <a:t>‹Nr.›</a:t>
             </a:fld>
             <a:endParaRPr lang="de-DE"/>
           </a:p>
@@ -2894,7 +3435,7 @@
           <a:p>
             <a:fld id="{B5E8A55B-A329-4846-8D76-CA2F32F53923}" type="datetimeFigureOut">
               <a:rPr lang="de-DE" smtClean="0"/>
-              <a:t>10.02.2020</a:t>
+              <a:t>12.02.20</a:t>
             </a:fld>
             <a:endParaRPr lang="de-DE"/>
           </a:p>
@@ -2948,7 +3489,7 @@
           <a:p>
             <a:fld id="{75C7E5CD-9B5C-4805-A7DF-0ED0E58D07B8}" type="slidenum">
               <a:rPr lang="de-DE" smtClean="0"/>
-              <a:t>‹#›</a:t>
+              <a:t>‹Nr.›</a:t>
             </a:fld>
             <a:endParaRPr lang="de-DE"/>
           </a:p>
@@ -3007,7 +3548,7 @@
           <a:p>
             <a:fld id="{B5E8A55B-A329-4846-8D76-CA2F32F53923}" type="datetimeFigureOut">
               <a:rPr lang="de-DE" smtClean="0"/>
-              <a:t>10.02.2020</a:t>
+              <a:t>12.02.20</a:t>
             </a:fld>
             <a:endParaRPr lang="de-DE"/>
           </a:p>
@@ -3061,7 +3602,7 @@
           <a:p>
             <a:fld id="{75C7E5CD-9B5C-4805-A7DF-0ED0E58D07B8}" type="slidenum">
               <a:rPr lang="de-DE" smtClean="0"/>
-              <a:t>‹#›</a:t>
+              <a:t>‹Nr.›</a:t>
             </a:fld>
             <a:endParaRPr lang="de-DE"/>
           </a:p>
@@ -3318,7 +3859,7 @@
           <a:p>
             <a:fld id="{B5E8A55B-A329-4846-8D76-CA2F32F53923}" type="datetimeFigureOut">
               <a:rPr lang="de-DE" smtClean="0"/>
-              <a:t>10.02.2020</a:t>
+              <a:t>12.02.20</a:t>
             </a:fld>
             <a:endParaRPr lang="de-DE"/>
           </a:p>
@@ -3372,7 +3913,7 @@
           <a:p>
             <a:fld id="{75C7E5CD-9B5C-4805-A7DF-0ED0E58D07B8}" type="slidenum">
               <a:rPr lang="de-DE" smtClean="0"/>
-              <a:t>‹#›</a:t>
+              <a:t>‹Nr.›</a:t>
             </a:fld>
             <a:endParaRPr lang="de-DE"/>
           </a:p>
@@ -3606,7 +4147,7 @@
           <a:p>
             <a:fld id="{B5E8A55B-A329-4846-8D76-CA2F32F53923}" type="datetimeFigureOut">
               <a:rPr lang="de-DE" smtClean="0"/>
-              <a:t>10.02.2020</a:t>
+              <a:t>12.02.20</a:t>
             </a:fld>
             <a:endParaRPr lang="de-DE"/>
           </a:p>
@@ -3660,7 +4201,7 @@
           <a:p>
             <a:fld id="{75C7E5CD-9B5C-4805-A7DF-0ED0E58D07B8}" type="slidenum">
               <a:rPr lang="de-DE" smtClean="0"/>
-              <a:t>‹#›</a:t>
+              <a:t>‹Nr.›</a:t>
             </a:fld>
             <a:endParaRPr lang="de-DE"/>
           </a:p>
@@ -3847,7 +4388,7 @@
           <a:p>
             <a:fld id="{B5E8A55B-A329-4846-8D76-CA2F32F53923}" type="datetimeFigureOut">
               <a:rPr lang="de-DE" smtClean="0"/>
-              <a:t>10.02.2020</a:t>
+              <a:t>12.02.20</a:t>
             </a:fld>
             <a:endParaRPr lang="de-DE"/>
           </a:p>
@@ -3937,7 +4478,7 @@
           <a:p>
             <a:fld id="{75C7E5CD-9B5C-4805-A7DF-0ED0E58D07B8}" type="slidenum">
               <a:rPr lang="de-DE" smtClean="0"/>
-              <a:t>‹#›</a:t>
+              <a:t>‹Nr.›</a:t>
             </a:fld>
             <a:endParaRPr lang="de-DE"/>
           </a:p>
@@ -4703,12 +5244,12 @@
               <a:buNone/>
             </a:pPr>
             <a:r>
-              <a:rPr lang="en-US">
+              <a:rPr lang="en-US" dirty="0">
                 <a:solidFill>
                   <a:schemeClr val="bg1"/>
                 </a:solidFill>
               </a:rPr>
-              <a:t>Verteilung verschiedener Aufgaben in unterschiedliche Threads</a:t>
+              <a:t>Distribution of tasks into different threads</a:t>
             </a:r>
           </a:p>
         </p:txBody>
@@ -4848,30 +5389,30 @@
               <a:buNone/>
             </a:pPr>
             <a:r>
-              <a:rPr lang="de-DE" b="1" dirty="0"/>
-              <a:t>Vorteile:</a:t>
-            </a:r>
-          </a:p>
-          <a:p>
-            <a:r>
-              <a:rPr lang="de-DE" dirty="0"/>
-              <a:t>Parallelisierung seriellen Codes durch Direktiven</a:t>
-            </a:r>
-          </a:p>
-          <a:p>
-            <a:r>
-              <a:rPr lang="de-DE" dirty="0"/>
-              <a:t>Einfach und schnell zu implementieren</a:t>
-            </a:r>
-          </a:p>
-          <a:p>
-            <a:r>
-              <a:rPr lang="de-DE" dirty="0"/>
-              <a:t>Code bleibt übersichtlich</a:t>
-            </a:r>
-          </a:p>
-          <a:p>
-            <a:endParaRPr lang="de-DE" dirty="0"/>
+              <a:rPr lang="en-US" b="1" dirty="0"/>
+              <a:t>Advantages:</a:t>
+            </a:r>
+          </a:p>
+          <a:p>
+            <a:r>
+              <a:rPr lang="en-US" dirty="0"/>
+              <a:t>Parallelization of serial code via directives</a:t>
+            </a:r>
+          </a:p>
+          <a:p>
+            <a:r>
+              <a:rPr lang="en-US" dirty="0"/>
+              <a:t>Easy and fast implementation</a:t>
+            </a:r>
+          </a:p>
+          <a:p>
+            <a:r>
+              <a:rPr lang="en-US" dirty="0"/>
+              <a:t>Code remains clear</a:t>
+            </a:r>
+          </a:p>
+          <a:p>
+            <a:endParaRPr lang="en-US" dirty="0"/>
           </a:p>
         </p:txBody>
       </p:sp>
@@ -4900,38 +5441,33 @@
               <a:buNone/>
             </a:pPr>
             <a:r>
-              <a:rPr lang="de-DE" b="1" dirty="0"/>
-              <a:t>Nachteile</a:t>
-            </a:r>
-            <a:r>
               <a:rPr lang="en-US" b="1" dirty="0"/>
-              <a:t>:</a:t>
-            </a:r>
-            <a:endParaRPr lang="de-DE" b="1" dirty="0"/>
-          </a:p>
-          <a:p>
-            <a:r>
-              <a:rPr lang="de-DE" dirty="0"/>
-              <a:t>Spezieller Compiler</a:t>
-            </a:r>
-          </a:p>
-          <a:p>
-            <a:r>
-              <a:rPr lang="de-DE" dirty="0"/>
-              <a:t>Nur mit gemeinsamem Speicher </a:t>
-            </a:r>
-          </a:p>
-          <a:p>
-            <a:r>
-              <a:rPr lang="de-DE" dirty="0"/>
-              <a:t>Kommunikation zwischen Threads sind implizit </a:t>
+              <a:t>Disadvantages:</a:t>
+            </a:r>
+          </a:p>
+          <a:p>
+            <a:r>
+              <a:rPr lang="en-US" dirty="0"/>
+              <a:t>Specialized Compiler</a:t>
+            </a:r>
+          </a:p>
+          <a:p>
+            <a:r>
+              <a:rPr lang="en-US" dirty="0"/>
+              <a:t>Only with shared memory architectures</a:t>
+            </a:r>
+          </a:p>
+          <a:p>
+            <a:r>
+              <a:rPr lang="en-US" dirty="0"/>
+              <a:t>Communication between threads is implicit</a:t>
             </a:r>
           </a:p>
           <a:p>
             <a:pPr lvl="1"/>
             <a:r>
-              <a:rPr lang="de-DE" dirty="0"/>
-              <a:t>Schwer nachvollziehbar</a:t>
+              <a:rPr lang="en-US" dirty="0"/>
+              <a:t>Difficult to understand</a:t>
             </a:r>
           </a:p>
         </p:txBody>
@@ -5221,10 +5757,10 @@
           <a:p>
             <a:pPr algn="l"/>
             <a:r>
-              <a:rPr lang="en-US" sz="8800"/>
-              <a:t>Übungen</a:t>
-            </a:r>
-            <a:endParaRPr lang="de-DE" sz="8800"/>
+              <a:rPr lang="en-US" sz="8800" dirty="0"/>
+              <a:t>Exercises</a:t>
+            </a:r>
+            <a:endParaRPr lang="de-DE" sz="8800" dirty="0"/>
           </a:p>
         </p:txBody>
       </p:sp>
@@ -5361,12 +5897,12 @@
           <a:p>
             <a:pPr algn="r"/>
             <a:r>
-              <a:rPr lang="de-DE" sz="4100">
+              <a:rPr lang="en-US" sz="4100" dirty="0">
                 <a:solidFill>
                   <a:schemeClr val="accent1"/>
                 </a:solidFill>
               </a:rPr>
-              <a:t>Übung 1 Parallelisierung von Addition</a:t>
+              <a:t>Exercise 1 Parallelization of Addition</a:t>
             </a:r>
           </a:p>
         </p:txBody>
@@ -5455,32 +5991,32 @@
           <a:lstStyle/>
           <a:p>
             <a:r>
-              <a:rPr lang="de-DE" sz="2400"/>
-              <a:t>Warum gleiche Performance bei Release-Build?</a:t>
-            </a:r>
-          </a:p>
-          <a:p>
-            <a:endParaRPr lang="de-DE" sz="2400"/>
-          </a:p>
-          <a:p>
-            <a:endParaRPr lang="de-DE" sz="2400"/>
-          </a:p>
-          <a:p>
-            <a:r>
-              <a:rPr lang="de-DE" sz="2400"/>
-              <a:t>Welche Unterschiede ergeben sich zwischen dem Debug- und Release-Build?</a:t>
-            </a:r>
-          </a:p>
-          <a:p>
-            <a:endParaRPr lang="de-DE" sz="2400"/>
-          </a:p>
-          <a:p>
-            <a:endParaRPr lang="de-DE" sz="2400"/>
-          </a:p>
-          <a:p>
-            <a:r>
-              <a:rPr lang="de-DE" sz="2400"/>
-              <a:t>Was zeigt der Task-Manager für eine Ressourcen-Auslastung an?</a:t>
+              <a:rPr lang="en-US" sz="2400" dirty="0"/>
+              <a:t>Why is there the same performance in the Release configuration?</a:t>
+            </a:r>
+          </a:p>
+          <a:p>
+            <a:endParaRPr lang="en-US" sz="2400" dirty="0"/>
+          </a:p>
+          <a:p>
+            <a:endParaRPr lang="en-US" sz="2400" dirty="0"/>
+          </a:p>
+          <a:p>
+            <a:r>
+              <a:rPr lang="en-US" sz="2400" dirty="0"/>
+              <a:t>Are there differences between the results with a Debug and a Release build?</a:t>
+            </a:r>
+          </a:p>
+          <a:p>
+            <a:endParaRPr lang="en-US" sz="2400" dirty="0"/>
+          </a:p>
+          <a:p>
+            <a:endParaRPr lang="en-US" sz="2400" dirty="0"/>
+          </a:p>
+          <a:p>
+            <a:r>
+              <a:rPr lang="en-US" sz="2400" dirty="0"/>
+              <a:t>How many resources are occupied by your system during execution?</a:t>
             </a:r>
           </a:p>
         </p:txBody>
@@ -5618,12 +6154,12 @@
           <a:p>
             <a:pPr algn="r"/>
             <a:r>
-              <a:rPr lang="de-DE">
+              <a:rPr lang="en-US" dirty="0">
                 <a:solidFill>
                   <a:schemeClr val="accent1"/>
                 </a:solidFill>
               </a:rPr>
-              <a:t>Übung 2 Game of Life</a:t>
+              <a:t>Exercise 2 Game of Life</a:t>
             </a:r>
           </a:p>
         </p:txBody>
@@ -5712,32 +6248,32 @@
           <a:lstStyle/>
           <a:p>
             <a:r>
-              <a:rPr lang="en-US" sz="2400"/>
-              <a:t>Welcher Ansatz hat sich als bester zur Optimierung herausgestellt?</a:t>
-            </a:r>
-          </a:p>
-          <a:p>
-            <a:endParaRPr lang="en-US" sz="2400"/>
-          </a:p>
-          <a:p>
-            <a:endParaRPr lang="en-US" sz="2400"/>
-          </a:p>
-          <a:p>
-            <a:r>
-              <a:rPr lang="de-DE" sz="2400"/>
-              <a:t>Was könnten Probleme bei einer guten Optimierung sein?</a:t>
-            </a:r>
-          </a:p>
-          <a:p>
-            <a:endParaRPr lang="de-DE" sz="2400"/>
-          </a:p>
-          <a:p>
-            <a:endParaRPr lang="de-DE" sz="2400"/>
-          </a:p>
-          <a:p>
-            <a:r>
-              <a:rPr lang="de-DE" sz="2400"/>
-              <a:t>Ist das Beispiel anschaulich genug?</a:t>
+              <a:rPr lang="en-US" sz="2400" dirty="0"/>
+              <a:t>Which approach seemed to work best when optimizing?</a:t>
+            </a:r>
+          </a:p>
+          <a:p>
+            <a:endParaRPr lang="en-US" sz="2400" dirty="0"/>
+          </a:p>
+          <a:p>
+            <a:endParaRPr lang="en-US" sz="2400" dirty="0"/>
+          </a:p>
+          <a:p>
+            <a:r>
+              <a:rPr lang="en-US" sz="2400" dirty="0"/>
+              <a:t>Which problems may occur while optimizing?</a:t>
+            </a:r>
+          </a:p>
+          <a:p>
+            <a:endParaRPr lang="en-US" sz="2400" dirty="0"/>
+          </a:p>
+          <a:p>
+            <a:endParaRPr lang="en-US" sz="2400" dirty="0"/>
+          </a:p>
+          <a:p>
+            <a:r>
+              <a:rPr lang="en-US" sz="2400" dirty="0"/>
+              <a:t>Is the example visually enough?</a:t>
             </a:r>
           </a:p>
         </p:txBody>
@@ -5968,7 +6504,7 @@
           <a:lstStyle/>
           <a:p>
             <a:r>
-              <a:rPr lang="en-US" sz="3200" kern="1200">
+              <a:rPr lang="en-US" sz="3200" kern="1200" dirty="0">
                 <a:solidFill>
                   <a:schemeClr val="tx1"/>
                 </a:solidFill>
@@ -5976,7 +6512,7 @@
                 <a:ea typeface="+mj-ea"/>
                 <a:cs typeface="+mj-cs"/>
               </a:rPr>
-              <a:t>Übung 3 Quicksort Parallelisierung Sections</a:t>
+              <a:t>Exercise 3 Quicksort Parallelization of Sections</a:t>
             </a:r>
           </a:p>
         </p:txBody>
@@ -6156,8 +6692,8 @@
               <a:buChar char="•"/>
             </a:pPr>
             <a:r>
-              <a:rPr lang="en-US"/>
-              <a:t>Warum ist die Parallelisierung gleich schnell, wenn die Quicksort Methode Parallelisiert wird?</a:t>
+              <a:rPr lang="en-US" dirty="0"/>
+              <a:t>Why is the parallelized version only as fast as the normal quicksort?</a:t>
             </a:r>
           </a:p>
         </p:txBody>
@@ -7512,8 +8048,8 @@
           <a:p>
             <a:pPr algn="l"/>
             <a:r>
-              <a:rPr lang="de-DE" sz="8800"/>
-              <a:t>Vergleiche und andere Benchmarks</a:t>
+              <a:rPr lang="en-US" sz="8800" dirty="0"/>
+              <a:t>Comparisons and other Benchmarks</a:t>
             </a:r>
           </a:p>
         </p:txBody>
@@ -7570,16 +8106,8 @@
           <a:lstStyle/>
           <a:p>
             <a:r>
-              <a:rPr lang="de-DE" dirty="0"/>
-              <a:t>Wie schlägt sich C++17 im Vgl. zu </a:t>
-            </a:r>
-            <a:r>
-              <a:rPr lang="de-DE" dirty="0" err="1"/>
-              <a:t>OpenMP</a:t>
-            </a:r>
-            <a:r>
-              <a:rPr lang="de-DE" dirty="0"/>
-              <a:t>?</a:t>
+              <a:rPr lang="en-US" dirty="0"/>
+              <a:t>How does C++17 perform in comparison to OpenMP?</a:t>
             </a:r>
           </a:p>
         </p:txBody>
@@ -7762,16 +8290,8 @@
           <a:lstStyle/>
           <a:p>
             <a:r>
-              <a:rPr lang="de-DE" dirty="0"/>
-              <a:t>Wie schlägt sich C++17 im Vgl. zu </a:t>
-            </a:r>
-            <a:r>
-              <a:rPr lang="de-DE" dirty="0" err="1"/>
-              <a:t>OpenMP</a:t>
-            </a:r>
-            <a:r>
-              <a:rPr lang="de-DE" dirty="0"/>
-              <a:t>?</a:t>
+              <a:rPr lang="en-US" dirty="0"/>
+              <a:t>How does C++17 perform in comparison to OpenMP?</a:t>
             </a:r>
           </a:p>
         </p:txBody>
@@ -7793,7 +8313,7 @@
           </p:nvPr>
         </p:nvPicPr>
         <p:blipFill>
-          <a:blip r:embed="rId2">
+          <a:blip r:embed="rId3">
             <a:extLst>
               <a:ext uri="{28A0092B-C50C-407E-A947-70E740481C1C}">
                 <a14:useLocalDpi xmlns:a14="http://schemas.microsoft.com/office/drawing/2010/main" val="0"/>
@@ -7828,7 +8348,7 @@
           </p:nvPr>
         </p:nvPicPr>
         <p:blipFill>
-          <a:blip r:embed="rId3">
+          <a:blip r:embed="rId4">
             <a:extLst>
               <a:ext uri="{28A0092B-C50C-407E-A947-70E740481C1C}">
                 <a14:useLocalDpi xmlns:a14="http://schemas.microsoft.com/office/drawing/2010/main" val="0"/>
@@ -7911,6 +8431,267 @@
   </p:cSld>
   <p:clrMapOvr>
     <a:masterClrMapping/>
+  </p:clrMapOvr>
+</p:sld>
+</file>
+
+<file path=ppt/slides/slide19.xml><?xml version="1.0" encoding="utf-8"?>
+<p:sld xmlns:a="http://schemas.openxmlformats.org/drawingml/2006/main" xmlns:r="http://schemas.openxmlformats.org/officeDocument/2006/relationships" xmlns:p="http://schemas.openxmlformats.org/presentationml/2006/main">
+  <p:cSld>
+    <p:bg>
+      <p:bgPr>
+        <a:solidFill>
+          <a:schemeClr val="tx1"/>
+        </a:solidFill>
+        <a:effectLst/>
+      </p:bgPr>
+    </p:bg>
+    <p:spTree>
+      <p:nvGrpSpPr>
+        <p:cNvPr id="1" name=""/>
+        <p:cNvGrpSpPr/>
+        <p:nvPr/>
+      </p:nvGrpSpPr>
+      <p:grpSpPr>
+        <a:xfrm>
+          <a:off x="0" y="0"/>
+          <a:ext cx="0" cy="0"/>
+          <a:chOff x="0" y="0"/>
+          <a:chExt cx="0" cy="0"/>
+        </a:xfrm>
+      </p:grpSpPr>
+      <p:sp>
+        <p:nvSpPr>
+          <p:cNvPr id="10" name="Rectangle 9">
+            <a:extLst>
+              <a:ext uri="{FF2B5EF4-FFF2-40B4-BE49-F238E27FC236}">
+                <a16:creationId xmlns:a16="http://schemas.microsoft.com/office/drawing/2014/main" id="{2A8AA5BC-4F7A-4226-8F99-6D824B226A97}"/>
+              </a:ext>
+              <a:ext uri="{C183D7F6-B498-43B3-948B-1728B52AA6E4}">
+                <adec:decorative xmlns:adec="http://schemas.microsoft.com/office/drawing/2017/decorative" val="1"/>
+              </a:ext>
+            </a:extLst>
+          </p:cNvPr>
+          <p:cNvSpPr>
+            <a:spLocks noGrp="1" noRot="1" noChangeAspect="1" noMove="1" noResize="1" noEditPoints="1" noAdjustHandles="1" noChangeArrowheads="1" noChangeShapeType="1" noTextEdit="1"/>
+          </p:cNvSpPr>
+          <p:nvPr>
+            <p:extLst>
+              <p:ext uri="{386F3935-93C4-4BCD-93E2-E3B085C9AB24}">
+                <p16:designElem xmlns:p16="http://schemas.microsoft.com/office/powerpoint/2015/main" val="1"/>
+              </p:ext>
+            </p:extLst>
+          </p:nvPr>
+        </p:nvSpPr>
+        <p:spPr>
+          <a:xfrm>
+            <a:off x="0" y="-3324"/>
+            <a:ext cx="12192000" cy="6861324"/>
+          </a:xfrm>
+          <a:prstGeom prst="rect">
+            <a:avLst/>
+          </a:prstGeom>
+          <a:solidFill>
+            <a:schemeClr val="tx1"/>
+          </a:solidFill>
+          <a:ln>
+            <a:noFill/>
+          </a:ln>
+        </p:spPr>
+        <p:style>
+          <a:lnRef idx="2">
+            <a:schemeClr val="accent1">
+              <a:shade val="50000"/>
+            </a:schemeClr>
+          </a:lnRef>
+          <a:fillRef idx="1">
+            <a:schemeClr val="accent1"/>
+          </a:fillRef>
+          <a:effectRef idx="0">
+            <a:schemeClr val="accent1"/>
+          </a:effectRef>
+          <a:fontRef idx="minor">
+            <a:schemeClr val="lt1"/>
+          </a:fontRef>
+        </p:style>
+        <p:txBody>
+          <a:bodyPr rtlCol="0" anchor="ctr"/>
+          <a:lstStyle/>
+          <a:p>
+            <a:pPr algn="ctr"/>
+            <a:endParaRPr lang="en-US"/>
+          </a:p>
+        </p:txBody>
+      </p:sp>
+      <p:sp>
+        <p:nvSpPr>
+          <p:cNvPr id="12" name="Rectangle 11">
+            <a:extLst>
+              <a:ext uri="{FF2B5EF4-FFF2-40B4-BE49-F238E27FC236}">
+                <a16:creationId xmlns:a16="http://schemas.microsoft.com/office/drawing/2014/main" id="{3E5445C6-DD42-4979-86FF-03730E8C6DB0}"/>
+              </a:ext>
+              <a:ext uri="{C183D7F6-B498-43B3-948B-1728B52AA6E4}">
+                <adec:decorative xmlns:adec="http://schemas.microsoft.com/office/drawing/2017/decorative" val="1"/>
+              </a:ext>
+            </a:extLst>
+          </p:cNvPr>
+          <p:cNvSpPr>
+            <a:spLocks noGrp="1" noRot="1" noChangeAspect="1" noMove="1" noResize="1" noEditPoints="1" noAdjustHandles="1" noChangeArrowheads="1" noChangeShapeType="1" noTextEdit="1"/>
+          </p:cNvSpPr>
+          <p:nvPr>
+            <p:extLst>
+              <p:ext uri="{386F3935-93C4-4BCD-93E2-E3B085C9AB24}">
+                <p16:designElem xmlns:p16="http://schemas.microsoft.com/office/powerpoint/2015/main" val="1"/>
+              </p:ext>
+            </p:extLst>
+          </p:nvPr>
+        </p:nvSpPr>
+        <p:spPr bwMode="ltGray">
+          <a:xfrm>
+            <a:off x="321734" y="321733"/>
+            <a:ext cx="11573488" cy="6214534"/>
+          </a:xfrm>
+          <a:prstGeom prst="rect">
+            <a:avLst/>
+          </a:prstGeom>
+          <a:solidFill>
+            <a:schemeClr val="bg1">
+              <a:lumMod val="75000"/>
+              <a:lumOff val="25000"/>
+            </a:schemeClr>
+          </a:solidFill>
+          <a:ln w="127000" cap="sq" cmpd="thinThick">
+            <a:solidFill>
+              <a:schemeClr val="bg1">
+                <a:lumMod val="75000"/>
+                <a:lumOff val="25000"/>
+              </a:schemeClr>
+            </a:solidFill>
+          </a:ln>
+        </p:spPr>
+        <p:style>
+          <a:lnRef idx="2">
+            <a:schemeClr val="accent1">
+              <a:shade val="50000"/>
+            </a:schemeClr>
+          </a:lnRef>
+          <a:fillRef idx="1">
+            <a:schemeClr val="accent1"/>
+          </a:fillRef>
+          <a:effectRef idx="0">
+            <a:schemeClr val="accent1"/>
+          </a:effectRef>
+          <a:fontRef idx="minor">
+            <a:schemeClr val="lt1"/>
+          </a:fontRef>
+        </p:style>
+        <p:txBody>
+          <a:bodyPr rtlCol="0" anchor="ctr"/>
+          <a:lstStyle/>
+          <a:p>
+            <a:pPr algn="ctr"/>
+            <a:endParaRPr lang="en-US"/>
+          </a:p>
+        </p:txBody>
+      </p:sp>
+      <p:sp>
+        <p:nvSpPr>
+          <p:cNvPr id="5" name="Titel 4">
+            <a:extLst>
+              <a:ext uri="{FF2B5EF4-FFF2-40B4-BE49-F238E27FC236}">
+                <a16:creationId xmlns:a16="http://schemas.microsoft.com/office/drawing/2014/main" id="{990FF687-7083-7244-A60E-E4C42E4DFB06}"/>
+              </a:ext>
+            </a:extLst>
+          </p:cNvPr>
+          <p:cNvSpPr>
+            <a:spLocks noGrp="1"/>
+          </p:cNvSpPr>
+          <p:nvPr>
+            <p:ph type="ctrTitle"/>
+          </p:nvPr>
+        </p:nvSpPr>
+        <p:spPr>
+          <a:xfrm>
+            <a:off x="1524000" y="1122362"/>
+            <a:ext cx="9144000" cy="2840037"/>
+          </a:xfrm>
+        </p:spPr>
+        <p:txBody>
+          <a:bodyPr>
+            <a:normAutofit/>
+          </a:bodyPr>
+          <a:lstStyle/>
+          <a:p>
+            <a:r>
+              <a:rPr lang="de-DE" sz="5800"/>
+              <a:t>Thank you</a:t>
+            </a:r>
+          </a:p>
+        </p:txBody>
+      </p:sp>
+      <p:cxnSp>
+        <p:nvCxnSpPr>
+          <p:cNvPr id="14" name="Straight Connector 13">
+            <a:extLst>
+              <a:ext uri="{FF2B5EF4-FFF2-40B4-BE49-F238E27FC236}">
+                <a16:creationId xmlns:a16="http://schemas.microsoft.com/office/drawing/2014/main" id="{45000665-DFC7-417E-8FD7-516A0F15C975}"/>
+              </a:ext>
+              <a:ext uri="{C183D7F6-B498-43B3-948B-1728B52AA6E4}">
+                <adec:decorative xmlns:adec="http://schemas.microsoft.com/office/drawing/2017/decorative" val="1"/>
+              </a:ext>
+            </a:extLst>
+          </p:cNvPr>
+          <p:cNvCxnSpPr>
+            <a:cxnSpLocks noGrp="1" noRot="1" noChangeAspect="1" noMove="1" noResize="1" noEditPoints="1" noAdjustHandles="1" noChangeArrowheads="1" noChangeShapeType="1"/>
+          </p:cNvCxnSpPr>
+          <p:nvPr>
+            <p:extLst>
+              <p:ext uri="{386F3935-93C4-4BCD-93E2-E3B085C9AB24}">
+                <p16:designElem xmlns:p16="http://schemas.microsoft.com/office/powerpoint/2015/main" val="1"/>
+              </p:ext>
+            </p:extLst>
+          </p:nvPr>
+        </p:nvCxnSpPr>
+        <p:spPr>
+          <a:xfrm>
+            <a:off x="4724400" y="4109417"/>
+            <a:ext cx="2743200" cy="0"/>
+          </a:xfrm>
+          <a:prstGeom prst="line">
+            <a:avLst/>
+          </a:prstGeom>
+          <a:ln w="12700">
+            <a:solidFill>
+              <a:schemeClr val="tx1">
+                <a:lumMod val="85000"/>
+              </a:schemeClr>
+            </a:solidFill>
+          </a:ln>
+        </p:spPr>
+        <p:style>
+          <a:lnRef idx="1">
+            <a:schemeClr val="accent1"/>
+          </a:lnRef>
+          <a:fillRef idx="0">
+            <a:schemeClr val="accent1"/>
+          </a:fillRef>
+          <a:effectRef idx="0">
+            <a:schemeClr val="accent1"/>
+          </a:effectRef>
+          <a:fontRef idx="minor">
+            <a:schemeClr val="tx1"/>
+          </a:fontRef>
+        </p:style>
+      </p:cxnSp>
+    </p:spTree>
+    <p:extLst>
+      <p:ext uri="{BB962C8B-B14F-4D97-AF65-F5344CB8AC3E}">
+        <p14:creationId xmlns:p14="http://schemas.microsoft.com/office/powerpoint/2010/main" val="2830173752"/>
+      </p:ext>
+    </p:extLst>
+  </p:cSld>
+  <p:clrMapOvr>
+    <a:overrideClrMapping bg1="dk1" tx1="lt1" bg2="dk2" tx2="lt2" accent1="accent1" accent2="accent2" accent3="accent3" accent4="accent4" accent5="accent5" accent6="accent6" hlink="hlink" folHlink="folHlink"/>
   </p:clrMapOvr>
 </p:sld>
 </file>
@@ -8035,12 +8816,12 @@
           <a:p>
             <a:pPr algn="r"/>
             <a:r>
-              <a:rPr lang="de-DE" sz="3700">
+              <a:rPr lang="en-US" sz="3700" dirty="0">
                 <a:solidFill>
                   <a:schemeClr val="accent1"/>
                 </a:solidFill>
               </a:rPr>
-              <a:t>Warum Parallelisierung?</a:t>
+              <a:t>Why are parallel programs important?</a:t>
             </a:r>
           </a:p>
         </p:txBody>
@@ -8129,19 +8910,23 @@
           <a:lstStyle/>
           <a:p>
             <a:r>
-              <a:rPr lang="de-DE" sz="2400"/>
-              <a:t>Moore‘s Law -&gt; Alle 18 Monate verdoppelt sich die Transistoren-Dichte in Chips &amp; Prozessoren</a:t>
-            </a:r>
-          </a:p>
-          <a:p>
-            <a:r>
-              <a:rPr lang="de-DE" sz="2400"/>
+              <a:rPr lang="de-DE" sz="2400" dirty="0" err="1"/>
+              <a:t>Moore‘s</a:t>
+            </a:r>
+            <a:r>
+              <a:rPr lang="de-DE" sz="2400" dirty="0"/>
+              <a:t> Law -&gt; Alle 18 Monate verdoppelt sich die Transistoren-Dichte in Chips &amp; Prozessoren</a:t>
+            </a:r>
+          </a:p>
+          <a:p>
+            <a:r>
+              <a:rPr lang="de-DE" sz="2400" dirty="0"/>
               <a:t>Höherer Leistungsbedarf für Chips und mehr Wärmeentwicklung</a:t>
             </a:r>
           </a:p>
           <a:p>
             <a:r>
-              <a:rPr lang="de-DE" sz="2400"/>
+              <a:rPr lang="de-DE" sz="2400" dirty="0"/>
               <a:t>Noch mehr Leistung?</a:t>
             </a:r>
           </a:p>
@@ -8154,15 +8939,15 @@
           </a:p>
           <a:p>
             <a:r>
-              <a:rPr lang="de-DE" sz="2400"/>
+              <a:rPr lang="de-DE" sz="2400" dirty="0"/>
               <a:t>Oder eben: </a:t>
             </a:r>
             <a:r>
-              <a:rPr lang="de-DE" sz="2400" b="1"/>
+              <a:rPr lang="de-DE" sz="2400" b="1" dirty="0"/>
               <a:t>mehr Prozessoren</a:t>
             </a:r>
             <a:r>
-              <a:rPr lang="de-DE" sz="2400"/>
+              <a:rPr lang="de-DE" sz="2400" dirty="0"/>
               <a:t>!</a:t>
             </a:r>
           </a:p>
@@ -8305,13 +9090,18 @@
           <a:p>
             <a:pPr algn="r"/>
             <a:r>
-              <a:rPr lang="de-DE">
+              <a:rPr lang="en-US" dirty="0">
                 <a:solidFill>
                   <a:schemeClr val="accent1"/>
                 </a:solidFill>
               </a:rPr>
-              <a:t>Was hat Automotive damit zu tun?</a:t>
-            </a:r>
+              <a:t>Automotive as an OpenMP Application</a:t>
+            </a:r>
+            <a:endParaRPr lang="de-DE" dirty="0">
+              <a:solidFill>
+                <a:schemeClr val="accent1"/>
+              </a:solidFill>
+            </a:endParaRPr>
           </a:p>
         </p:txBody>
       </p:sp>
@@ -8372,39 +9162,203 @@
       </p:cxnSp>
       <p:sp>
         <p:nvSpPr>
-          <p:cNvPr id="3" name="Inhaltsplatzhalter 2">
-            <a:extLst>
-              <a:ext uri="{FF2B5EF4-FFF2-40B4-BE49-F238E27FC236}">
-                <a16:creationId xmlns:a16="http://schemas.microsoft.com/office/drawing/2014/main" id="{89236DE0-E6C7-9841-98C9-533DCFA9FC50}"/>
-              </a:ext>
-            </a:extLst>
-          </p:cNvPr>
-          <p:cNvSpPr>
-            <a:spLocks noGrp="1"/>
-          </p:cNvSpPr>
-          <p:nvPr>
-            <p:ph idx="1"/>
-          </p:nvPr>
+          <p:cNvPr id="9" name="Inhaltsplatzhalter 2">
+            <a:extLst>
+              <a:ext uri="{FF2B5EF4-FFF2-40B4-BE49-F238E27FC236}">
+                <a16:creationId xmlns:a16="http://schemas.microsoft.com/office/drawing/2014/main" id="{F1DF238F-481C-6142-BD44-279ED2A7CF02}"/>
+              </a:ext>
+            </a:extLst>
+          </p:cNvPr>
+          <p:cNvSpPr txBox="1">
+            <a:spLocks/>
+          </p:cNvSpPr>
+          <p:nvPr/>
         </p:nvSpPr>
         <p:spPr>
           <a:xfrm>
             <a:off x="4976031" y="963877"/>
             <a:ext cx="6377769" cy="4930246"/>
           </a:xfrm>
+          <a:prstGeom prst="rect">
+            <a:avLst/>
+          </a:prstGeom>
         </p:spPr>
         <p:txBody>
-          <a:bodyPr anchor="ctr">
+          <a:bodyPr vert="horz" lIns="91440" tIns="45720" rIns="91440" bIns="45720" rtlCol="0" anchor="ctr">
             <a:normAutofit/>
           </a:bodyPr>
-          <a:lstStyle/>
+          <a:lstStyle>
+            <a:lvl1pPr marL="228600" indent="-228600" algn="l" defTabSz="914400" rtl="0" eaLnBrk="1" latinLnBrk="0" hangingPunct="1">
+              <a:lnSpc>
+                <a:spcPct val="90000"/>
+              </a:lnSpc>
+              <a:spcBef>
+                <a:spcPts val="1000"/>
+              </a:spcBef>
+              <a:buFont typeface="Arial" panose="020B0604020202020204" pitchFamily="34" charset="0"/>
+              <a:buChar char="•"/>
+              <a:defRPr sz="2800" kern="1200">
+                <a:solidFill>
+                  <a:schemeClr val="tx1"/>
+                </a:solidFill>
+                <a:latin typeface="+mn-lt"/>
+                <a:ea typeface="+mn-ea"/>
+                <a:cs typeface="+mn-cs"/>
+              </a:defRPr>
+            </a:lvl1pPr>
+            <a:lvl2pPr marL="685800" indent="-228600" algn="l" defTabSz="914400" rtl="0" eaLnBrk="1" latinLnBrk="0" hangingPunct="1">
+              <a:lnSpc>
+                <a:spcPct val="90000"/>
+              </a:lnSpc>
+              <a:spcBef>
+                <a:spcPts val="500"/>
+              </a:spcBef>
+              <a:buFont typeface="Arial" panose="020B0604020202020204" pitchFamily="34" charset="0"/>
+              <a:buChar char="•"/>
+              <a:defRPr sz="2400" kern="1200">
+                <a:solidFill>
+                  <a:schemeClr val="tx1"/>
+                </a:solidFill>
+                <a:latin typeface="+mn-lt"/>
+                <a:ea typeface="+mn-ea"/>
+                <a:cs typeface="+mn-cs"/>
+              </a:defRPr>
+            </a:lvl2pPr>
+            <a:lvl3pPr marL="1143000" indent="-228600" algn="l" defTabSz="914400" rtl="0" eaLnBrk="1" latinLnBrk="0" hangingPunct="1">
+              <a:lnSpc>
+                <a:spcPct val="90000"/>
+              </a:lnSpc>
+              <a:spcBef>
+                <a:spcPts val="500"/>
+              </a:spcBef>
+              <a:buFont typeface="Arial" panose="020B0604020202020204" pitchFamily="34" charset="0"/>
+              <a:buChar char="•"/>
+              <a:defRPr sz="2000" kern="1200">
+                <a:solidFill>
+                  <a:schemeClr val="tx1"/>
+                </a:solidFill>
+                <a:latin typeface="+mn-lt"/>
+                <a:ea typeface="+mn-ea"/>
+                <a:cs typeface="+mn-cs"/>
+              </a:defRPr>
+            </a:lvl3pPr>
+            <a:lvl4pPr marL="1600200" indent="-228600" algn="l" defTabSz="914400" rtl="0" eaLnBrk="1" latinLnBrk="0" hangingPunct="1">
+              <a:lnSpc>
+                <a:spcPct val="90000"/>
+              </a:lnSpc>
+              <a:spcBef>
+                <a:spcPts val="500"/>
+              </a:spcBef>
+              <a:buFont typeface="Arial" panose="020B0604020202020204" pitchFamily="34" charset="0"/>
+              <a:buChar char="•"/>
+              <a:defRPr sz="1800" kern="1200">
+                <a:solidFill>
+                  <a:schemeClr val="tx1"/>
+                </a:solidFill>
+                <a:latin typeface="+mn-lt"/>
+                <a:ea typeface="+mn-ea"/>
+                <a:cs typeface="+mn-cs"/>
+              </a:defRPr>
+            </a:lvl4pPr>
+            <a:lvl5pPr marL="2057400" indent="-228600" algn="l" defTabSz="914400" rtl="0" eaLnBrk="1" latinLnBrk="0" hangingPunct="1">
+              <a:lnSpc>
+                <a:spcPct val="90000"/>
+              </a:lnSpc>
+              <a:spcBef>
+                <a:spcPts val="500"/>
+              </a:spcBef>
+              <a:buFont typeface="Arial" panose="020B0604020202020204" pitchFamily="34" charset="0"/>
+              <a:buChar char="•"/>
+              <a:defRPr sz="1800" kern="1200">
+                <a:solidFill>
+                  <a:schemeClr val="tx1"/>
+                </a:solidFill>
+                <a:latin typeface="+mn-lt"/>
+                <a:ea typeface="+mn-ea"/>
+                <a:cs typeface="+mn-cs"/>
+              </a:defRPr>
+            </a:lvl5pPr>
+            <a:lvl6pPr marL="2514600" indent="-228600" algn="l" defTabSz="914400" rtl="0" eaLnBrk="1" latinLnBrk="0" hangingPunct="1">
+              <a:lnSpc>
+                <a:spcPct val="90000"/>
+              </a:lnSpc>
+              <a:spcBef>
+                <a:spcPts val="500"/>
+              </a:spcBef>
+              <a:buFont typeface="Arial" panose="020B0604020202020204" pitchFamily="34" charset="0"/>
+              <a:buChar char="•"/>
+              <a:defRPr sz="1800" kern="1200">
+                <a:solidFill>
+                  <a:schemeClr val="tx1"/>
+                </a:solidFill>
+                <a:latin typeface="+mn-lt"/>
+                <a:ea typeface="+mn-ea"/>
+                <a:cs typeface="+mn-cs"/>
+              </a:defRPr>
+            </a:lvl6pPr>
+            <a:lvl7pPr marL="2971800" indent="-228600" algn="l" defTabSz="914400" rtl="0" eaLnBrk="1" latinLnBrk="0" hangingPunct="1">
+              <a:lnSpc>
+                <a:spcPct val="90000"/>
+              </a:lnSpc>
+              <a:spcBef>
+                <a:spcPts val="500"/>
+              </a:spcBef>
+              <a:buFont typeface="Arial" panose="020B0604020202020204" pitchFamily="34" charset="0"/>
+              <a:buChar char="•"/>
+              <a:defRPr sz="1800" kern="1200">
+                <a:solidFill>
+                  <a:schemeClr val="tx1"/>
+                </a:solidFill>
+                <a:latin typeface="+mn-lt"/>
+                <a:ea typeface="+mn-ea"/>
+                <a:cs typeface="+mn-cs"/>
+              </a:defRPr>
+            </a:lvl7pPr>
+            <a:lvl8pPr marL="3429000" indent="-228600" algn="l" defTabSz="914400" rtl="0" eaLnBrk="1" latinLnBrk="0" hangingPunct="1">
+              <a:lnSpc>
+                <a:spcPct val="90000"/>
+              </a:lnSpc>
+              <a:spcBef>
+                <a:spcPts val="500"/>
+              </a:spcBef>
+              <a:buFont typeface="Arial" panose="020B0604020202020204" pitchFamily="34" charset="0"/>
+              <a:buChar char="•"/>
+              <a:defRPr sz="1800" kern="1200">
+                <a:solidFill>
+                  <a:schemeClr val="tx1"/>
+                </a:solidFill>
+                <a:latin typeface="+mn-lt"/>
+                <a:ea typeface="+mn-ea"/>
+                <a:cs typeface="+mn-cs"/>
+              </a:defRPr>
+            </a:lvl8pPr>
+            <a:lvl9pPr marL="3886200" indent="-228600" algn="l" defTabSz="914400" rtl="0" eaLnBrk="1" latinLnBrk="0" hangingPunct="1">
+              <a:lnSpc>
+                <a:spcPct val="90000"/>
+              </a:lnSpc>
+              <a:spcBef>
+                <a:spcPts val="500"/>
+              </a:spcBef>
+              <a:buFont typeface="Arial" panose="020B0604020202020204" pitchFamily="34" charset="0"/>
+              <a:buChar char="•"/>
+              <a:defRPr sz="1800" kern="1200">
+                <a:solidFill>
+                  <a:schemeClr val="tx1"/>
+                </a:solidFill>
+                <a:latin typeface="+mn-lt"/>
+                <a:ea typeface="+mn-ea"/>
+                <a:cs typeface="+mn-cs"/>
+              </a:defRPr>
+            </a:lvl9pPr>
+          </a:lstStyle>
           <a:p>
             <a:pPr marL="514350" indent="-514350">
               <a:buFont typeface="+mj-lt"/>
               <a:buAutoNum type="arabicPeriod"/>
             </a:pPr>
             <a:r>
-              <a:rPr lang="de-DE" sz="2400"/>
-              <a:t>Ein Automobil hat immer mehr Software-Aufgaben</a:t>
+              <a:rPr lang="en-US" sz="2400"/>
+              <a:t>A vehicle has an increasing amount of software tasks</a:t>
             </a:r>
           </a:p>
           <a:p>
@@ -8412,7 +9366,7 @@
               <a:buFont typeface="+mj-lt"/>
               <a:buAutoNum type="arabicPeriod"/>
             </a:pPr>
-            <a:endParaRPr lang="de-DE" sz="2400"/>
+            <a:endParaRPr lang="en-US" sz="2400"/>
           </a:p>
           <a:p>
             <a:pPr marL="514350" indent="-514350">
@@ -8420,8 +9374,8 @@
               <a:buAutoNum type="arabicPeriod"/>
             </a:pPr>
             <a:r>
-              <a:rPr lang="de-DE" sz="2400"/>
-              <a:t>C/C++ sind in HW-nähe und v.a. auch im Auto Standard</a:t>
+              <a:rPr lang="en-US" sz="2400"/>
+              <a:t>C/C++ are the standard in low-level programming and especially in cars</a:t>
             </a:r>
           </a:p>
           <a:p>
@@ -8429,7 +9383,7 @@
               <a:buFont typeface="+mj-lt"/>
               <a:buAutoNum type="arabicPeriod"/>
             </a:pPr>
-            <a:endParaRPr lang="de-DE" sz="2400"/>
+            <a:endParaRPr lang="en-US" sz="2400"/>
           </a:p>
           <a:p>
             <a:pPr marL="514350" indent="-514350">
@@ -8437,9 +9391,10 @@
               <a:buAutoNum type="arabicPeriod"/>
             </a:pPr>
             <a:r>
-              <a:rPr lang="de-DE" sz="2400"/>
-              <a:t>Die Taktung von Prozessoren kann nicht beliebig erhöht werden</a:t>
-            </a:r>
+              <a:rPr lang="en-US" sz="2400"/>
+              <a:t>The clock rate of processors cannot be increased at will</a:t>
+            </a:r>
+            <a:endParaRPr lang="en-US" sz="2400" dirty="0"/>
           </a:p>
         </p:txBody>
       </p:sp>
@@ -8576,12 +9531,12 @@
           <a:p>
             <a:pPr algn="r"/>
             <a:r>
-              <a:rPr lang="de-DE" dirty="0">
+              <a:rPr lang="en-US" dirty="0">
                 <a:solidFill>
                   <a:schemeClr val="accent1"/>
                 </a:solidFill>
               </a:rPr>
-              <a:t>Was hat Automotive damit zu tun?</a:t>
+              <a:t>Automotive as an OpenMP Application</a:t>
             </a:r>
           </a:p>
         </p:txBody>
@@ -8674,8 +9629,8 @@
               <a:buAutoNum type="arabicPeriod"/>
             </a:pPr>
             <a:r>
-              <a:rPr lang="de-DE" sz="2400"/>
-              <a:t>Ein Automobil hat immer mehr Software-Aufgaben</a:t>
+              <a:rPr lang="en-US" sz="2400" dirty="0"/>
+              <a:t>A vehicle has an increasing amount of software tasks</a:t>
             </a:r>
           </a:p>
           <a:p>
@@ -8683,7 +9638,7 @@
               <a:buFont typeface="+mj-lt"/>
               <a:buAutoNum type="arabicPeriod"/>
             </a:pPr>
-            <a:endParaRPr lang="de-DE" sz="2400"/>
+            <a:endParaRPr lang="en-US" sz="2400" dirty="0"/>
           </a:p>
           <a:p>
             <a:pPr marL="514350" indent="-514350">
@@ -8691,8 +9646,8 @@
               <a:buAutoNum type="arabicPeriod"/>
             </a:pPr>
             <a:r>
-              <a:rPr lang="de-DE" sz="2400"/>
-              <a:t>C/C++ sind in HW-nähe und v.a. auch im Auto Standard</a:t>
+              <a:rPr lang="en-US" sz="2400" dirty="0"/>
+              <a:t>C/C++ are the standard in low-level programming and especially in cars</a:t>
             </a:r>
           </a:p>
           <a:p>
@@ -8700,7 +9655,7 @@
               <a:buFont typeface="+mj-lt"/>
               <a:buAutoNum type="arabicPeriod"/>
             </a:pPr>
-            <a:endParaRPr lang="de-DE" sz="2400"/>
+            <a:endParaRPr lang="en-US" sz="2400" dirty="0"/>
           </a:p>
           <a:p>
             <a:pPr marL="514350" indent="-514350">
@@ -8708,8 +9663,8 @@
               <a:buAutoNum type="arabicPeriod"/>
             </a:pPr>
             <a:r>
-              <a:rPr lang="de-DE" sz="2400"/>
-              <a:t>Die Taktung von Prozessoren kann nicht beliebig erhöht werden</a:t>
+              <a:rPr lang="en-US" sz="2400" dirty="0"/>
+              <a:t>The clock rate of processors cannot be increased at will</a:t>
             </a:r>
           </a:p>
         </p:txBody>
@@ -8729,7 +9684,7 @@
         <p:spPr>
           <a:xfrm>
             <a:off x="2843652" y="5569710"/>
-            <a:ext cx="4264757" cy="646331"/>
+            <a:ext cx="4216667" cy="646331"/>
           </a:xfrm>
           <a:prstGeom prst="rect">
             <a:avLst/>
@@ -8746,7 +9701,7 @@
               <a:rPr lang="de-DE" sz="3600" dirty="0">
                 <a:sym typeface="Wingdings" pitchFamily="2" charset="2"/>
               </a:rPr>
-              <a:t> Multicore-Systeme</a:t>
+              <a:t> Multicore Systems</a:t>
             </a:r>
             <a:endParaRPr lang="de-DE" sz="3600" dirty="0"/>
           </a:p>
@@ -9096,14 +10051,14 @@
           <a:p>
             <a:pPr algn="r"/>
             <a:r>
-              <a:rPr lang="en-US">
+              <a:rPr lang="en-US" dirty="0">
                 <a:solidFill>
                   <a:schemeClr val="accent1"/>
                 </a:solidFill>
               </a:rPr>
-              <a:t>Was ist OpenMP</a:t>
-            </a:r>
-            <a:endParaRPr lang="de-DE">
+              <a:t>What is OpenMP</a:t>
+            </a:r>
+            <a:endParaRPr lang="de-DE" dirty="0">
               <a:solidFill>
                 <a:schemeClr val="accent1"/>
               </a:solidFill>
@@ -9195,32 +10150,32 @@
           <a:lstStyle/>
           <a:p>
             <a:r>
-              <a:rPr lang="de-DE" sz="2400"/>
-              <a:t>Open Specifications for Multi Processing seit 1997</a:t>
-            </a:r>
-          </a:p>
-          <a:p>
-            <a:r>
-              <a:rPr lang="de-DE" sz="2400"/>
-              <a:t>API für Shared-Memory-Programmierung in C ++, C und Fortran</a:t>
-            </a:r>
-          </a:p>
-          <a:p>
-            <a:r>
-              <a:rPr lang="de-DE" sz="2400"/>
-              <a:t>breite Unterstützung von Herstellern</a:t>
-            </a:r>
-          </a:p>
-          <a:p>
-            <a:r>
-              <a:rPr lang="de-DE" sz="2400"/>
-              <a:t>nicht anwendbar auf Systemen mit verteiltem Speicher</a:t>
-            </a:r>
-          </a:p>
-          <a:p>
-            <a:r>
-              <a:rPr lang="de-DE" sz="2400"/>
-              <a:t>keine Laufzeitüberprüfung hinsichtlich Korrektheit der Direktiven </a:t>
+              <a:rPr lang="en-US" sz="2400" dirty="0"/>
+              <a:t>Open Specifications for Multiprocessing since 1997</a:t>
+            </a:r>
+          </a:p>
+          <a:p>
+            <a:r>
+              <a:rPr lang="en-US" sz="2400" dirty="0"/>
+              <a:t>API for Shared-Memory programming in C++, C and Fortran</a:t>
+            </a:r>
+          </a:p>
+          <a:p>
+            <a:r>
+              <a:rPr lang="en-US" sz="2400" dirty="0"/>
+              <a:t>Broadly supported by compiler manufacturers</a:t>
+            </a:r>
+          </a:p>
+          <a:p>
+            <a:r>
+              <a:rPr lang="en-US" sz="2400" dirty="0"/>
+              <a:t>Not applicable on systems with distributed memory architectures</a:t>
+            </a:r>
+          </a:p>
+          <a:p>
+            <a:r>
+              <a:rPr lang="en-US" sz="2400" dirty="0"/>
+              <a:t>No runtime checks regarding the correctness of the directives</a:t>
             </a:r>
           </a:p>
         </p:txBody>
@@ -9451,10 +10406,10 @@
           <a:lstStyle/>
           <a:p>
             <a:r>
-              <a:rPr lang="en-US" sz="3200"/>
-              <a:t>Anwendung</a:t>
-            </a:r>
-            <a:endParaRPr lang="de-DE" sz="3200"/>
+              <a:rPr lang="en-US" sz="3200" dirty="0"/>
+              <a:t>Application</a:t>
+            </a:r>
+            <a:endParaRPr lang="de-DE" sz="3200" dirty="0"/>
           </a:p>
         </p:txBody>
       </p:sp>
@@ -9613,8 +10568,8 @@
         </p:nvSpPr>
         <p:spPr>
           <a:xfrm>
-            <a:off x="5351164" y="586822"/>
-            <a:ext cx="6002636" cy="1645920"/>
+            <a:off x="5351164" y="694398"/>
+            <a:ext cx="6002636" cy="1463040"/>
           </a:xfrm>
         </p:spPr>
         <p:txBody>
@@ -9624,25 +10579,30 @@
           <a:lstStyle/>
           <a:p>
             <a:r>
-              <a:rPr lang="de-DE" sz="1800"/>
-              <a:t>OpenMP relevanten Pragmas: #pragma omp</a:t>
-            </a:r>
-          </a:p>
-          <a:p>
-            <a:r>
-              <a:rPr lang="de-DE" sz="1800"/>
-              <a:t>Pragmas werden von Compilern ohne OpenMP-Unterstützung ignoriert</a:t>
-            </a:r>
-          </a:p>
-          <a:p>
-            <a:r>
-              <a:rPr lang="de-DE" sz="1800"/>
-              <a:t>OpenMP-Direktive bezieht sich immer auf den nachfolgenden strukturierten Block</a:t>
+              <a:rPr lang="en-US" sz="1800" dirty="0"/>
+              <a:t>OpenMP relevant Pragmas: #pragma </a:t>
+            </a:r>
+            <a:r>
+              <a:rPr lang="en-US" sz="1800" dirty="0" err="1"/>
+              <a:t>omp</a:t>
+            </a:r>
+            <a:endParaRPr lang="en-US" sz="1800" dirty="0"/>
+          </a:p>
+          <a:p>
+            <a:r>
+              <a:rPr lang="en-US" sz="1800" dirty="0"/>
+              <a:t>Pragmas are ignored by compilers without OpenMP support</a:t>
+            </a:r>
+          </a:p>
+          <a:p>
+            <a:r>
+              <a:rPr lang="en-US" sz="1800" dirty="0"/>
+              <a:t>OpenMP directives are associated with the following structural block</a:t>
             </a:r>
           </a:p>
           <a:p>
             <a:pPr lvl="1"/>
-            <a:endParaRPr lang="de-DE" sz="1800"/>
+            <a:endParaRPr lang="en-US" sz="1800" dirty="0"/>
           </a:p>
         </p:txBody>
       </p:sp>
@@ -9742,10 +10702,10 @@
           <a:lstStyle/>
           <a:p>
             <a:r>
-              <a:rPr lang="en-US" sz="3600"/>
-              <a:t>Fork/Join Modell </a:t>
-            </a:r>
-            <a:endParaRPr lang="de-DE" sz="3600"/>
+              <a:rPr lang="en-US" sz="3600" dirty="0"/>
+              <a:t>Fork/Join Model </a:t>
+            </a:r>
+            <a:endParaRPr lang="de-DE" sz="3600" dirty="0"/>
           </a:p>
         </p:txBody>
       </p:sp>
@@ -10002,14 +10962,14 @@
           <a:lstStyle/>
           <a:p>
             <a:r>
-              <a:rPr lang="de-DE" sz="2000"/>
-              <a:t>Startet als einzelner Thread (master)</a:t>
-            </a:r>
-          </a:p>
-          <a:p>
-            <a:r>
-              <a:rPr lang="de-DE" sz="2000"/>
-              <a:t>Weitere Threads warden durch parallele Regionen erzeugt</a:t>
+              <a:rPr lang="en-US" sz="2000" dirty="0"/>
+              <a:t>Starts as a single thread (master)</a:t>
+            </a:r>
+          </a:p>
+          <a:p>
+            <a:r>
+              <a:rPr lang="en-US" sz="2000" dirty="0"/>
+              <a:t>Additional thread are created through regions</a:t>
             </a:r>
           </a:p>
         </p:txBody>
@@ -10147,14 +11107,14 @@
           <a:lstStyle/>
           <a:p>
             <a:r>
-              <a:rPr lang="en-US" sz="3200">
+              <a:rPr lang="en-US" sz="3200" dirty="0">
                 <a:solidFill>
                   <a:schemeClr val="bg1"/>
                 </a:solidFill>
               </a:rPr>
-              <a:t>Datenumgebung</a:t>
-            </a:r>
-            <a:endParaRPr lang="de-DE" sz="3200">
+              <a:t>Data environment</a:t>
+            </a:r>
+            <a:endParaRPr lang="de-DE" sz="3200" dirty="0">
               <a:solidFill>
                 <a:schemeClr val="bg1"/>
               </a:solidFill>
@@ -10251,62 +11211,38 @@
           <a:lstStyle/>
           <a:p>
             <a:r>
-              <a:rPr lang="de-DE" sz="2000" dirty="0">
+              <a:rPr lang="en-US" sz="2000" dirty="0">
                 <a:solidFill>
                   <a:schemeClr val="bg1"/>
                 </a:solidFill>
               </a:rPr>
-              <a:t>Daten werden unterteilt in:</a:t>
+              <a:t>Data is divided into sections:</a:t>
             </a:r>
           </a:p>
           <a:p>
             <a:pPr lvl="1"/>
             <a:r>
-              <a:rPr lang="de-DE" sz="2000" dirty="0">
+              <a:rPr lang="en-US" sz="2000" dirty="0">
                 <a:solidFill>
                   <a:schemeClr val="bg1"/>
                 </a:solidFill>
               </a:rPr>
-              <a:t>private Data</a:t>
+              <a:t>Private Data</a:t>
             </a:r>
           </a:p>
           <a:p>
             <a:pPr lvl="1"/>
             <a:r>
-              <a:rPr lang="de-DE" sz="2000" dirty="0" err="1">
+              <a:rPr lang="en-US" sz="2000" dirty="0">
                 <a:solidFill>
                   <a:schemeClr val="bg1"/>
                 </a:solidFill>
               </a:rPr>
-              <a:t>Shared</a:t>
-            </a:r>
-            <a:r>
-              <a:rPr lang="de-DE" sz="2000" dirty="0">
-                <a:solidFill>
-                  <a:schemeClr val="bg1"/>
-                </a:solidFill>
-              </a:rPr>
-              <a:t> Data (</a:t>
-            </a:r>
-            <a:r>
-              <a:rPr lang="de-DE" sz="2000" dirty="0" err="1">
-                <a:solidFill>
-                  <a:schemeClr val="bg1"/>
-                </a:solidFill>
-              </a:rPr>
-              <a:t>default</a:t>
-            </a:r>
-            <a:r>
-              <a:rPr lang="de-DE" sz="2000" dirty="0">
-                <a:solidFill>
-                  <a:schemeClr val="bg1"/>
-                </a:solidFill>
-              </a:rPr>
-              <a:t>)</a:t>
-            </a:r>
-          </a:p>
-          <a:p>
-            <a:endParaRPr lang="de-DE" sz="2000" dirty="0">
+              <a:t>Shared Data (default)</a:t>
+            </a:r>
+          </a:p>
+          <a:p>
+            <a:endParaRPr lang="en-US" sz="2000" dirty="0">
               <a:solidFill>
                 <a:schemeClr val="bg1"/>
               </a:solidFill>

</xml_diff>

<commit_message>
Folien übersetzt Übung 1 angepasst
</commit_message>
<xml_diff>
--- a/OpenMP_Folien.pptx
+++ b/OpenMP_Folien.pptx
@@ -5,7 +5,7 @@
     <p:sldMasterId id="2147483648" r:id="rId1"/>
   </p:sldMasterIdLst>
   <p:notesMasterIdLst>
-    <p:notesMasterId r:id="rId21"/>
+    <p:notesMasterId r:id="rId23"/>
   </p:notesMasterIdLst>
   <p:sldIdLst>
     <p:sldId id="256" r:id="rId2"/>
@@ -20,13 +20,15 @@
     <p:sldId id="266" r:id="rId11"/>
     <p:sldId id="261" r:id="rId12"/>
     <p:sldId id="262" r:id="rId13"/>
-    <p:sldId id="263" r:id="rId14"/>
-    <p:sldId id="264" r:id="rId15"/>
-    <p:sldId id="265" r:id="rId16"/>
-    <p:sldId id="267" r:id="rId17"/>
-    <p:sldId id="268" r:id="rId18"/>
-    <p:sldId id="269" r:id="rId19"/>
-    <p:sldId id="275" r:id="rId20"/>
+    <p:sldId id="276" r:id="rId14"/>
+    <p:sldId id="277" r:id="rId15"/>
+    <p:sldId id="263" r:id="rId16"/>
+    <p:sldId id="264" r:id="rId17"/>
+    <p:sldId id="265" r:id="rId18"/>
+    <p:sldId id="267" r:id="rId19"/>
+    <p:sldId id="268" r:id="rId20"/>
+    <p:sldId id="269" r:id="rId21"/>
+    <p:sldId id="275" r:id="rId22"/>
   </p:sldIdLst>
   <p:sldSz cx="12192000" cy="6858000"/>
   <p:notesSz cx="6858000" cy="9144000"/>
@@ -215,7 +217,7 @@
           <a:p>
             <a:fld id="{AD5FCB38-51A2-4D62-8717-5BE0EDC2993F}" type="datetimeFigureOut">
               <a:rPr lang="de-DE" smtClean="0"/>
-              <a:t>12.02.2020</a:t>
+              <a:t>13.02.20</a:t>
             </a:fld>
             <a:endParaRPr lang="de-DE"/>
           </a:p>
@@ -526,7 +528,95 @@
           <a:bodyPr/>
           <a:lstStyle/>
           <a:p>
-            <a:endParaRPr lang="de-DE" dirty="0"/>
+            <a:r>
+              <a:rPr lang="de-DE" sz="1200" b="0" kern="1200" dirty="0">
+                <a:solidFill>
+                  <a:schemeClr val="tx1"/>
+                </a:solidFill>
+                <a:effectLst/>
+                <a:latin typeface="+mn-lt"/>
+                <a:ea typeface="+mn-ea"/>
+                <a:cs typeface="+mn-cs"/>
+              </a:rPr>
+              <a:t>C ist Standard und die HW-nähe ist durchaus praktisch und effizient. Sehr explizit. Parallelität verlangt dadurch allerdings einiges, weil keine Abstraktion.</a:t>
+            </a:r>
+          </a:p>
+          <a:p>
+            <a:endParaRPr lang="de-DE" sz="1200" b="0" kern="1200" dirty="0">
+              <a:solidFill>
+                <a:schemeClr val="tx1"/>
+              </a:solidFill>
+              <a:effectLst/>
+              <a:latin typeface="+mn-lt"/>
+              <a:ea typeface="+mn-ea"/>
+              <a:cs typeface="+mn-cs"/>
+            </a:endParaRPr>
+          </a:p>
+          <a:p>
+            <a:r>
+              <a:rPr lang="de-DE" sz="1200" b="0" kern="1200" dirty="0">
+                <a:solidFill>
+                  <a:schemeClr val="tx1"/>
+                </a:solidFill>
+                <a:effectLst/>
+                <a:latin typeface="+mn-lt"/>
+                <a:ea typeface="+mn-ea"/>
+                <a:cs typeface="+mn-cs"/>
+              </a:rPr>
+              <a:t>Immer mehr (verschiedene) Aufgaben in einem Automobil =&gt; ~80 Steuergeräte in einem Auto und über 1 km CAN-Bus-Kabel!</a:t>
+            </a:r>
+          </a:p>
+          <a:p>
+            <a:endParaRPr lang="de-DE" sz="1200" b="0" kern="1200" dirty="0">
+              <a:solidFill>
+                <a:schemeClr val="tx1"/>
+              </a:solidFill>
+              <a:effectLst/>
+              <a:latin typeface="+mn-lt"/>
+              <a:ea typeface="+mn-ea"/>
+              <a:cs typeface="+mn-cs"/>
+            </a:endParaRPr>
+          </a:p>
+          <a:p>
+            <a:r>
+              <a:rPr lang="de-DE" sz="1200" b="0" kern="1200" dirty="0">
+                <a:solidFill>
+                  <a:schemeClr val="tx1"/>
+                </a:solidFill>
+                <a:effectLst/>
+                <a:latin typeface="+mn-lt"/>
+                <a:ea typeface="+mn-ea"/>
+                <a:cs typeface="+mn-cs"/>
+              </a:rPr>
+              <a:t>Im Auto bietet sich außerdem die moderne Multi-Core-Programmierung mit Threads und </a:t>
+            </a:r>
+            <a:r>
+              <a:rPr lang="de-DE" sz="1200" b="0" kern="1200" dirty="0" err="1">
+                <a:solidFill>
+                  <a:schemeClr val="tx1"/>
+                </a:solidFill>
+                <a:effectLst/>
+                <a:latin typeface="+mn-lt"/>
+                <a:ea typeface="+mn-ea"/>
+                <a:cs typeface="+mn-cs"/>
+              </a:rPr>
+              <a:t>Scheduling</a:t>
+            </a:r>
+            <a:r>
+              <a:rPr lang="de-DE" sz="1200" b="0" kern="1200" dirty="0">
+                <a:solidFill>
+                  <a:schemeClr val="tx1"/>
+                </a:solidFill>
+                <a:effectLst/>
+                <a:latin typeface="+mn-lt"/>
+                <a:ea typeface="+mn-ea"/>
+                <a:cs typeface="+mn-cs"/>
+              </a:rPr>
+              <a:t> an, weil man eben Multicores und Single-Speicher hat. Viele Aufgaben im Auto können (oder sogar müssen) auf die gleichen Daten zugreifen und unterschiedliche Befehle oder Aufgaben ableiten.</a:t>
+            </a:r>
+          </a:p>
+          <a:p>
+            <a:endParaRPr lang="en-US" dirty="0"/>
           </a:p>
         </p:txBody>
       </p:sp>
@@ -547,7 +637,7 @@
           <a:p>
             <a:fld id="{67F32239-C198-46BF-8243-3DEE8544CFAA}" type="slidenum">
               <a:rPr lang="de-DE" smtClean="0"/>
-              <a:t>4</a:t>
+              <a:t>2</a:t>
             </a:fld>
             <a:endParaRPr lang="de-DE"/>
           </a:p>
@@ -556,7 +646,7 @@
     </p:spTree>
     <p:extLst>
       <p:ext uri="{BB962C8B-B14F-4D97-AF65-F5344CB8AC3E}">
-        <p14:creationId xmlns:p14="http://schemas.microsoft.com/office/powerpoint/2010/main" val="1980002554"/>
+        <p14:creationId xmlns:p14="http://schemas.microsoft.com/office/powerpoint/2010/main" val="2603510932"/>
       </p:ext>
     </p:extLst>
   </p:cSld>
@@ -610,6 +700,258 @@
           <a:bodyPr/>
           <a:lstStyle/>
           <a:p>
+            <a:endParaRPr lang="de-DE" dirty="0"/>
+          </a:p>
+        </p:txBody>
+      </p:sp>
+      <p:sp>
+        <p:nvSpPr>
+          <p:cNvPr id="4" name="Foliennummernplatzhalter 3"/>
+          <p:cNvSpPr>
+            <a:spLocks noGrp="1"/>
+          </p:cNvSpPr>
+          <p:nvPr>
+            <p:ph type="sldNum" sz="quarter" idx="5"/>
+          </p:nvPr>
+        </p:nvSpPr>
+        <p:spPr/>
+        <p:txBody>
+          <a:bodyPr/>
+          <a:lstStyle/>
+          <a:p>
+            <a:fld id="{67F32239-C198-46BF-8243-3DEE8544CFAA}" type="slidenum">
+              <a:rPr lang="de-DE" smtClean="0"/>
+              <a:t>14</a:t>
+            </a:fld>
+            <a:endParaRPr lang="de-DE"/>
+          </a:p>
+        </p:txBody>
+      </p:sp>
+    </p:spTree>
+    <p:extLst>
+      <p:ext uri="{BB962C8B-B14F-4D97-AF65-F5344CB8AC3E}">
+        <p14:creationId xmlns:p14="http://schemas.microsoft.com/office/powerpoint/2010/main" val="1617195851"/>
+      </p:ext>
+    </p:extLst>
+  </p:cSld>
+  <p:clrMapOvr>
+    <a:masterClrMapping/>
+  </p:clrMapOvr>
+</p:notes>
+</file>
+
+<file path=ppt/notesSlides/notesSlide11.xml><?xml version="1.0" encoding="utf-8"?>
+<p:notes xmlns:a="http://schemas.openxmlformats.org/drawingml/2006/main" xmlns:r="http://schemas.openxmlformats.org/officeDocument/2006/relationships" xmlns:p="http://schemas.openxmlformats.org/presentationml/2006/main">
+  <p:cSld>
+    <p:spTree>
+      <p:nvGrpSpPr>
+        <p:cNvPr id="1" name=""/>
+        <p:cNvGrpSpPr/>
+        <p:nvPr/>
+      </p:nvGrpSpPr>
+      <p:grpSpPr>
+        <a:xfrm>
+          <a:off x="0" y="0"/>
+          <a:ext cx="0" cy="0"/>
+          <a:chOff x="0" y="0"/>
+          <a:chExt cx="0" cy="0"/>
+        </a:xfrm>
+      </p:grpSpPr>
+      <p:sp>
+        <p:nvSpPr>
+          <p:cNvPr id="2" name="Folienbildplatzhalter 1"/>
+          <p:cNvSpPr>
+            <a:spLocks noGrp="1" noRot="1" noChangeAspect="1"/>
+          </p:cNvSpPr>
+          <p:nvPr>
+            <p:ph type="sldImg"/>
+          </p:nvPr>
+        </p:nvSpPr>
+        <p:spPr/>
+      </p:sp>
+      <p:sp>
+        <p:nvSpPr>
+          <p:cNvPr id="3" name="Notizenplatzhalter 2"/>
+          <p:cNvSpPr>
+            <a:spLocks noGrp="1"/>
+          </p:cNvSpPr>
+          <p:nvPr>
+            <p:ph type="body" idx="1"/>
+          </p:nvPr>
+        </p:nvSpPr>
+        <p:spPr/>
+        <p:txBody>
+          <a:bodyPr/>
+          <a:lstStyle/>
+          <a:p>
+            <a:endParaRPr lang="de-DE" dirty="0"/>
+          </a:p>
+        </p:txBody>
+      </p:sp>
+      <p:sp>
+        <p:nvSpPr>
+          <p:cNvPr id="4" name="Foliennummernplatzhalter 3"/>
+          <p:cNvSpPr>
+            <a:spLocks noGrp="1"/>
+          </p:cNvSpPr>
+          <p:nvPr>
+            <p:ph type="sldNum" sz="quarter" idx="5"/>
+          </p:nvPr>
+        </p:nvSpPr>
+        <p:spPr/>
+        <p:txBody>
+          <a:bodyPr/>
+          <a:lstStyle/>
+          <a:p>
+            <a:fld id="{67F32239-C198-46BF-8243-3DEE8544CFAA}" type="slidenum">
+              <a:rPr lang="de-DE" smtClean="0"/>
+              <a:t>17</a:t>
+            </a:fld>
+            <a:endParaRPr lang="de-DE"/>
+          </a:p>
+        </p:txBody>
+      </p:sp>
+    </p:spTree>
+    <p:extLst>
+      <p:ext uri="{BB962C8B-B14F-4D97-AF65-F5344CB8AC3E}">
+        <p14:creationId xmlns:p14="http://schemas.microsoft.com/office/powerpoint/2010/main" val="1955124107"/>
+      </p:ext>
+    </p:extLst>
+  </p:cSld>
+  <p:clrMapOvr>
+    <a:masterClrMapping/>
+  </p:clrMapOvr>
+</p:notes>
+</file>
+
+<file path=ppt/notesSlides/notesSlide12.xml><?xml version="1.0" encoding="utf-8"?>
+<p:notes xmlns:a="http://schemas.openxmlformats.org/drawingml/2006/main" xmlns:r="http://schemas.openxmlformats.org/officeDocument/2006/relationships" xmlns:p="http://schemas.openxmlformats.org/presentationml/2006/main">
+  <p:cSld>
+    <p:spTree>
+      <p:nvGrpSpPr>
+        <p:cNvPr id="1" name=""/>
+        <p:cNvGrpSpPr/>
+        <p:nvPr/>
+      </p:nvGrpSpPr>
+      <p:grpSpPr>
+        <a:xfrm>
+          <a:off x="0" y="0"/>
+          <a:ext cx="0" cy="0"/>
+          <a:chOff x="0" y="0"/>
+          <a:chExt cx="0" cy="0"/>
+        </a:xfrm>
+      </p:grpSpPr>
+      <p:sp>
+        <p:nvSpPr>
+          <p:cNvPr id="2" name="Folienbildplatzhalter 1"/>
+          <p:cNvSpPr>
+            <a:spLocks noGrp="1" noRot="1" noChangeAspect="1"/>
+          </p:cNvSpPr>
+          <p:nvPr>
+            <p:ph type="sldImg"/>
+          </p:nvPr>
+        </p:nvSpPr>
+        <p:spPr/>
+      </p:sp>
+      <p:sp>
+        <p:nvSpPr>
+          <p:cNvPr id="3" name="Notizenplatzhalter 2"/>
+          <p:cNvSpPr>
+            <a:spLocks noGrp="1"/>
+          </p:cNvSpPr>
+          <p:nvPr>
+            <p:ph type="body" idx="1"/>
+          </p:nvPr>
+        </p:nvSpPr>
+        <p:spPr/>
+        <p:txBody>
+          <a:bodyPr/>
+          <a:lstStyle/>
+          <a:p>
+            <a:endParaRPr lang="de-DE" dirty="0"/>
+          </a:p>
+        </p:txBody>
+      </p:sp>
+      <p:sp>
+        <p:nvSpPr>
+          <p:cNvPr id="4" name="Foliennummernplatzhalter 3"/>
+          <p:cNvSpPr>
+            <a:spLocks noGrp="1"/>
+          </p:cNvSpPr>
+          <p:nvPr>
+            <p:ph type="sldNum" sz="quarter" idx="5"/>
+          </p:nvPr>
+        </p:nvSpPr>
+        <p:spPr/>
+        <p:txBody>
+          <a:bodyPr/>
+          <a:lstStyle/>
+          <a:p>
+            <a:fld id="{67F32239-C198-46BF-8243-3DEE8544CFAA}" type="slidenum">
+              <a:rPr lang="de-DE" smtClean="0"/>
+              <a:t>19</a:t>
+            </a:fld>
+            <a:endParaRPr lang="de-DE"/>
+          </a:p>
+        </p:txBody>
+      </p:sp>
+    </p:spTree>
+    <p:extLst>
+      <p:ext uri="{BB962C8B-B14F-4D97-AF65-F5344CB8AC3E}">
+        <p14:creationId xmlns:p14="http://schemas.microsoft.com/office/powerpoint/2010/main" val="1307838226"/>
+      </p:ext>
+    </p:extLst>
+  </p:cSld>
+  <p:clrMapOvr>
+    <a:masterClrMapping/>
+  </p:clrMapOvr>
+</p:notes>
+</file>
+
+<file path=ppt/notesSlides/notesSlide13.xml><?xml version="1.0" encoding="utf-8"?>
+<p:notes xmlns:a="http://schemas.openxmlformats.org/drawingml/2006/main" xmlns:r="http://schemas.openxmlformats.org/officeDocument/2006/relationships" xmlns:p="http://schemas.openxmlformats.org/presentationml/2006/main">
+  <p:cSld>
+    <p:spTree>
+      <p:nvGrpSpPr>
+        <p:cNvPr id="1" name=""/>
+        <p:cNvGrpSpPr/>
+        <p:nvPr/>
+      </p:nvGrpSpPr>
+      <p:grpSpPr>
+        <a:xfrm>
+          <a:off x="0" y="0"/>
+          <a:ext cx="0" cy="0"/>
+          <a:chOff x="0" y="0"/>
+          <a:chExt cx="0" cy="0"/>
+        </a:xfrm>
+      </p:grpSpPr>
+      <p:sp>
+        <p:nvSpPr>
+          <p:cNvPr id="2" name="Folienbildplatzhalter 1"/>
+          <p:cNvSpPr>
+            <a:spLocks noGrp="1" noRot="1" noChangeAspect="1"/>
+          </p:cNvSpPr>
+          <p:nvPr>
+            <p:ph type="sldImg"/>
+          </p:nvPr>
+        </p:nvSpPr>
+        <p:spPr/>
+      </p:sp>
+      <p:sp>
+        <p:nvSpPr>
+          <p:cNvPr id="3" name="Notizenplatzhalter 2"/>
+          <p:cNvSpPr>
+            <a:spLocks noGrp="1"/>
+          </p:cNvSpPr>
+          <p:nvPr>
+            <p:ph type="body" idx="1"/>
+          </p:nvPr>
+        </p:nvSpPr>
+        <p:spPr/>
+        <p:txBody>
+          <a:bodyPr/>
+          <a:lstStyle/>
+          <a:p>
             <a:r>
               <a:rPr lang="de-DE" sz="1200" b="0" i="0" kern="1200" dirty="0" err="1">
                 <a:solidFill>
@@ -1087,7 +1429,7 @@
           <a:p>
             <a:fld id="{67F32239-C198-46BF-8243-3DEE8544CFAA}" type="slidenum">
               <a:rPr lang="de-DE" smtClean="0"/>
-              <a:t>18</a:t>
+              <a:t>20</a:t>
             </a:fld>
             <a:endParaRPr lang="de-DE"/>
           </a:p>
@@ -1150,157 +1492,25 @@
           <a:bodyPr/>
           <a:lstStyle/>
           <a:p>
-            <a:r>
-              <a:rPr lang="en-US" dirty="0" err="1"/>
-              <a:t>Standadisierte</a:t>
-            </a:r>
-            <a:r>
-              <a:rPr lang="en-US" dirty="0"/>
-              <a:t> </a:t>
-            </a:r>
-            <a:r>
-              <a:rPr lang="en-US" dirty="0" err="1"/>
-              <a:t>Programmierschnittstelle</a:t>
-            </a:r>
-            <a:r>
-              <a:rPr lang="en-US" dirty="0"/>
-              <a:t> </a:t>
-            </a:r>
-            <a:r>
-              <a:rPr lang="en-US" dirty="0" err="1"/>
-              <a:t>für</a:t>
-            </a:r>
-            <a:r>
-              <a:rPr lang="en-US" dirty="0"/>
-              <a:t> shared memory </a:t>
-            </a:r>
-            <a:r>
-              <a:rPr lang="en-US" dirty="0" err="1"/>
-              <a:t>programmierung</a:t>
-            </a:r>
-            <a:r>
-              <a:rPr lang="en-US" dirty="0"/>
-              <a:t> in </a:t>
-            </a:r>
-            <a:r>
-              <a:rPr lang="en-US" dirty="0" err="1"/>
-              <a:t>c++</a:t>
-            </a:r>
-            <a:r>
-              <a:rPr lang="en-US" dirty="0"/>
-              <a:t>,c und </a:t>
-            </a:r>
-            <a:r>
-              <a:rPr lang="en-US" dirty="0" err="1"/>
-              <a:t>fortran</a:t>
-            </a:r>
-            <a:r>
-              <a:rPr lang="en-US" dirty="0"/>
-              <a:t> (prog </a:t>
-            </a:r>
-            <a:r>
-              <a:rPr lang="en-US" dirty="0" err="1"/>
-              <a:t>sprache</a:t>
-            </a:r>
-            <a:r>
-              <a:rPr lang="en-US" dirty="0"/>
-              <a:t> </a:t>
-            </a:r>
-            <a:r>
-              <a:rPr lang="en-US" dirty="0" err="1"/>
-              <a:t>ausgelegt</a:t>
-            </a:r>
-            <a:r>
-              <a:rPr lang="en-US" dirty="0"/>
-              <a:t> </a:t>
-            </a:r>
-            <a:r>
-              <a:rPr lang="en-US" dirty="0" err="1"/>
-              <a:t>für</a:t>
-            </a:r>
-            <a:r>
-              <a:rPr lang="en-US" dirty="0"/>
-              <a:t> </a:t>
-            </a:r>
-            <a:r>
-              <a:rPr lang="en-US" dirty="0" err="1"/>
-              <a:t>numerische</a:t>
-            </a:r>
-            <a:r>
-              <a:rPr lang="en-US" dirty="0"/>
-              <a:t> </a:t>
-            </a:r>
-            <a:r>
-              <a:rPr lang="en-US" dirty="0" err="1"/>
-              <a:t>berechnungen</a:t>
-            </a:r>
-            <a:r>
-              <a:rPr lang="en-US" dirty="0"/>
-              <a:t>) </a:t>
-            </a:r>
-            <a:r>
-              <a:rPr lang="en-US" dirty="0" err="1"/>
-              <a:t>seit</a:t>
-            </a:r>
-            <a:r>
-              <a:rPr lang="en-US" dirty="0"/>
-              <a:t> 1997</a:t>
-            </a:r>
-          </a:p>
-          <a:p>
-            <a:r>
-              <a:rPr lang="en-US" dirty="0"/>
-              <a:t>2002: v2.0</a:t>
-            </a:r>
-          </a:p>
-          <a:p>
-            <a:r>
-              <a:rPr lang="en-US" dirty="0"/>
-              <a:t>2008: v3.0</a:t>
-            </a:r>
-          </a:p>
-          <a:p>
-            <a:r>
-              <a:rPr lang="en-US" dirty="0"/>
-              <a:t>2013: v4.0</a:t>
-            </a:r>
-          </a:p>
-          <a:p>
-            <a:r>
-              <a:rPr lang="en-US" dirty="0"/>
-              <a:t>2018: v5.0</a:t>
-            </a:r>
-          </a:p>
-          <a:p>
-            <a:endParaRPr lang="en-US" dirty="0"/>
-          </a:p>
-          <a:p>
-            <a:r>
-              <a:rPr lang="en-US" dirty="0" err="1"/>
-              <a:t>Breite</a:t>
-            </a:r>
-            <a:r>
-              <a:rPr lang="en-US" dirty="0"/>
-              <a:t> </a:t>
-            </a:r>
-            <a:r>
-              <a:rPr lang="en-US" dirty="0" err="1"/>
-              <a:t>Unterstüzung</a:t>
-            </a:r>
-            <a:r>
-              <a:rPr lang="en-US" dirty="0"/>
-              <a:t> von </a:t>
-            </a:r>
-            <a:r>
-              <a:rPr lang="en-US" dirty="0" err="1"/>
-              <a:t>Herstellern</a:t>
-            </a:r>
-            <a:r>
-              <a:rPr lang="en-US" dirty="0"/>
-              <a:t> </a:t>
-            </a:r>
-            <a:r>
-              <a:rPr lang="de-DE" sz="1200" kern="1200" dirty="0">
+            <a:pPr marL="0" marR="0" lvl="0" indent="0" algn="l" defTabSz="914400" rtl="0" eaLnBrk="1" fontAlgn="auto" latinLnBrk="0" hangingPunct="1">
+              <a:lnSpc>
+                <a:spcPct val="100000"/>
+              </a:lnSpc>
+              <a:spcBef>
+                <a:spcPts val="0"/>
+              </a:spcBef>
+              <a:spcAft>
+                <a:spcPts val="0"/>
+              </a:spcAft>
+              <a:buClrTx/>
+              <a:buSzTx/>
+              <a:buFontTx/>
+              <a:buNone/>
+              <a:tabLst/>
+              <a:defRPr/>
+            </a:pPr>
+            <a:r>
+              <a:rPr lang="de-DE" sz="1200" b="0" kern="1200" dirty="0" err="1">
                 <a:solidFill>
                   <a:schemeClr val="tx1"/>
                 </a:solidFill>
@@ -1309,10 +1519,10 @@
                 <a:ea typeface="+mn-ea"/>
                 <a:cs typeface="+mn-cs"/>
               </a:rPr>
-              <a:t>SUN, IBM, Intel, </a:t>
-            </a:r>
-            <a:r>
-              <a:rPr lang="de-DE" sz="1200" kern="1200" dirty="0" err="1">
+              <a:t>OpenMP</a:t>
+            </a:r>
+            <a:r>
+              <a:rPr lang="de-DE" sz="1200" b="0" kern="1200" dirty="0">
                 <a:solidFill>
                   <a:schemeClr val="tx1"/>
                 </a:solidFill>
@@ -1321,167 +1531,11 @@
                 <a:ea typeface="+mn-ea"/>
                 <a:cs typeface="+mn-cs"/>
               </a:rPr>
-              <a:t>Amd</a:t>
-            </a:r>
-            <a:r>
-              <a:rPr lang="de-DE" sz="1200" kern="1200" dirty="0">
-                <a:solidFill>
-                  <a:schemeClr val="tx1"/>
-                </a:solidFill>
-                <a:effectLst/>
-                <a:latin typeface="+mn-lt"/>
-                <a:ea typeface="+mn-ea"/>
-                <a:cs typeface="+mn-cs"/>
-              </a:rPr>
-              <a:t>, Compaq</a:t>
-            </a:r>
-          </a:p>
-          <a:p>
-            <a:endParaRPr lang="de-DE" sz="1200" kern="1200" dirty="0">
-              <a:solidFill>
-                <a:schemeClr val="tx1"/>
-              </a:solidFill>
-              <a:effectLst/>
-              <a:latin typeface="+mn-lt"/>
-              <a:ea typeface="+mn-ea"/>
-              <a:cs typeface="+mn-cs"/>
-            </a:endParaRPr>
-          </a:p>
-          <a:p>
-            <a:r>
-              <a:rPr lang="de-DE" sz="1200" kern="1200" dirty="0">
-                <a:solidFill>
-                  <a:schemeClr val="tx1"/>
-                </a:solidFill>
-                <a:effectLst/>
-                <a:latin typeface="+mn-lt"/>
-                <a:ea typeface="+mn-ea"/>
-                <a:cs typeface="+mn-cs"/>
-              </a:rPr>
-              <a:t>Funktioniert nicht bei </a:t>
-            </a:r>
-            <a:r>
-              <a:rPr lang="de-DE" sz="1200" kern="1200" dirty="0" err="1">
-                <a:solidFill>
-                  <a:schemeClr val="tx1"/>
-                </a:solidFill>
-                <a:effectLst/>
-                <a:latin typeface="+mn-lt"/>
-                <a:ea typeface="+mn-ea"/>
-                <a:cs typeface="+mn-cs"/>
-              </a:rPr>
-              <a:t>systemen</a:t>
-            </a:r>
-            <a:r>
-              <a:rPr lang="de-DE" sz="1200" kern="1200" dirty="0">
-                <a:solidFill>
-                  <a:schemeClr val="tx1"/>
-                </a:solidFill>
-                <a:effectLst/>
-                <a:latin typeface="+mn-lt"/>
-                <a:ea typeface="+mn-ea"/>
-                <a:cs typeface="+mn-cs"/>
-              </a:rPr>
-              <a:t> mit verteiltem </a:t>
-            </a:r>
-            <a:r>
-              <a:rPr lang="de-DE" sz="1200" kern="1200" dirty="0" err="1">
-                <a:solidFill>
-                  <a:schemeClr val="tx1"/>
-                </a:solidFill>
-                <a:effectLst/>
-                <a:latin typeface="+mn-lt"/>
-                <a:ea typeface="+mn-ea"/>
-                <a:cs typeface="+mn-cs"/>
-              </a:rPr>
-              <a:t>speicher</a:t>
-            </a:r>
-            <a:r>
-              <a:rPr lang="de-DE" sz="1200" kern="1200" dirty="0">
-                <a:solidFill>
-                  <a:schemeClr val="tx1"/>
-                </a:solidFill>
-                <a:effectLst/>
-                <a:latin typeface="+mn-lt"/>
-                <a:ea typeface="+mn-ea"/>
-                <a:cs typeface="+mn-cs"/>
-              </a:rPr>
-              <a:t>, warum erkennt man später</a:t>
-            </a:r>
-          </a:p>
-          <a:p>
-            <a:endParaRPr lang="de-DE" sz="1200" kern="1200" dirty="0">
-              <a:solidFill>
-                <a:schemeClr val="tx1"/>
-              </a:solidFill>
-              <a:effectLst/>
-              <a:latin typeface="+mn-lt"/>
-              <a:ea typeface="+mn-ea"/>
-              <a:cs typeface="+mn-cs"/>
-            </a:endParaRPr>
-          </a:p>
-          <a:p>
-            <a:r>
-              <a:rPr lang="de-DE" sz="1200" kern="1200" dirty="0">
-                <a:solidFill>
-                  <a:schemeClr val="tx1"/>
-                </a:solidFill>
-                <a:effectLst/>
-                <a:latin typeface="+mn-lt"/>
-                <a:ea typeface="+mn-ea"/>
-                <a:cs typeface="+mn-cs"/>
-              </a:rPr>
-              <a:t>Keine Überprüfung der </a:t>
-            </a:r>
-            <a:r>
-              <a:rPr lang="de-DE" sz="1200" kern="1200" dirty="0" err="1">
-                <a:solidFill>
-                  <a:schemeClr val="tx1"/>
-                </a:solidFill>
-                <a:effectLst/>
-                <a:latin typeface="+mn-lt"/>
-                <a:ea typeface="+mn-ea"/>
-                <a:cs typeface="+mn-cs"/>
-              </a:rPr>
-              <a:t>genutzen</a:t>
-            </a:r>
-            <a:r>
-              <a:rPr lang="de-DE" sz="1200" kern="1200" dirty="0">
-                <a:solidFill>
-                  <a:schemeClr val="tx1"/>
-                </a:solidFill>
-                <a:effectLst/>
-                <a:latin typeface="+mn-lt"/>
-                <a:ea typeface="+mn-ea"/>
-                <a:cs typeface="+mn-cs"/>
-              </a:rPr>
-              <a:t> direktiven im </a:t>
-            </a:r>
-            <a:r>
-              <a:rPr lang="de-DE" sz="1200" kern="1200" dirty="0" err="1">
-                <a:solidFill>
-                  <a:schemeClr val="tx1"/>
-                </a:solidFill>
-                <a:effectLst/>
-                <a:latin typeface="+mn-lt"/>
-                <a:ea typeface="+mn-ea"/>
-                <a:cs typeface="+mn-cs"/>
-              </a:rPr>
-              <a:t>hinblick</a:t>
-            </a:r>
-            <a:r>
-              <a:rPr lang="de-DE" sz="1200" kern="1200" dirty="0">
-                <a:solidFill>
-                  <a:schemeClr val="tx1"/>
-                </a:solidFill>
-                <a:effectLst/>
-                <a:latin typeface="+mn-lt"/>
-                <a:ea typeface="+mn-ea"/>
-                <a:cs typeface="+mn-cs"/>
-              </a:rPr>
-              <a:t> auf die Korrektheit (Deadlocks, Datenabhängigkeiten) =&gt; man muss wissen was man macht</a:t>
-            </a:r>
-            <a:endParaRPr lang="de-DE" dirty="0"/>
+              <a:t> macht den Einstieg sehr einfach, weil man letztendlich einfach ein paar Präprozessor- und Compiler-Direktiven einfügt und schon Multi-Core Fähigkeit hat.</a:t>
+            </a:r>
+          </a:p>
+          <a:p>
+            <a:endParaRPr lang="en-US" dirty="0"/>
           </a:p>
         </p:txBody>
       </p:sp>
@@ -1502,7 +1556,7 @@
           <a:p>
             <a:fld id="{67F32239-C198-46BF-8243-3DEE8544CFAA}" type="slidenum">
               <a:rPr lang="de-DE" smtClean="0"/>
-              <a:t>6</a:t>
+              <a:t>3</a:t>
             </a:fld>
             <a:endParaRPr lang="de-DE"/>
           </a:p>
@@ -1511,7 +1565,7 @@
     </p:spTree>
     <p:extLst>
       <p:ext uri="{BB962C8B-B14F-4D97-AF65-F5344CB8AC3E}">
-        <p14:creationId xmlns:p14="http://schemas.microsoft.com/office/powerpoint/2010/main" val="810675153"/>
+        <p14:creationId xmlns:p14="http://schemas.microsoft.com/office/powerpoint/2010/main" val="995021617"/>
       </p:ext>
     </p:extLst>
   </p:cSld>
@@ -1565,153 +1619,6 @@
           <a:bodyPr/>
           <a:lstStyle/>
           <a:p>
-            <a:r>
-              <a:rPr lang="en-US" dirty="0" err="1"/>
-              <a:t>OpenMp</a:t>
-            </a:r>
-            <a:r>
-              <a:rPr lang="en-US" dirty="0"/>
-              <a:t> </a:t>
-            </a:r>
-            <a:r>
-              <a:rPr lang="en-US" dirty="0" err="1"/>
-              <a:t>basiert</a:t>
-            </a:r>
-            <a:r>
-              <a:rPr lang="en-US" dirty="0"/>
-              <a:t> auf </a:t>
-            </a:r>
-            <a:r>
-              <a:rPr lang="en-US" dirty="0" err="1"/>
-              <a:t>direktiven</a:t>
-            </a:r>
-            <a:r>
-              <a:rPr lang="en-US" dirty="0"/>
-              <a:t> </a:t>
-            </a:r>
-            <a:r>
-              <a:rPr lang="en-US" dirty="0" err="1"/>
-              <a:t>oder</a:t>
-            </a:r>
-            <a:r>
-              <a:rPr lang="en-US" dirty="0"/>
-              <a:t> </a:t>
-            </a:r>
-            <a:r>
-              <a:rPr lang="en-US" dirty="0" err="1"/>
-              <a:t>auch</a:t>
-            </a:r>
-            <a:r>
-              <a:rPr lang="en-US" dirty="0"/>
-              <a:t> pragmas</a:t>
-            </a:r>
-          </a:p>
-          <a:p>
-            <a:r>
-              <a:rPr lang="en-US" dirty="0" err="1"/>
-              <a:t>Diese</a:t>
-            </a:r>
-            <a:r>
-              <a:rPr lang="en-US" dirty="0"/>
-              <a:t> </a:t>
-            </a:r>
-            <a:r>
-              <a:rPr lang="en-US" dirty="0" err="1"/>
-              <a:t>geben</a:t>
-            </a:r>
-            <a:r>
-              <a:rPr lang="en-US" dirty="0"/>
-              <a:t> </a:t>
-            </a:r>
-            <a:r>
-              <a:rPr lang="en-US" dirty="0" err="1"/>
-              <a:t>Instruktionen</a:t>
-            </a:r>
-            <a:r>
-              <a:rPr lang="en-US" dirty="0"/>
-              <a:t> an den Compiler, </a:t>
-            </a:r>
-            <a:r>
-              <a:rPr lang="en-US" dirty="0" err="1"/>
-              <a:t>wenn</a:t>
-            </a:r>
-            <a:r>
-              <a:rPr lang="en-US" dirty="0"/>
-              <a:t> </a:t>
-            </a:r>
-            <a:r>
-              <a:rPr lang="en-US" dirty="0" err="1"/>
-              <a:t>OpenMp</a:t>
-            </a:r>
-            <a:r>
-              <a:rPr lang="en-US" dirty="0"/>
-              <a:t> </a:t>
-            </a:r>
-            <a:r>
-              <a:rPr lang="en-US" dirty="0" err="1"/>
-              <a:t>unterstützt</a:t>
-            </a:r>
-            <a:r>
-              <a:rPr lang="en-US" dirty="0"/>
-              <a:t> </a:t>
-            </a:r>
-            <a:r>
-              <a:rPr lang="en-US" dirty="0" err="1"/>
-              <a:t>wird</a:t>
-            </a:r>
-            <a:endParaRPr lang="en-US" dirty="0"/>
-          </a:p>
-          <a:p>
-            <a:endParaRPr lang="de-DE" dirty="0"/>
-          </a:p>
-          <a:p>
-            <a:r>
-              <a:rPr lang="de-DE" dirty="0"/>
-              <a:t>Dabei definiert man Kontrollstrukturen die die Parallelisierung beschreiben und auch wie die Daten dabei Synchronisiert </a:t>
-            </a:r>
-            <a:r>
-              <a:rPr lang="de-DE" dirty="0" err="1"/>
-              <a:t>wrden</a:t>
-            </a:r>
-            <a:r>
-              <a:rPr lang="de-DE" dirty="0"/>
-              <a:t> müssen</a:t>
-            </a:r>
-          </a:p>
-          <a:p>
-            <a:endParaRPr lang="de-DE" dirty="0"/>
-          </a:p>
-          <a:p>
-            <a:r>
-              <a:rPr lang="de-DE" dirty="0"/>
-              <a:t>Eine </a:t>
-            </a:r>
-            <a:r>
-              <a:rPr lang="de-DE" dirty="0" err="1"/>
-              <a:t>OpenMp</a:t>
-            </a:r>
-            <a:r>
-              <a:rPr lang="de-DE" dirty="0"/>
-              <a:t> </a:t>
-            </a:r>
-            <a:r>
-              <a:rPr lang="de-DE" dirty="0" err="1"/>
-              <a:t>directive</a:t>
-            </a:r>
-            <a:r>
-              <a:rPr lang="de-DE" dirty="0"/>
-              <a:t> ist immer mit dem darauf folgenden </a:t>
-            </a:r>
-            <a:r>
-              <a:rPr lang="de-DE" dirty="0" err="1"/>
-              <a:t>struktur</a:t>
-            </a:r>
-            <a:r>
-              <a:rPr lang="de-DE" dirty="0"/>
-              <a:t> block verbunden ( außer man klammert)</a:t>
-            </a:r>
-          </a:p>
-          <a:p>
             <a:endParaRPr lang="de-DE" dirty="0"/>
           </a:p>
         </p:txBody>
@@ -1733,7 +1640,7 @@
           <a:p>
             <a:fld id="{67F32239-C198-46BF-8243-3DEE8544CFAA}" type="slidenum">
               <a:rPr lang="de-DE" smtClean="0"/>
-              <a:t>7</a:t>
+              <a:t>4</a:t>
             </a:fld>
             <a:endParaRPr lang="de-DE"/>
           </a:p>
@@ -1742,7 +1649,7 @@
     </p:spTree>
     <p:extLst>
       <p:ext uri="{BB962C8B-B14F-4D97-AF65-F5344CB8AC3E}">
-        <p14:creationId xmlns:p14="http://schemas.microsoft.com/office/powerpoint/2010/main" val="1676947879"/>
+        <p14:creationId xmlns:p14="http://schemas.microsoft.com/office/powerpoint/2010/main" val="1980002554"/>
       </p:ext>
     </p:extLst>
   </p:cSld>
@@ -1797,6 +1704,167 @@
           <a:lstStyle/>
           <a:p>
             <a:r>
+              <a:rPr lang="en-US" dirty="0" err="1"/>
+              <a:t>Standadisierte</a:t>
+            </a:r>
+            <a:r>
+              <a:rPr lang="en-US" dirty="0"/>
+              <a:t> </a:t>
+            </a:r>
+            <a:r>
+              <a:rPr lang="en-US" dirty="0" err="1"/>
+              <a:t>Programmierschnittstelle</a:t>
+            </a:r>
+            <a:r>
+              <a:rPr lang="en-US" dirty="0"/>
+              <a:t> </a:t>
+            </a:r>
+            <a:r>
+              <a:rPr lang="en-US" dirty="0" err="1"/>
+              <a:t>für</a:t>
+            </a:r>
+            <a:r>
+              <a:rPr lang="en-US" dirty="0"/>
+              <a:t> shared memory </a:t>
+            </a:r>
+            <a:r>
+              <a:rPr lang="en-US" dirty="0" err="1"/>
+              <a:t>programmierung</a:t>
+            </a:r>
+            <a:r>
+              <a:rPr lang="en-US" dirty="0"/>
+              <a:t> in </a:t>
+            </a:r>
+            <a:r>
+              <a:rPr lang="en-US" dirty="0" err="1"/>
+              <a:t>c++</a:t>
+            </a:r>
+            <a:r>
+              <a:rPr lang="en-US" dirty="0"/>
+              <a:t>,c und </a:t>
+            </a:r>
+            <a:r>
+              <a:rPr lang="en-US" dirty="0" err="1"/>
+              <a:t>fortran</a:t>
+            </a:r>
+            <a:r>
+              <a:rPr lang="en-US" dirty="0"/>
+              <a:t> (prog </a:t>
+            </a:r>
+            <a:r>
+              <a:rPr lang="en-US" dirty="0" err="1"/>
+              <a:t>sprache</a:t>
+            </a:r>
+            <a:r>
+              <a:rPr lang="en-US" dirty="0"/>
+              <a:t> </a:t>
+            </a:r>
+            <a:r>
+              <a:rPr lang="en-US" dirty="0" err="1"/>
+              <a:t>ausgelegt</a:t>
+            </a:r>
+            <a:r>
+              <a:rPr lang="en-US" dirty="0"/>
+              <a:t> </a:t>
+            </a:r>
+            <a:r>
+              <a:rPr lang="en-US" dirty="0" err="1"/>
+              <a:t>für</a:t>
+            </a:r>
+            <a:r>
+              <a:rPr lang="en-US" dirty="0"/>
+              <a:t> </a:t>
+            </a:r>
+            <a:r>
+              <a:rPr lang="en-US" dirty="0" err="1"/>
+              <a:t>numerische</a:t>
+            </a:r>
+            <a:r>
+              <a:rPr lang="en-US" dirty="0"/>
+              <a:t> </a:t>
+            </a:r>
+            <a:r>
+              <a:rPr lang="en-US" dirty="0" err="1"/>
+              <a:t>berechnungen</a:t>
+            </a:r>
+            <a:r>
+              <a:rPr lang="en-US" dirty="0"/>
+              <a:t>) </a:t>
+            </a:r>
+            <a:r>
+              <a:rPr lang="en-US" dirty="0" err="1"/>
+              <a:t>seit</a:t>
+            </a:r>
+            <a:r>
+              <a:rPr lang="en-US" dirty="0"/>
+              <a:t> 1997</a:t>
+            </a:r>
+          </a:p>
+          <a:p>
+            <a:r>
+              <a:rPr lang="en-US" dirty="0"/>
+              <a:t>2002: v2.0</a:t>
+            </a:r>
+          </a:p>
+          <a:p>
+            <a:r>
+              <a:rPr lang="en-US" dirty="0"/>
+              <a:t>2008: v3.0</a:t>
+            </a:r>
+          </a:p>
+          <a:p>
+            <a:r>
+              <a:rPr lang="en-US" dirty="0"/>
+              <a:t>2013: v4.0</a:t>
+            </a:r>
+          </a:p>
+          <a:p>
+            <a:r>
+              <a:rPr lang="en-US" dirty="0"/>
+              <a:t>2018: v5.0</a:t>
+            </a:r>
+          </a:p>
+          <a:p>
+            <a:endParaRPr lang="en-US" dirty="0"/>
+          </a:p>
+          <a:p>
+            <a:r>
+              <a:rPr lang="en-US" dirty="0" err="1"/>
+              <a:t>Breite</a:t>
+            </a:r>
+            <a:r>
+              <a:rPr lang="en-US" dirty="0"/>
+              <a:t> </a:t>
+            </a:r>
+            <a:r>
+              <a:rPr lang="en-US" dirty="0" err="1"/>
+              <a:t>Unterstüzung</a:t>
+            </a:r>
+            <a:r>
+              <a:rPr lang="en-US" dirty="0"/>
+              <a:t> von </a:t>
+            </a:r>
+            <a:r>
+              <a:rPr lang="en-US" dirty="0" err="1"/>
+              <a:t>Herstellern</a:t>
+            </a:r>
+            <a:r>
+              <a:rPr lang="en-US" dirty="0"/>
+              <a:t> </a:t>
+            </a:r>
+            <a:r>
+              <a:rPr lang="de-DE" sz="1200" kern="1200" dirty="0">
+                <a:solidFill>
+                  <a:schemeClr val="tx1"/>
+                </a:solidFill>
+                <a:effectLst/>
+                <a:latin typeface="+mn-lt"/>
+                <a:ea typeface="+mn-ea"/>
+                <a:cs typeface="+mn-cs"/>
+              </a:rPr>
+              <a:t>SUN, IBM, Intel, </a:t>
+            </a:r>
+            <a:r>
               <a:rPr lang="de-DE" sz="1200" kern="1200" dirty="0" err="1">
                 <a:solidFill>
                   <a:schemeClr val="tx1"/>
@@ -1806,7 +1874,7 @@
                 <a:ea typeface="+mn-ea"/>
                 <a:cs typeface="+mn-cs"/>
               </a:rPr>
-              <a:t>OpenMP</a:t>
+              <a:t>Amd</a:t>
             </a:r>
             <a:r>
               <a:rPr lang="de-DE" sz="1200" kern="1200" dirty="0">
@@ -1818,7 +1886,32 @@
                 <a:ea typeface="+mn-ea"/>
                 <a:cs typeface="+mn-cs"/>
               </a:rPr>
-              <a:t> basiert auf dem </a:t>
+              <a:t>, Compaq</a:t>
+            </a:r>
+          </a:p>
+          <a:p>
+            <a:endParaRPr lang="de-DE" sz="1200" kern="1200" dirty="0">
+              <a:solidFill>
+                <a:schemeClr val="tx1"/>
+              </a:solidFill>
+              <a:effectLst/>
+              <a:latin typeface="+mn-lt"/>
+              <a:ea typeface="+mn-ea"/>
+              <a:cs typeface="+mn-cs"/>
+            </a:endParaRPr>
+          </a:p>
+          <a:p>
+            <a:r>
+              <a:rPr lang="de-DE" sz="1200" kern="1200" dirty="0">
+                <a:solidFill>
+                  <a:schemeClr val="tx1"/>
+                </a:solidFill>
+                <a:effectLst/>
+                <a:latin typeface="+mn-lt"/>
+                <a:ea typeface="+mn-ea"/>
+                <a:cs typeface="+mn-cs"/>
+              </a:rPr>
+              <a:t>Funktioniert nicht bei </a:t>
             </a:r>
             <a:r>
               <a:rPr lang="de-DE" sz="1200" kern="1200" dirty="0" err="1">
@@ -1830,7 +1923,7 @@
                 <a:ea typeface="+mn-ea"/>
                 <a:cs typeface="+mn-cs"/>
               </a:rPr>
-              <a:t>fork</a:t>
+              <a:t>systemen</a:t>
             </a:r>
             <a:r>
               <a:rPr lang="de-DE" sz="1200" kern="1200" dirty="0">
@@ -1842,7 +1935,7 @@
                 <a:ea typeface="+mn-ea"/>
                 <a:cs typeface="+mn-cs"/>
               </a:rPr>
-              <a:t>/</a:t>
+              <a:t> mit verteiltem </a:t>
             </a:r>
             <a:r>
               <a:rPr lang="de-DE" sz="1200" kern="1200" dirty="0" err="1">
@@ -1854,7 +1947,7 @@
                 <a:ea typeface="+mn-ea"/>
                 <a:cs typeface="+mn-cs"/>
               </a:rPr>
-              <a:t>join</a:t>
+              <a:t>speicher</a:t>
             </a:r>
             <a:r>
               <a:rPr lang="de-DE" sz="1200" kern="1200" dirty="0">
@@ -1866,7 +1959,7 @@
                 <a:ea typeface="+mn-ea"/>
                 <a:cs typeface="+mn-cs"/>
               </a:rPr>
-              <a:t> Modell</a:t>
+              <a:t>, warum erkennt man später</a:t>
             </a:r>
           </a:p>
           <a:p>
@@ -1891,7 +1984,7 @@
                 <a:ea typeface="+mn-ea"/>
                 <a:cs typeface="+mn-cs"/>
               </a:rPr>
-              <a:t>Ein </a:t>
+              <a:t>Keine Überprüfung der </a:t>
             </a:r>
             <a:r>
               <a:rPr lang="de-DE" sz="1200" kern="1200" dirty="0" err="1">
@@ -1903,7 +1996,7 @@
                 <a:ea typeface="+mn-ea"/>
                 <a:cs typeface="+mn-cs"/>
               </a:rPr>
-              <a:t>OpenMP</a:t>
+              <a:t>genutzen</a:t>
             </a:r>
             <a:r>
               <a:rPr lang="de-DE" sz="1200" kern="1200" dirty="0">
@@ -1915,7 +2008,7 @@
                 <a:ea typeface="+mn-ea"/>
                 <a:cs typeface="+mn-cs"/>
               </a:rPr>
-              <a:t>-Programm startet als einzelner Thread (</a:t>
+              <a:t> direktiven im </a:t>
             </a:r>
             <a:r>
               <a:rPr lang="de-DE" sz="1200" kern="1200" dirty="0" err="1">
@@ -1927,7 +2020,7 @@
                 <a:ea typeface="+mn-ea"/>
                 <a:cs typeface="+mn-cs"/>
               </a:rPr>
-              <a:t>master</a:t>
+              <a:t>hinblick</a:t>
             </a:r>
             <a:r>
               <a:rPr lang="de-DE" sz="1200" kern="1200" dirty="0">
@@ -1939,154 +2032,7 @@
                 <a:ea typeface="+mn-ea"/>
                 <a:cs typeface="+mn-cs"/>
               </a:rPr>
-              <a:t> </a:t>
-            </a:r>
-            <a:r>
-              <a:rPr lang="de-DE" sz="1200" kern="1200" dirty="0" err="1">
-                <a:solidFill>
-                  <a:schemeClr val="tx1"/>
-                </a:solidFill>
-                <a:effectLst/>
-                <a:latin typeface="+mn-lt"/>
-                <a:ea typeface="+mn-ea"/>
-                <a:cs typeface="+mn-cs"/>
-              </a:rPr>
-              <a:t>thread</a:t>
-            </a:r>
-            <a:r>
-              <a:rPr lang="de-DE" sz="1200" kern="1200" dirty="0">
-                <a:solidFill>
-                  <a:schemeClr val="tx1"/>
-                </a:solidFill>
-                <a:effectLst/>
-                <a:latin typeface="+mn-lt"/>
-                <a:ea typeface="+mn-ea"/>
-                <a:cs typeface="+mn-cs"/>
-              </a:rPr>
-              <a:t>). Weitere Threads (Team) werden durch eine parallele Region erzeugt und am Ende der parallelen Region wieder zurückgegeben</a:t>
-            </a:r>
-          </a:p>
-          <a:p>
-            <a:endParaRPr lang="de-DE" sz="1200" kern="1200" dirty="0">
-              <a:solidFill>
-                <a:schemeClr val="tx1"/>
-              </a:solidFill>
-              <a:effectLst/>
-              <a:latin typeface="+mn-lt"/>
-              <a:ea typeface="+mn-ea"/>
-              <a:cs typeface="+mn-cs"/>
-            </a:endParaRPr>
-          </a:p>
-          <a:p>
-            <a:r>
-              <a:rPr lang="de-DE" sz="1200" kern="1200" dirty="0">
-                <a:solidFill>
-                  <a:schemeClr val="tx1"/>
-                </a:solidFill>
-                <a:effectLst/>
-                <a:latin typeface="+mn-lt"/>
-                <a:ea typeface="+mn-ea"/>
-                <a:cs typeface="+mn-cs"/>
-              </a:rPr>
-              <a:t>Ein Team besteht aus einer festen Anzahl  von Threads, die die parallele Region redundant abarbeiten</a:t>
-            </a:r>
-          </a:p>
-          <a:p>
-            <a:endParaRPr lang="de-DE" sz="1200" kern="1200" dirty="0">
-              <a:solidFill>
-                <a:schemeClr val="tx1"/>
-              </a:solidFill>
-              <a:effectLst/>
-              <a:latin typeface="+mn-lt"/>
-              <a:ea typeface="+mn-ea"/>
-              <a:cs typeface="+mn-cs"/>
-            </a:endParaRPr>
-          </a:p>
-          <a:p>
-            <a:r>
-              <a:rPr lang="de-DE" sz="1200" kern="1200" dirty="0">
-                <a:solidFill>
-                  <a:schemeClr val="tx1"/>
-                </a:solidFill>
-                <a:effectLst/>
-                <a:latin typeface="+mn-lt"/>
-                <a:ea typeface="+mn-ea"/>
-                <a:cs typeface="+mn-cs"/>
-              </a:rPr>
-              <a:t>Am Ende der parallelen Region findet eine Synchronisation aller Threads im Team statt</a:t>
-            </a:r>
-          </a:p>
-          <a:p>
-            <a:endParaRPr lang="de-DE" sz="1200" kern="1200" dirty="0">
-              <a:solidFill>
-                <a:schemeClr val="tx1"/>
-              </a:solidFill>
-              <a:effectLst/>
-              <a:latin typeface="+mn-lt"/>
-              <a:ea typeface="+mn-ea"/>
-              <a:cs typeface="+mn-cs"/>
-            </a:endParaRPr>
-          </a:p>
-          <a:p>
-            <a:r>
-              <a:rPr lang="de-DE" sz="1200" kern="1200" dirty="0">
-                <a:solidFill>
-                  <a:schemeClr val="tx1"/>
-                </a:solidFill>
-                <a:effectLst/>
-                <a:latin typeface="+mn-lt"/>
-                <a:ea typeface="+mn-ea"/>
-                <a:cs typeface="+mn-cs"/>
-              </a:rPr>
-              <a:t>Nach der parallelen Region führt der </a:t>
-            </a:r>
-            <a:r>
-              <a:rPr lang="de-DE" sz="1200" kern="1200" dirty="0" err="1">
-                <a:solidFill>
-                  <a:schemeClr val="tx1"/>
-                </a:solidFill>
-                <a:effectLst/>
-                <a:latin typeface="+mn-lt"/>
-                <a:ea typeface="+mn-ea"/>
-                <a:cs typeface="+mn-cs"/>
-              </a:rPr>
-              <a:t>master</a:t>
-            </a:r>
-            <a:r>
-              <a:rPr lang="de-DE" sz="1200" kern="1200" dirty="0">
-                <a:solidFill>
-                  <a:schemeClr val="tx1"/>
-                </a:solidFill>
-                <a:effectLst/>
-                <a:latin typeface="+mn-lt"/>
-                <a:ea typeface="+mn-ea"/>
-                <a:cs typeface="+mn-cs"/>
-              </a:rPr>
-              <a:t> </a:t>
-            </a:r>
-            <a:r>
-              <a:rPr lang="de-DE" sz="1200" kern="1200" dirty="0" err="1">
-                <a:solidFill>
-                  <a:schemeClr val="tx1"/>
-                </a:solidFill>
-                <a:effectLst/>
-                <a:latin typeface="+mn-lt"/>
-                <a:ea typeface="+mn-ea"/>
-                <a:cs typeface="+mn-cs"/>
-              </a:rPr>
-              <a:t>thread</a:t>
-            </a:r>
-            <a:r>
-              <a:rPr lang="de-DE" sz="1200" kern="1200" dirty="0">
-                <a:solidFill>
-                  <a:schemeClr val="tx1"/>
-                </a:solidFill>
-                <a:effectLst/>
-                <a:latin typeface="+mn-lt"/>
-                <a:ea typeface="+mn-ea"/>
-                <a:cs typeface="+mn-cs"/>
-              </a:rPr>
-              <a:t> den Code (sequentiell) fort</a:t>
+              <a:t> auf die Korrektheit (Deadlocks, Datenabhängigkeiten) =&gt; man muss wissen was man macht</a:t>
             </a:r>
             <a:endParaRPr lang="de-DE" dirty="0"/>
           </a:p>
@@ -2109,7 +2055,7 @@
           <a:p>
             <a:fld id="{67F32239-C198-46BF-8243-3DEE8544CFAA}" type="slidenum">
               <a:rPr lang="de-DE" smtClean="0"/>
-              <a:t>8</a:t>
+              <a:t>6</a:t>
             </a:fld>
             <a:endParaRPr lang="de-DE"/>
           </a:p>
@@ -2118,7 +2064,7 @@
     </p:spTree>
     <p:extLst>
       <p:ext uri="{BB962C8B-B14F-4D97-AF65-F5344CB8AC3E}">
-        <p14:creationId xmlns:p14="http://schemas.microsoft.com/office/powerpoint/2010/main" val="1569336112"/>
+        <p14:creationId xmlns:p14="http://schemas.microsoft.com/office/powerpoint/2010/main" val="810675153"/>
       </p:ext>
     </p:extLst>
   </p:cSld>
@@ -2173,154 +2119,152 @@
           <a:lstStyle/>
           <a:p>
             <a:r>
-              <a:rPr lang="de-DE" sz="1200" kern="1200" dirty="0">
-                <a:solidFill>
-                  <a:schemeClr val="tx1"/>
-                </a:solidFill>
-                <a:effectLst/>
-                <a:latin typeface="+mn-lt"/>
-                <a:ea typeface="+mn-ea"/>
-                <a:cs typeface="+mn-cs"/>
-              </a:rPr>
-              <a:t>Gemeinsame Daten:</a:t>
-            </a:r>
-          </a:p>
-          <a:p>
-            <a:r>
-              <a:rPr lang="de-DE" sz="1200" kern="1200" dirty="0">
-                <a:solidFill>
-                  <a:schemeClr val="tx1"/>
-                </a:solidFill>
-                <a:effectLst/>
-                <a:latin typeface="+mn-lt"/>
-                <a:ea typeface="+mn-ea"/>
-                <a:cs typeface="+mn-cs"/>
-              </a:rPr>
-              <a:t>sind allen Threads bekannt und von diesen zugreifbar</a:t>
-            </a:r>
-          </a:p>
-          <a:p>
-            <a:r>
-              <a:rPr lang="de-DE" sz="1200" kern="1200" dirty="0">
-                <a:solidFill>
-                  <a:schemeClr val="tx1"/>
-                </a:solidFill>
-                <a:effectLst/>
-                <a:latin typeface="+mn-lt"/>
-                <a:ea typeface="+mn-ea"/>
-                <a:cs typeface="+mn-cs"/>
-              </a:rPr>
-              <a:t>alle Threads, die auf diese Daten zugreifen, greifen auf die selbe Speicherstelle zu</a:t>
-            </a:r>
-          </a:p>
-          <a:p>
-            <a:r>
-              <a:rPr lang="de-DE" sz="1200" kern="1200" dirty="0">
-                <a:solidFill>
-                  <a:schemeClr val="tx1"/>
-                </a:solidFill>
-                <a:effectLst/>
-                <a:latin typeface="+mn-lt"/>
-                <a:ea typeface="+mn-ea"/>
-                <a:cs typeface="+mn-cs"/>
-              </a:rPr>
-              <a:t>Threads kommunizieren miteinander oder synchronisieren sich über gemeinsame Daten</a:t>
-            </a:r>
-          </a:p>
-          <a:p>
-            <a:endParaRPr lang="de-DE" sz="1200" kern="1200" dirty="0">
-              <a:solidFill>
-                <a:schemeClr val="tx1"/>
-              </a:solidFill>
-              <a:effectLst/>
-              <a:latin typeface="+mn-lt"/>
-              <a:ea typeface="+mn-ea"/>
-              <a:cs typeface="+mn-cs"/>
-            </a:endParaRPr>
-          </a:p>
-          <a:p>
-            <a:r>
-              <a:rPr lang="de-DE" sz="1200" kern="1200" dirty="0">
-                <a:solidFill>
-                  <a:schemeClr val="tx1"/>
-                </a:solidFill>
-                <a:effectLst/>
-                <a:latin typeface="+mn-lt"/>
-                <a:ea typeface="+mn-ea"/>
-                <a:cs typeface="+mn-cs"/>
-              </a:rPr>
-              <a:t>Private Daten:</a:t>
-            </a:r>
-          </a:p>
-          <a:p>
-            <a:r>
-              <a:rPr lang="de-DE" sz="1200" kern="1200" dirty="0">
-                <a:solidFill>
-                  <a:schemeClr val="tx1"/>
-                </a:solidFill>
-                <a:effectLst/>
-                <a:latin typeface="+mn-lt"/>
-                <a:ea typeface="+mn-ea"/>
-                <a:cs typeface="+mn-cs"/>
-              </a:rPr>
-              <a:t>jeder Thread legt seine eigene private Kopie an</a:t>
-            </a:r>
-          </a:p>
-          <a:p>
-            <a:r>
-              <a:rPr lang="de-DE" sz="1200" kern="1200" dirty="0">
-                <a:solidFill>
-                  <a:schemeClr val="tx1"/>
-                </a:solidFill>
-                <a:effectLst/>
-                <a:latin typeface="+mn-lt"/>
-                <a:ea typeface="+mn-ea"/>
-                <a:cs typeface="+mn-cs"/>
-              </a:rPr>
-              <a:t>jeder Thread greift nur auf seine eigene Speicherstelle in seinem Ausführungskontext zu</a:t>
-            </a:r>
-          </a:p>
-          <a:p>
-            <a:r>
-              <a:rPr lang="de-DE" sz="1200" kern="1200" dirty="0">
-                <a:solidFill>
-                  <a:schemeClr val="tx1"/>
-                </a:solidFill>
-                <a:effectLst/>
-                <a:latin typeface="+mn-lt"/>
-                <a:ea typeface="+mn-ea"/>
-                <a:cs typeface="+mn-cs"/>
-              </a:rPr>
-              <a:t>nicht zugreifbar für andere Threads</a:t>
-            </a:r>
-          </a:p>
-          <a:p>
-            <a:r>
-              <a:rPr lang="de-DE" sz="1200" kern="1200" dirty="0">
-                <a:solidFill>
-                  <a:schemeClr val="tx1"/>
-                </a:solidFill>
-                <a:effectLst/>
-                <a:latin typeface="+mn-lt"/>
-                <a:ea typeface="+mn-ea"/>
-                <a:cs typeface="+mn-cs"/>
-              </a:rPr>
-              <a:t>existiert nur während der Ausführung einer parallelen Region</a:t>
-            </a:r>
-          </a:p>
-          <a:p>
-            <a:r>
-              <a:rPr lang="de-DE" sz="1200" kern="1200" dirty="0">
-                <a:solidFill>
-                  <a:schemeClr val="tx1"/>
-                </a:solidFill>
-                <a:effectLst/>
-                <a:latin typeface="+mn-lt"/>
-                <a:ea typeface="+mn-ea"/>
-                <a:cs typeface="+mn-cs"/>
-              </a:rPr>
-              <a:t>Wert beim Eintritt und Austritt in die parallele Region undefiniert</a:t>
-            </a:r>
+              <a:rPr lang="en-US" dirty="0" err="1"/>
+              <a:t>OpenMp</a:t>
+            </a:r>
+            <a:r>
+              <a:rPr lang="en-US" dirty="0"/>
+              <a:t> </a:t>
+            </a:r>
+            <a:r>
+              <a:rPr lang="en-US" dirty="0" err="1"/>
+              <a:t>basiert</a:t>
+            </a:r>
+            <a:r>
+              <a:rPr lang="en-US" dirty="0"/>
+              <a:t> auf </a:t>
+            </a:r>
+            <a:r>
+              <a:rPr lang="en-US" dirty="0" err="1"/>
+              <a:t>direktiven</a:t>
+            </a:r>
+            <a:r>
+              <a:rPr lang="en-US" dirty="0"/>
+              <a:t> </a:t>
+            </a:r>
+            <a:r>
+              <a:rPr lang="en-US" dirty="0" err="1"/>
+              <a:t>oder</a:t>
+            </a:r>
+            <a:r>
+              <a:rPr lang="en-US" dirty="0"/>
+              <a:t> </a:t>
+            </a:r>
+            <a:r>
+              <a:rPr lang="en-US" dirty="0" err="1"/>
+              <a:t>auch</a:t>
+            </a:r>
+            <a:r>
+              <a:rPr lang="en-US" dirty="0"/>
+              <a:t> pragmas</a:t>
+            </a:r>
+          </a:p>
+          <a:p>
+            <a:r>
+              <a:rPr lang="en-US" dirty="0" err="1"/>
+              <a:t>Diese</a:t>
+            </a:r>
+            <a:r>
+              <a:rPr lang="en-US" dirty="0"/>
+              <a:t> </a:t>
+            </a:r>
+            <a:r>
+              <a:rPr lang="en-US" dirty="0" err="1"/>
+              <a:t>geben</a:t>
+            </a:r>
+            <a:r>
+              <a:rPr lang="en-US" dirty="0"/>
+              <a:t> </a:t>
+            </a:r>
+            <a:r>
+              <a:rPr lang="en-US" dirty="0" err="1"/>
+              <a:t>Instruktionen</a:t>
+            </a:r>
+            <a:r>
+              <a:rPr lang="en-US" dirty="0"/>
+              <a:t> an den Compiler, </a:t>
+            </a:r>
+            <a:r>
+              <a:rPr lang="en-US" dirty="0" err="1"/>
+              <a:t>wenn</a:t>
+            </a:r>
+            <a:r>
+              <a:rPr lang="en-US" dirty="0"/>
+              <a:t> </a:t>
+            </a:r>
+            <a:r>
+              <a:rPr lang="en-US" dirty="0" err="1"/>
+              <a:t>OpenMp</a:t>
+            </a:r>
+            <a:r>
+              <a:rPr lang="en-US" dirty="0"/>
+              <a:t> </a:t>
+            </a:r>
+            <a:r>
+              <a:rPr lang="en-US" dirty="0" err="1"/>
+              <a:t>unterstützt</a:t>
+            </a:r>
+            <a:r>
+              <a:rPr lang="en-US" dirty="0"/>
+              <a:t> </a:t>
+            </a:r>
+            <a:r>
+              <a:rPr lang="en-US" dirty="0" err="1"/>
+              <a:t>wird</a:t>
+            </a:r>
+            <a:endParaRPr lang="en-US" dirty="0"/>
+          </a:p>
+          <a:p>
+            <a:endParaRPr lang="de-DE" dirty="0"/>
+          </a:p>
+          <a:p>
+            <a:r>
+              <a:rPr lang="de-DE" dirty="0"/>
+              <a:t>Dabei definiert man Kontrollstrukturen die die Parallelisierung beschreiben und auch wie die Daten dabei Synchronisiert </a:t>
+            </a:r>
+            <a:r>
+              <a:rPr lang="de-DE" dirty="0" err="1"/>
+              <a:t>wrden</a:t>
+            </a:r>
+            <a:r>
+              <a:rPr lang="de-DE" dirty="0"/>
+              <a:t> müssen</a:t>
+            </a:r>
+          </a:p>
+          <a:p>
+            <a:endParaRPr lang="de-DE" dirty="0"/>
+          </a:p>
+          <a:p>
+            <a:r>
+              <a:rPr lang="de-DE" dirty="0"/>
+              <a:t>Eine </a:t>
+            </a:r>
+            <a:r>
+              <a:rPr lang="de-DE" dirty="0" err="1"/>
+              <a:t>OpenMp</a:t>
+            </a:r>
+            <a:r>
+              <a:rPr lang="de-DE" dirty="0"/>
+              <a:t> </a:t>
+            </a:r>
+            <a:r>
+              <a:rPr lang="de-DE" dirty="0" err="1"/>
+              <a:t>directive</a:t>
+            </a:r>
+            <a:r>
+              <a:rPr lang="de-DE" dirty="0"/>
+              <a:t> ist immer mit dem darauf folgenden </a:t>
+            </a:r>
+            <a:r>
+              <a:rPr lang="de-DE" dirty="0" err="1"/>
+              <a:t>struktur</a:t>
+            </a:r>
+            <a:r>
+              <a:rPr lang="de-DE" dirty="0"/>
+              <a:t> block verbunden ( außer man klammert)</a:t>
+            </a:r>
+          </a:p>
+          <a:p>
             <a:endParaRPr lang="de-DE" dirty="0"/>
           </a:p>
         </p:txBody>
@@ -2342,7 +2286,7 @@
           <a:p>
             <a:fld id="{67F32239-C198-46BF-8243-3DEE8544CFAA}" type="slidenum">
               <a:rPr lang="de-DE" smtClean="0"/>
-              <a:t>9</a:t>
+              <a:t>7</a:t>
             </a:fld>
             <a:endParaRPr lang="de-DE"/>
           </a:p>
@@ -2351,7 +2295,7 @@
     </p:spTree>
     <p:extLst>
       <p:ext uri="{BB962C8B-B14F-4D97-AF65-F5344CB8AC3E}">
-        <p14:creationId xmlns:p14="http://schemas.microsoft.com/office/powerpoint/2010/main" val="1659285144"/>
+        <p14:creationId xmlns:p14="http://schemas.microsoft.com/office/powerpoint/2010/main" val="1676947879"/>
       </p:ext>
     </p:extLst>
   </p:cSld>
@@ -2405,6 +2349,298 @@
           <a:bodyPr/>
           <a:lstStyle/>
           <a:p>
+            <a:r>
+              <a:rPr lang="de-DE" sz="1200" kern="1200" dirty="0" err="1">
+                <a:solidFill>
+                  <a:schemeClr val="tx1"/>
+                </a:solidFill>
+                <a:effectLst/>
+                <a:latin typeface="+mn-lt"/>
+                <a:ea typeface="+mn-ea"/>
+                <a:cs typeface="+mn-cs"/>
+              </a:rPr>
+              <a:t>OpenMP</a:t>
+            </a:r>
+            <a:r>
+              <a:rPr lang="de-DE" sz="1200" kern="1200" dirty="0">
+                <a:solidFill>
+                  <a:schemeClr val="tx1"/>
+                </a:solidFill>
+                <a:effectLst/>
+                <a:latin typeface="+mn-lt"/>
+                <a:ea typeface="+mn-ea"/>
+                <a:cs typeface="+mn-cs"/>
+              </a:rPr>
+              <a:t> basiert auf dem </a:t>
+            </a:r>
+            <a:r>
+              <a:rPr lang="de-DE" sz="1200" kern="1200" dirty="0" err="1">
+                <a:solidFill>
+                  <a:schemeClr val="tx1"/>
+                </a:solidFill>
+                <a:effectLst/>
+                <a:latin typeface="+mn-lt"/>
+                <a:ea typeface="+mn-ea"/>
+                <a:cs typeface="+mn-cs"/>
+              </a:rPr>
+              <a:t>fork</a:t>
+            </a:r>
+            <a:r>
+              <a:rPr lang="de-DE" sz="1200" kern="1200" dirty="0">
+                <a:solidFill>
+                  <a:schemeClr val="tx1"/>
+                </a:solidFill>
+                <a:effectLst/>
+                <a:latin typeface="+mn-lt"/>
+                <a:ea typeface="+mn-ea"/>
+                <a:cs typeface="+mn-cs"/>
+              </a:rPr>
+              <a:t>/</a:t>
+            </a:r>
+            <a:r>
+              <a:rPr lang="de-DE" sz="1200" kern="1200" dirty="0" err="1">
+                <a:solidFill>
+                  <a:schemeClr val="tx1"/>
+                </a:solidFill>
+                <a:effectLst/>
+                <a:latin typeface="+mn-lt"/>
+                <a:ea typeface="+mn-ea"/>
+                <a:cs typeface="+mn-cs"/>
+              </a:rPr>
+              <a:t>join</a:t>
+            </a:r>
+            <a:r>
+              <a:rPr lang="de-DE" sz="1200" kern="1200" dirty="0">
+                <a:solidFill>
+                  <a:schemeClr val="tx1"/>
+                </a:solidFill>
+                <a:effectLst/>
+                <a:latin typeface="+mn-lt"/>
+                <a:ea typeface="+mn-ea"/>
+                <a:cs typeface="+mn-cs"/>
+              </a:rPr>
+              <a:t> Modell</a:t>
+            </a:r>
+          </a:p>
+          <a:p>
+            <a:endParaRPr lang="de-DE" sz="1200" kern="1200" dirty="0">
+              <a:solidFill>
+                <a:schemeClr val="tx1"/>
+              </a:solidFill>
+              <a:effectLst/>
+              <a:latin typeface="+mn-lt"/>
+              <a:ea typeface="+mn-ea"/>
+              <a:cs typeface="+mn-cs"/>
+            </a:endParaRPr>
+          </a:p>
+          <a:p>
+            <a:r>
+              <a:rPr lang="de-DE" sz="1200" kern="1200" dirty="0">
+                <a:solidFill>
+                  <a:schemeClr val="tx1"/>
+                </a:solidFill>
+                <a:effectLst/>
+                <a:latin typeface="+mn-lt"/>
+                <a:ea typeface="+mn-ea"/>
+                <a:cs typeface="+mn-cs"/>
+              </a:rPr>
+              <a:t>Ein </a:t>
+            </a:r>
+            <a:r>
+              <a:rPr lang="de-DE" sz="1200" kern="1200" dirty="0" err="1">
+                <a:solidFill>
+                  <a:schemeClr val="tx1"/>
+                </a:solidFill>
+                <a:effectLst/>
+                <a:latin typeface="+mn-lt"/>
+                <a:ea typeface="+mn-ea"/>
+                <a:cs typeface="+mn-cs"/>
+              </a:rPr>
+              <a:t>OpenMP</a:t>
+            </a:r>
+            <a:r>
+              <a:rPr lang="de-DE" sz="1200" kern="1200" dirty="0">
+                <a:solidFill>
+                  <a:schemeClr val="tx1"/>
+                </a:solidFill>
+                <a:effectLst/>
+                <a:latin typeface="+mn-lt"/>
+                <a:ea typeface="+mn-ea"/>
+                <a:cs typeface="+mn-cs"/>
+              </a:rPr>
+              <a:t>-Programm startet als einzelner Thread (</a:t>
+            </a:r>
+            <a:r>
+              <a:rPr lang="de-DE" sz="1200" kern="1200" dirty="0" err="1">
+                <a:solidFill>
+                  <a:schemeClr val="tx1"/>
+                </a:solidFill>
+                <a:effectLst/>
+                <a:latin typeface="+mn-lt"/>
+                <a:ea typeface="+mn-ea"/>
+                <a:cs typeface="+mn-cs"/>
+              </a:rPr>
+              <a:t>master</a:t>
+            </a:r>
+            <a:r>
+              <a:rPr lang="de-DE" sz="1200" kern="1200" dirty="0">
+                <a:solidFill>
+                  <a:schemeClr val="tx1"/>
+                </a:solidFill>
+                <a:effectLst/>
+                <a:latin typeface="+mn-lt"/>
+                <a:ea typeface="+mn-ea"/>
+                <a:cs typeface="+mn-cs"/>
+              </a:rPr>
+              <a:t> </a:t>
+            </a:r>
+            <a:r>
+              <a:rPr lang="de-DE" sz="1200" kern="1200" dirty="0" err="1">
+                <a:solidFill>
+                  <a:schemeClr val="tx1"/>
+                </a:solidFill>
+                <a:effectLst/>
+                <a:latin typeface="+mn-lt"/>
+                <a:ea typeface="+mn-ea"/>
+                <a:cs typeface="+mn-cs"/>
+              </a:rPr>
+              <a:t>thread</a:t>
+            </a:r>
+            <a:r>
+              <a:rPr lang="de-DE" sz="1200" kern="1200" dirty="0">
+                <a:solidFill>
+                  <a:schemeClr val="tx1"/>
+                </a:solidFill>
+                <a:effectLst/>
+                <a:latin typeface="+mn-lt"/>
+                <a:ea typeface="+mn-ea"/>
+                <a:cs typeface="+mn-cs"/>
+              </a:rPr>
+              <a:t>). Weitere Threads (Team) werden durch eine parallele Region erzeugt und am Ende der parallelen Region wieder zurückgegeben</a:t>
+            </a:r>
+          </a:p>
+          <a:p>
+            <a:endParaRPr lang="de-DE" sz="1200" kern="1200" dirty="0">
+              <a:solidFill>
+                <a:schemeClr val="tx1"/>
+              </a:solidFill>
+              <a:effectLst/>
+              <a:latin typeface="+mn-lt"/>
+              <a:ea typeface="+mn-ea"/>
+              <a:cs typeface="+mn-cs"/>
+            </a:endParaRPr>
+          </a:p>
+          <a:p>
+            <a:r>
+              <a:rPr lang="de-DE" sz="1200" kern="1200" dirty="0">
+                <a:solidFill>
+                  <a:schemeClr val="tx1"/>
+                </a:solidFill>
+                <a:effectLst/>
+                <a:latin typeface="+mn-lt"/>
+                <a:ea typeface="+mn-ea"/>
+                <a:cs typeface="+mn-cs"/>
+              </a:rPr>
+              <a:t>Ein Team besteht aus einer festen Anzahl  von Threads, die die parallele Region redundant abarbeiten</a:t>
+            </a:r>
+          </a:p>
+          <a:p>
+            <a:endParaRPr lang="de-DE" sz="1200" kern="1200" dirty="0">
+              <a:solidFill>
+                <a:schemeClr val="tx1"/>
+              </a:solidFill>
+              <a:effectLst/>
+              <a:latin typeface="+mn-lt"/>
+              <a:ea typeface="+mn-ea"/>
+              <a:cs typeface="+mn-cs"/>
+            </a:endParaRPr>
+          </a:p>
+          <a:p>
+            <a:r>
+              <a:rPr lang="de-DE" sz="1200" kern="1200" dirty="0">
+                <a:solidFill>
+                  <a:schemeClr val="tx1"/>
+                </a:solidFill>
+                <a:effectLst/>
+                <a:latin typeface="+mn-lt"/>
+                <a:ea typeface="+mn-ea"/>
+                <a:cs typeface="+mn-cs"/>
+              </a:rPr>
+              <a:t>Am Ende der parallelen Region findet eine Synchronisation aller Threads im Team statt</a:t>
+            </a:r>
+          </a:p>
+          <a:p>
+            <a:endParaRPr lang="de-DE" sz="1200" kern="1200" dirty="0">
+              <a:solidFill>
+                <a:schemeClr val="tx1"/>
+              </a:solidFill>
+              <a:effectLst/>
+              <a:latin typeface="+mn-lt"/>
+              <a:ea typeface="+mn-ea"/>
+              <a:cs typeface="+mn-cs"/>
+            </a:endParaRPr>
+          </a:p>
+          <a:p>
+            <a:r>
+              <a:rPr lang="de-DE" sz="1200" kern="1200" dirty="0">
+                <a:solidFill>
+                  <a:schemeClr val="tx1"/>
+                </a:solidFill>
+                <a:effectLst/>
+                <a:latin typeface="+mn-lt"/>
+                <a:ea typeface="+mn-ea"/>
+                <a:cs typeface="+mn-cs"/>
+              </a:rPr>
+              <a:t>Nach der parallelen Region führt der </a:t>
+            </a:r>
+            <a:r>
+              <a:rPr lang="de-DE" sz="1200" kern="1200" dirty="0" err="1">
+                <a:solidFill>
+                  <a:schemeClr val="tx1"/>
+                </a:solidFill>
+                <a:effectLst/>
+                <a:latin typeface="+mn-lt"/>
+                <a:ea typeface="+mn-ea"/>
+                <a:cs typeface="+mn-cs"/>
+              </a:rPr>
+              <a:t>master</a:t>
+            </a:r>
+            <a:r>
+              <a:rPr lang="de-DE" sz="1200" kern="1200" dirty="0">
+                <a:solidFill>
+                  <a:schemeClr val="tx1"/>
+                </a:solidFill>
+                <a:effectLst/>
+                <a:latin typeface="+mn-lt"/>
+                <a:ea typeface="+mn-ea"/>
+                <a:cs typeface="+mn-cs"/>
+              </a:rPr>
+              <a:t> </a:t>
+            </a:r>
+            <a:r>
+              <a:rPr lang="de-DE" sz="1200" kern="1200" dirty="0" err="1">
+                <a:solidFill>
+                  <a:schemeClr val="tx1"/>
+                </a:solidFill>
+                <a:effectLst/>
+                <a:latin typeface="+mn-lt"/>
+                <a:ea typeface="+mn-ea"/>
+                <a:cs typeface="+mn-cs"/>
+              </a:rPr>
+              <a:t>thread</a:t>
+            </a:r>
+            <a:r>
+              <a:rPr lang="de-DE" sz="1200" kern="1200" dirty="0">
+                <a:solidFill>
+                  <a:schemeClr val="tx1"/>
+                </a:solidFill>
+                <a:effectLst/>
+                <a:latin typeface="+mn-lt"/>
+                <a:ea typeface="+mn-ea"/>
+                <a:cs typeface="+mn-cs"/>
+              </a:rPr>
+              <a:t> den Code (sequentiell) fort</a:t>
+            </a:r>
             <a:endParaRPr lang="de-DE" dirty="0"/>
           </a:p>
         </p:txBody>
@@ -2426,7 +2662,7 @@
           <a:p>
             <a:fld id="{67F32239-C198-46BF-8243-3DEE8544CFAA}" type="slidenum">
               <a:rPr lang="de-DE" smtClean="0"/>
-              <a:t>10</a:t>
+              <a:t>8</a:t>
             </a:fld>
             <a:endParaRPr lang="de-DE"/>
           </a:p>
@@ -2435,7 +2671,7 @@
     </p:spTree>
     <p:extLst>
       <p:ext uri="{BB962C8B-B14F-4D97-AF65-F5344CB8AC3E}">
-        <p14:creationId xmlns:p14="http://schemas.microsoft.com/office/powerpoint/2010/main" val="4221942547"/>
+        <p14:creationId xmlns:p14="http://schemas.microsoft.com/office/powerpoint/2010/main" val="1569336112"/>
       </p:ext>
     </p:extLst>
   </p:cSld>
@@ -2499,7 +2735,49 @@
                 <a:ea typeface="+mn-ea"/>
                 <a:cs typeface="+mn-cs"/>
               </a:rPr>
-              <a:t>+erlaubt die Parallelisierung seriellen Codes durch Hinzufügen von Direktiven</a:t>
+              <a:t>Gemeinsame Daten:</a:t>
+            </a:r>
+          </a:p>
+          <a:p>
+            <a:r>
+              <a:rPr lang="de-DE" sz="1200" kern="1200" dirty="0">
+                <a:solidFill>
+                  <a:schemeClr val="tx1"/>
+                </a:solidFill>
+                <a:effectLst/>
+                <a:latin typeface="+mn-lt"/>
+                <a:ea typeface="+mn-ea"/>
+                <a:cs typeface="+mn-cs"/>
+              </a:rPr>
+              <a:t>sind allen Threads bekannt und von diesen zugreifbar</a:t>
+            </a:r>
+          </a:p>
+          <a:p>
+            <a:r>
+              <a:rPr lang="de-DE" sz="1200" kern="1200" dirty="0">
+                <a:solidFill>
+                  <a:schemeClr val="tx1"/>
+                </a:solidFill>
+                <a:effectLst/>
+                <a:latin typeface="+mn-lt"/>
+                <a:ea typeface="+mn-ea"/>
+                <a:cs typeface="+mn-cs"/>
+              </a:rPr>
+              <a:t>alle Threads, die auf diese Daten zugreifen, greifen auf die selbe Speicherstelle zu</a:t>
+            </a:r>
+          </a:p>
+          <a:p>
+            <a:r>
+              <a:rPr lang="de-DE" sz="1200" kern="1200" dirty="0">
+                <a:solidFill>
+                  <a:schemeClr val="tx1"/>
+                </a:solidFill>
+                <a:effectLst/>
+                <a:latin typeface="+mn-lt"/>
+                <a:ea typeface="+mn-ea"/>
+                <a:cs typeface="+mn-cs"/>
+              </a:rPr>
+              <a:t>Threads kommunizieren miteinander oder synchronisieren sich über gemeinsame Daten</a:t>
             </a:r>
           </a:p>
           <a:p>
@@ -2524,11 +2802,8 @@
                 <a:ea typeface="+mn-ea"/>
                 <a:cs typeface="+mn-cs"/>
               </a:rPr>
-              <a:t>+einfach und schnell zu implementieren</a:t>
-            </a:r>
-          </a:p>
-          <a:p>
-            <a:endParaRPr lang="de-DE" dirty="0"/>
+              <a:t>Private Daten:</a:t>
+            </a:r>
           </a:p>
           <a:p>
             <a:r>
@@ -2541,20 +2816,10 @@
                 <a:ea typeface="+mn-ea"/>
                 <a:cs typeface="+mn-cs"/>
               </a:rPr>
-              <a:t>+</a:t>
-            </a:r>
-            <a:r>
-              <a:rPr lang="de-DE" sz="1200" kern="1200" dirty="0" err="1">
-                <a:solidFill>
-                  <a:schemeClr val="tx1"/>
-                </a:solidFill>
-                <a:effectLst/>
-                <a:latin typeface="+mn-lt"/>
-                <a:ea typeface="+mn-ea"/>
-                <a:cs typeface="+mn-cs"/>
-              </a:rPr>
-              <a:t>aufblähung</a:t>
-            </a:r>
+              <a:t>jeder Thread legt seine eigene private Kopie an</a:t>
+            </a:r>
+          </a:p>
+          <a:p>
             <a:r>
               <a:rPr lang="de-DE" sz="1200" kern="1200" dirty="0">
                 <a:solidFill>
@@ -2565,19 +2830,8 @@
                 <a:ea typeface="+mn-ea"/>
                 <a:cs typeface="+mn-cs"/>
               </a:rPr>
-              <a:t> des Codes sehr gering (in der Regel 2 – 25%) =&gt; relativ sauberer code</a:t>
-            </a:r>
-          </a:p>
-          <a:p>
-            <a:endParaRPr lang="de-DE" sz="1200" kern="1200" dirty="0">
-              <a:solidFill>
-                <a:schemeClr val="tx1"/>
-              </a:solidFill>
-              <a:effectLst/>
-              <a:latin typeface="+mn-lt"/>
-              <a:ea typeface="+mn-ea"/>
-              <a:cs typeface="+mn-cs"/>
-            </a:endParaRPr>
+              <a:t>jeder Thread greift nur auf seine eigene Speicherstelle in seinem Ausführungskontext zu</a:t>
+            </a:r>
           </a:p>
           <a:p>
             <a:r>
@@ -2590,7 +2844,7 @@
                 <a:ea typeface="+mn-ea"/>
                 <a:cs typeface="+mn-cs"/>
               </a:rPr>
-              <a:t>-Spezieller Compiler wird benötigt</a:t>
+              <a:t>nicht zugreifbar für andere Threads</a:t>
             </a:r>
           </a:p>
           <a:p>
@@ -2604,7 +2858,7 @@
                 <a:ea typeface="+mn-ea"/>
                 <a:cs typeface="+mn-cs"/>
               </a:rPr>
-              <a:t>-kann nur auf Architekturen mit gemeinsamem Speicher verwendet werden</a:t>
+              <a:t>existiert nur während der Ausführung einer parallelen Region</a:t>
             </a:r>
           </a:p>
           <a:p>
@@ -2618,31 +2872,7 @@
                 <a:ea typeface="+mn-ea"/>
                 <a:cs typeface="+mn-cs"/>
               </a:rPr>
-              <a:t>- Kommunikation zwischen Threads werden implizit realisiert (schwer nachzuvollziehen, wann wird kommuniziert und wie, wie viel </a:t>
-            </a:r>
-            <a:r>
-              <a:rPr lang="de-DE" sz="1200" kern="1200" dirty="0" err="1">
-                <a:solidFill>
-                  <a:schemeClr val="tx1"/>
-                </a:solidFill>
-                <a:effectLst/>
-                <a:latin typeface="+mn-lt"/>
-                <a:ea typeface="+mn-ea"/>
-                <a:cs typeface="+mn-cs"/>
-              </a:rPr>
-              <a:t>overhead</a:t>
-            </a:r>
-            <a:r>
-              <a:rPr lang="de-DE" sz="1200" kern="1200" dirty="0">
-                <a:solidFill>
-                  <a:schemeClr val="tx1"/>
-                </a:solidFill>
-                <a:effectLst/>
-                <a:latin typeface="+mn-lt"/>
-                <a:ea typeface="+mn-ea"/>
-                <a:cs typeface="+mn-cs"/>
-              </a:rPr>
-              <a:t> entsteht durch Kommunikation)</a:t>
+              <a:t>Wert beim Eintritt und Austritt in die parallele Region undefiniert</a:t>
             </a:r>
             <a:endParaRPr lang="de-DE" dirty="0"/>
           </a:p>
@@ -2665,7 +2895,7 @@
           <a:p>
             <a:fld id="{67F32239-C198-46BF-8243-3DEE8544CFAA}" type="slidenum">
               <a:rPr lang="de-DE" smtClean="0"/>
-              <a:t>11</a:t>
+              <a:t>9</a:t>
             </a:fld>
             <a:endParaRPr lang="de-DE"/>
           </a:p>
@@ -2674,7 +2904,7 @@
     </p:spTree>
     <p:extLst>
       <p:ext uri="{BB962C8B-B14F-4D97-AF65-F5344CB8AC3E}">
-        <p14:creationId xmlns:p14="http://schemas.microsoft.com/office/powerpoint/2010/main" val="3930989936"/>
+        <p14:creationId xmlns:p14="http://schemas.microsoft.com/office/powerpoint/2010/main" val="1659285144"/>
       </p:ext>
     </p:extLst>
   </p:cSld>
@@ -2749,7 +2979,7 @@
           <a:p>
             <a:fld id="{67F32239-C198-46BF-8243-3DEE8544CFAA}" type="slidenum">
               <a:rPr lang="de-DE" smtClean="0"/>
-              <a:t>15</a:t>
+              <a:t>10</a:t>
             </a:fld>
             <a:endParaRPr lang="de-DE"/>
           </a:p>
@@ -2758,7 +2988,7 @@
     </p:spTree>
     <p:extLst>
       <p:ext uri="{BB962C8B-B14F-4D97-AF65-F5344CB8AC3E}">
-        <p14:creationId xmlns:p14="http://schemas.microsoft.com/office/powerpoint/2010/main" val="1955124107"/>
+        <p14:creationId xmlns:p14="http://schemas.microsoft.com/office/powerpoint/2010/main" val="4221942547"/>
       </p:ext>
     </p:extLst>
   </p:cSld>
@@ -2812,6 +3042,161 @@
           <a:bodyPr/>
           <a:lstStyle/>
           <a:p>
+            <a:r>
+              <a:rPr lang="de-DE" sz="1200" kern="1200" dirty="0">
+                <a:solidFill>
+                  <a:schemeClr val="tx1"/>
+                </a:solidFill>
+                <a:effectLst/>
+                <a:latin typeface="+mn-lt"/>
+                <a:ea typeface="+mn-ea"/>
+                <a:cs typeface="+mn-cs"/>
+              </a:rPr>
+              <a:t>+erlaubt die Parallelisierung seriellen Codes durch Hinzufügen von Direktiven</a:t>
+            </a:r>
+          </a:p>
+          <a:p>
+            <a:endParaRPr lang="de-DE" sz="1200" kern="1200" dirty="0">
+              <a:solidFill>
+                <a:schemeClr val="tx1"/>
+              </a:solidFill>
+              <a:effectLst/>
+              <a:latin typeface="+mn-lt"/>
+              <a:ea typeface="+mn-ea"/>
+              <a:cs typeface="+mn-cs"/>
+            </a:endParaRPr>
+          </a:p>
+          <a:p>
+            <a:r>
+              <a:rPr lang="de-DE" sz="1200" kern="1200" dirty="0">
+                <a:solidFill>
+                  <a:schemeClr val="tx1"/>
+                </a:solidFill>
+                <a:effectLst/>
+                <a:latin typeface="+mn-lt"/>
+                <a:ea typeface="+mn-ea"/>
+                <a:cs typeface="+mn-cs"/>
+              </a:rPr>
+              <a:t>+einfach und schnell zu implementieren</a:t>
+            </a:r>
+          </a:p>
+          <a:p>
+            <a:endParaRPr lang="de-DE" dirty="0"/>
+          </a:p>
+          <a:p>
+            <a:r>
+              <a:rPr lang="de-DE" sz="1200" kern="1200" dirty="0">
+                <a:solidFill>
+                  <a:schemeClr val="tx1"/>
+                </a:solidFill>
+                <a:effectLst/>
+                <a:latin typeface="+mn-lt"/>
+                <a:ea typeface="+mn-ea"/>
+                <a:cs typeface="+mn-cs"/>
+              </a:rPr>
+              <a:t>+</a:t>
+            </a:r>
+            <a:r>
+              <a:rPr lang="de-DE" sz="1200" kern="1200" dirty="0" err="1">
+                <a:solidFill>
+                  <a:schemeClr val="tx1"/>
+                </a:solidFill>
+                <a:effectLst/>
+                <a:latin typeface="+mn-lt"/>
+                <a:ea typeface="+mn-ea"/>
+                <a:cs typeface="+mn-cs"/>
+              </a:rPr>
+              <a:t>aufblähung</a:t>
+            </a:r>
+            <a:r>
+              <a:rPr lang="de-DE" sz="1200" kern="1200" dirty="0">
+                <a:solidFill>
+                  <a:schemeClr val="tx1"/>
+                </a:solidFill>
+                <a:effectLst/>
+                <a:latin typeface="+mn-lt"/>
+                <a:ea typeface="+mn-ea"/>
+                <a:cs typeface="+mn-cs"/>
+              </a:rPr>
+              <a:t> des Codes sehr gering (in der Regel 2 – 25%) =&gt; relativ sauberer code</a:t>
+            </a:r>
+          </a:p>
+          <a:p>
+            <a:endParaRPr lang="de-DE" sz="1200" kern="1200" dirty="0">
+              <a:solidFill>
+                <a:schemeClr val="tx1"/>
+              </a:solidFill>
+              <a:effectLst/>
+              <a:latin typeface="+mn-lt"/>
+              <a:ea typeface="+mn-ea"/>
+              <a:cs typeface="+mn-cs"/>
+            </a:endParaRPr>
+          </a:p>
+          <a:p>
+            <a:r>
+              <a:rPr lang="de-DE" sz="1200" kern="1200" dirty="0">
+                <a:solidFill>
+                  <a:schemeClr val="tx1"/>
+                </a:solidFill>
+                <a:effectLst/>
+                <a:latin typeface="+mn-lt"/>
+                <a:ea typeface="+mn-ea"/>
+                <a:cs typeface="+mn-cs"/>
+              </a:rPr>
+              <a:t>-Spezieller Compiler wird benötigt</a:t>
+            </a:r>
+          </a:p>
+          <a:p>
+            <a:r>
+              <a:rPr lang="de-DE" sz="1200" kern="1200" dirty="0">
+                <a:solidFill>
+                  <a:schemeClr val="tx1"/>
+                </a:solidFill>
+                <a:effectLst/>
+                <a:latin typeface="+mn-lt"/>
+                <a:ea typeface="+mn-ea"/>
+                <a:cs typeface="+mn-cs"/>
+              </a:rPr>
+              <a:t>-kann nur auf Architekturen mit gemeinsamem Speicher verwendet werden</a:t>
+            </a:r>
+          </a:p>
+          <a:p>
+            <a:r>
+              <a:rPr lang="de-DE" sz="1200" kern="1200" dirty="0">
+                <a:solidFill>
+                  <a:schemeClr val="tx1"/>
+                </a:solidFill>
+                <a:effectLst/>
+                <a:latin typeface="+mn-lt"/>
+                <a:ea typeface="+mn-ea"/>
+                <a:cs typeface="+mn-cs"/>
+              </a:rPr>
+              <a:t>- Kommunikation zwischen Threads werden implizit realisiert (schwer nachzuvollziehen, wann wird kommuniziert und wie, wie viel </a:t>
+            </a:r>
+            <a:r>
+              <a:rPr lang="de-DE" sz="1200" kern="1200" dirty="0" err="1">
+                <a:solidFill>
+                  <a:schemeClr val="tx1"/>
+                </a:solidFill>
+                <a:effectLst/>
+                <a:latin typeface="+mn-lt"/>
+                <a:ea typeface="+mn-ea"/>
+                <a:cs typeface="+mn-cs"/>
+              </a:rPr>
+              <a:t>overhead</a:t>
+            </a:r>
+            <a:r>
+              <a:rPr lang="de-DE" sz="1200" kern="1200" dirty="0">
+                <a:solidFill>
+                  <a:schemeClr val="tx1"/>
+                </a:solidFill>
+                <a:effectLst/>
+                <a:latin typeface="+mn-lt"/>
+                <a:ea typeface="+mn-ea"/>
+                <a:cs typeface="+mn-cs"/>
+              </a:rPr>
+              <a:t> entsteht durch Kommunikation)</a:t>
+            </a:r>
             <a:endParaRPr lang="de-DE" dirty="0"/>
           </a:p>
         </p:txBody>
@@ -2833,7 +3218,7 @@
           <a:p>
             <a:fld id="{67F32239-C198-46BF-8243-3DEE8544CFAA}" type="slidenum">
               <a:rPr lang="de-DE" smtClean="0"/>
-              <a:t>17</a:t>
+              <a:t>11</a:t>
             </a:fld>
             <a:endParaRPr lang="de-DE"/>
           </a:p>
@@ -2842,7 +3227,7 @@
     </p:spTree>
     <p:extLst>
       <p:ext uri="{BB962C8B-B14F-4D97-AF65-F5344CB8AC3E}">
-        <p14:creationId xmlns:p14="http://schemas.microsoft.com/office/powerpoint/2010/main" val="1307838226"/>
+        <p14:creationId xmlns:p14="http://schemas.microsoft.com/office/powerpoint/2010/main" val="3930989936"/>
       </p:ext>
     </p:extLst>
   </p:cSld>
@@ -2999,7 +3384,7 @@
           <a:p>
             <a:fld id="{B5E8A55B-A329-4846-8D76-CA2F32F53923}" type="datetimeFigureOut">
               <a:rPr lang="de-DE" smtClean="0"/>
-              <a:t>12.02.2020</a:t>
+              <a:t>13.02.20</a:t>
             </a:fld>
             <a:endParaRPr lang="de-DE"/>
           </a:p>
@@ -3197,7 +3582,7 @@
           <a:p>
             <a:fld id="{B5E8A55B-A329-4846-8D76-CA2F32F53923}" type="datetimeFigureOut">
               <a:rPr lang="de-DE" smtClean="0"/>
-              <a:t>12.02.2020</a:t>
+              <a:t>13.02.20</a:t>
             </a:fld>
             <a:endParaRPr lang="de-DE"/>
           </a:p>
@@ -3405,7 +3790,7 @@
           <a:p>
             <a:fld id="{B5E8A55B-A329-4846-8D76-CA2F32F53923}" type="datetimeFigureOut">
               <a:rPr lang="de-DE" smtClean="0"/>
-              <a:t>12.02.2020</a:t>
+              <a:t>13.02.20</a:t>
             </a:fld>
             <a:endParaRPr lang="de-DE"/>
           </a:p>
@@ -3603,7 +3988,7 @@
           <a:p>
             <a:fld id="{B5E8A55B-A329-4846-8D76-CA2F32F53923}" type="datetimeFigureOut">
               <a:rPr lang="de-DE" smtClean="0"/>
-              <a:t>12.02.2020</a:t>
+              <a:t>13.02.20</a:t>
             </a:fld>
             <a:endParaRPr lang="de-DE"/>
           </a:p>
@@ -3878,7 +4263,7 @@
           <a:p>
             <a:fld id="{B5E8A55B-A329-4846-8D76-CA2F32F53923}" type="datetimeFigureOut">
               <a:rPr lang="de-DE" smtClean="0"/>
-              <a:t>12.02.2020</a:t>
+              <a:t>13.02.20</a:t>
             </a:fld>
             <a:endParaRPr lang="de-DE"/>
           </a:p>
@@ -4143,7 +4528,7 @@
           <a:p>
             <a:fld id="{B5E8A55B-A329-4846-8D76-CA2F32F53923}" type="datetimeFigureOut">
               <a:rPr lang="de-DE" smtClean="0"/>
-              <a:t>12.02.2020</a:t>
+              <a:t>13.02.20</a:t>
             </a:fld>
             <a:endParaRPr lang="de-DE"/>
           </a:p>
@@ -4555,7 +4940,7 @@
           <a:p>
             <a:fld id="{B5E8A55B-A329-4846-8D76-CA2F32F53923}" type="datetimeFigureOut">
               <a:rPr lang="de-DE" smtClean="0"/>
-              <a:t>12.02.2020</a:t>
+              <a:t>13.02.20</a:t>
             </a:fld>
             <a:endParaRPr lang="de-DE"/>
           </a:p>
@@ -4696,7 +5081,7 @@
           <a:p>
             <a:fld id="{B5E8A55B-A329-4846-8D76-CA2F32F53923}" type="datetimeFigureOut">
               <a:rPr lang="de-DE" smtClean="0"/>
-              <a:t>12.02.2020</a:t>
+              <a:t>13.02.20</a:t>
             </a:fld>
             <a:endParaRPr lang="de-DE"/>
           </a:p>
@@ -4809,7 +5194,7 @@
           <a:p>
             <a:fld id="{B5E8A55B-A329-4846-8D76-CA2F32F53923}" type="datetimeFigureOut">
               <a:rPr lang="de-DE" smtClean="0"/>
-              <a:t>12.02.2020</a:t>
+              <a:t>13.02.20</a:t>
             </a:fld>
             <a:endParaRPr lang="de-DE"/>
           </a:p>
@@ -5120,7 +5505,7 @@
           <a:p>
             <a:fld id="{B5E8A55B-A329-4846-8D76-CA2F32F53923}" type="datetimeFigureOut">
               <a:rPr lang="de-DE" smtClean="0"/>
-              <a:t>12.02.2020</a:t>
+              <a:t>13.02.20</a:t>
             </a:fld>
             <a:endParaRPr lang="de-DE"/>
           </a:p>
@@ -5408,7 +5793,7 @@
           <a:p>
             <a:fld id="{B5E8A55B-A329-4846-8D76-CA2F32F53923}" type="datetimeFigureOut">
               <a:rPr lang="de-DE" smtClean="0"/>
-              <a:t>12.02.2020</a:t>
+              <a:t>13.02.20</a:t>
             </a:fld>
             <a:endParaRPr lang="de-DE"/>
           </a:p>
@@ -5649,7 +6034,7 @@
           <a:p>
             <a:fld id="{B5E8A55B-A329-4846-8D76-CA2F32F53923}" type="datetimeFigureOut">
               <a:rPr lang="de-DE" smtClean="0"/>
-              <a:t>12.02.2020</a:t>
+              <a:t>13.02.20</a:t>
             </a:fld>
             <a:endParaRPr lang="de-DE"/>
           </a:p>
@@ -7126,7 +7511,7 @@
           <p:cNvPr id="2" name="Titel 1">
             <a:extLst>
               <a:ext uri="{FF2B5EF4-FFF2-40B4-BE49-F238E27FC236}">
-                <a16:creationId xmlns:a16="http://schemas.microsoft.com/office/drawing/2014/main" id="{C7E3F825-1918-451E-B3AB-EE354B6B60AF}"/>
+                <a16:creationId xmlns:a16="http://schemas.microsoft.com/office/drawing/2014/main" id="{1545335F-63CE-9844-963E-812F3DE0A7EC}"/>
               </a:ext>
             </a:extLst>
           </p:cNvPr>
@@ -7151,12 +7536,12 @@
           <a:p>
             <a:pPr algn="r"/>
             <a:r>
-              <a:rPr lang="en-US" sz="4100" dirty="0">
+              <a:rPr lang="en-US">
                 <a:solidFill>
                   <a:schemeClr val="accent1"/>
                 </a:solidFill>
               </a:rPr>
-              <a:t>Exercise 1 Parallelization of Addition</a:t>
+              <a:t>Exercises</a:t>
             </a:r>
           </a:p>
         </p:txBody>
@@ -7221,7 +7606,7 @@
           <p:cNvPr id="3" name="Inhaltsplatzhalter 2">
             <a:extLst>
               <a:ext uri="{FF2B5EF4-FFF2-40B4-BE49-F238E27FC236}">
-                <a16:creationId xmlns:a16="http://schemas.microsoft.com/office/drawing/2014/main" id="{6EFFB83E-507E-4C9F-B3D5-EF05AE455650}"/>
+                <a16:creationId xmlns:a16="http://schemas.microsoft.com/office/drawing/2014/main" id="{1931DDEF-811F-DC45-8247-7D36D84FF741}"/>
               </a:ext>
             </a:extLst>
           </p:cNvPr>
@@ -7244,33 +7629,68 @@
           </a:bodyPr>
           <a:lstStyle/>
           <a:p>
+            <a:pPr marL="514350" indent="-514350">
+              <a:buFont typeface="+mj-lt"/>
+              <a:buAutoNum type="arabicPeriod"/>
+            </a:pPr>
             <a:r>
               <a:rPr lang="en-US" sz="2400" dirty="0"/>
-              <a:t>Why is there the same performance in the Release configuration?</a:t>
-            </a:r>
-          </a:p>
-          <a:p>
+              <a:t>Startup the Lab Computers</a:t>
+            </a:r>
+          </a:p>
+          <a:p>
+            <a:pPr marL="514350" indent="-514350">
+              <a:buFont typeface="+mj-lt"/>
+              <a:buAutoNum type="arabicPeriod"/>
+            </a:pPr>
+            <a:r>
+              <a:rPr lang="en-US" sz="2400" dirty="0"/>
+              <a:t>Retrieve our Zip packages and unzip them in a good-to-find location</a:t>
+            </a:r>
+          </a:p>
+          <a:p>
+            <a:pPr marL="514350" indent="-514350">
+              <a:buFont typeface="+mj-lt"/>
+              <a:buAutoNum type="arabicPeriod"/>
+            </a:pPr>
+            <a:r>
+              <a:rPr lang="en-US" sz="2400" dirty="0"/>
+              <a:t>Startup Visual Studio and Open up the Solution from the unzipped folder</a:t>
+            </a:r>
+          </a:p>
+          <a:p>
+            <a:pPr marL="514350" indent="-514350">
+              <a:buFont typeface="+mj-lt"/>
+              <a:buAutoNum type="arabicPeriod"/>
+            </a:pPr>
+            <a:r>
+              <a:rPr lang="en-US" sz="2400" dirty="0"/>
+              <a:t>You are good to go</a:t>
+            </a:r>
+          </a:p>
+          <a:p>
+            <a:pPr marL="514350" indent="-514350">
+              <a:buFont typeface="+mj-lt"/>
+              <a:buAutoNum type="arabicPeriod"/>
+            </a:pPr>
             <a:endParaRPr lang="en-US" sz="2400" dirty="0"/>
           </a:p>
           <a:p>
-            <a:endParaRPr lang="en-US" sz="2400" dirty="0"/>
-          </a:p>
-          <a:p>
+            <a:pPr marL="0" indent="0">
+              <a:buNone/>
+            </a:pPr>
             <a:r>
               <a:rPr lang="en-US" sz="2400" dirty="0"/>
-              <a:t>Are there differences between the results with a Debug and a Release build?</a:t>
-            </a:r>
-          </a:p>
-          <a:p>
-            <a:endParaRPr lang="en-US" sz="2400" dirty="0"/>
-          </a:p>
-          <a:p>
-            <a:endParaRPr lang="en-US" sz="2400" dirty="0"/>
-          </a:p>
-          <a:p>
+              <a:t>Tip: Helpful Resources &amp; Links are at the end of the description file! </a:t>
+            </a:r>
+          </a:p>
+          <a:p>
+            <a:pPr marL="0" indent="0">
+              <a:buNone/>
+            </a:pPr>
             <a:r>
               <a:rPr lang="en-US" sz="2400" dirty="0"/>
-              <a:t>How many resources are occupied by your system during execution?</a:t>
+              <a:t>Also: Look through all the provided files, you might find helpful ones ;)</a:t>
             </a:r>
           </a:p>
         </p:txBody>
@@ -7278,7 +7698,7 @@
     </p:spTree>
     <p:extLst>
       <p:ext uri="{BB962C8B-B14F-4D97-AF65-F5344CB8AC3E}">
-        <p14:creationId xmlns:p14="http://schemas.microsoft.com/office/powerpoint/2010/main" val="2737949822"/>
+        <p14:creationId xmlns:p14="http://schemas.microsoft.com/office/powerpoint/2010/main" val="1220348743"/>
       </p:ext>
     </p:extLst>
   </p:cSld>
@@ -7289,6 +7709,1180 @@
 </file>
 
 <file path=ppt/slides/slide14.xml><?xml version="1.0" encoding="utf-8"?>
+<p:sld xmlns:a="http://schemas.openxmlformats.org/drawingml/2006/main" xmlns:r="http://schemas.openxmlformats.org/officeDocument/2006/relationships" xmlns:p="http://schemas.openxmlformats.org/presentationml/2006/main">
+  <p:cSld>
+    <p:spTree>
+      <p:nvGrpSpPr>
+        <p:cNvPr id="1" name=""/>
+        <p:cNvGrpSpPr/>
+        <p:nvPr/>
+      </p:nvGrpSpPr>
+      <p:grpSpPr>
+        <a:xfrm>
+          <a:off x="0" y="0"/>
+          <a:ext cx="0" cy="0"/>
+          <a:chOff x="0" y="0"/>
+          <a:chExt cx="0" cy="0"/>
+        </a:xfrm>
+      </p:grpSpPr>
+      <p:sp>
+        <p:nvSpPr>
+          <p:cNvPr id="2" name="Titel 1">
+            <a:extLst>
+              <a:ext uri="{FF2B5EF4-FFF2-40B4-BE49-F238E27FC236}">
+                <a16:creationId xmlns:a16="http://schemas.microsoft.com/office/drawing/2014/main" id="{C7E3F825-1918-451E-B3AB-EE354B6B60AF}"/>
+              </a:ext>
+            </a:extLst>
+          </p:cNvPr>
+          <p:cNvSpPr>
+            <a:spLocks noGrp="1"/>
+          </p:cNvSpPr>
+          <p:nvPr>
+            <p:ph type="title"/>
+          </p:nvPr>
+        </p:nvSpPr>
+        <p:spPr>
+          <a:xfrm>
+            <a:off x="1051560" y="4444332"/>
+            <a:ext cx="3558466" cy="1645920"/>
+          </a:xfrm>
+        </p:spPr>
+        <p:txBody>
+          <a:bodyPr vert="horz" lIns="91440" tIns="45720" rIns="91440" bIns="45720" rtlCol="0" anchor="ctr">
+            <a:normAutofit/>
+          </a:bodyPr>
+          <a:lstStyle/>
+          <a:p>
+            <a:r>
+              <a:rPr lang="en-US" sz="3200" kern="1200" dirty="0">
+                <a:solidFill>
+                  <a:schemeClr val="tx1"/>
+                </a:solidFill>
+                <a:latin typeface="+mj-lt"/>
+                <a:ea typeface="+mj-ea"/>
+                <a:cs typeface="+mj-cs"/>
+              </a:rPr>
+              <a:t>Exercise 1 Parallelization of Addition</a:t>
+            </a:r>
+          </a:p>
+        </p:txBody>
+      </p:sp>
+      <p:graphicFrame>
+        <p:nvGraphicFramePr>
+          <p:cNvPr id="5" name="Tabelle 5">
+            <a:extLst>
+              <a:ext uri="{FF2B5EF4-FFF2-40B4-BE49-F238E27FC236}">
+                <a16:creationId xmlns:a16="http://schemas.microsoft.com/office/drawing/2014/main" id="{BF4B5319-A78F-476F-BDC1-E5551D330D1A}"/>
+              </a:ext>
+            </a:extLst>
+          </p:cNvPr>
+          <p:cNvGraphicFramePr>
+            <a:graphicFrameLocks noGrp="1"/>
+          </p:cNvGraphicFramePr>
+          <p:nvPr>
+            <p:ph idx="1"/>
+            <p:extLst>
+              <p:ext uri="{D42A27DB-BD31-4B8C-83A1-F6EECF244321}">
+                <p14:modId xmlns:p14="http://schemas.microsoft.com/office/powerpoint/2010/main" val="4263759048"/>
+              </p:ext>
+            </p:extLst>
+          </p:nvPr>
+        </p:nvGraphicFramePr>
+        <p:xfrm>
+          <a:off x="557784" y="703262"/>
+          <a:ext cx="11164828" cy="2952948"/>
+        </p:xfrm>
+        <a:graphic>
+          <a:graphicData uri="http://schemas.openxmlformats.org/drawingml/2006/table">
+            <a:tbl>
+              <a:tblPr firstRow="1" bandRow="1">
+                <a:noFill/>
+                <a:tableStyleId>{5C22544A-7EE6-4342-B048-85BDC9FD1C3A}</a:tableStyleId>
+              </a:tblPr>
+              <a:tblGrid>
+                <a:gridCol w="2142489">
+                  <a:extLst>
+                    <a:ext uri="{9D8B030D-6E8A-4147-A177-3AD203B41FA5}">
+                      <a16:colId xmlns:a16="http://schemas.microsoft.com/office/drawing/2014/main" val="3706614358"/>
+                    </a:ext>
+                  </a:extLst>
+                </a:gridCol>
+                <a:gridCol w="1584755">
+                  <a:extLst>
+                    <a:ext uri="{9D8B030D-6E8A-4147-A177-3AD203B41FA5}">
+                      <a16:colId xmlns:a16="http://schemas.microsoft.com/office/drawing/2014/main" val="1804461210"/>
+                    </a:ext>
+                  </a:extLst>
+                </a:gridCol>
+                <a:gridCol w="1767848">
+                  <a:extLst>
+                    <a:ext uri="{9D8B030D-6E8A-4147-A177-3AD203B41FA5}">
+                      <a16:colId xmlns:a16="http://schemas.microsoft.com/office/drawing/2014/main" val="4173243819"/>
+                    </a:ext>
+                  </a:extLst>
+                </a:gridCol>
+                <a:gridCol w="1767848">
+                  <a:extLst>
+                    <a:ext uri="{9D8B030D-6E8A-4147-A177-3AD203B41FA5}">
+                      <a16:colId xmlns:a16="http://schemas.microsoft.com/office/drawing/2014/main" val="4134306666"/>
+                    </a:ext>
+                  </a:extLst>
+                </a:gridCol>
+                <a:gridCol w="1950944">
+                  <a:extLst>
+                    <a:ext uri="{9D8B030D-6E8A-4147-A177-3AD203B41FA5}">
+                      <a16:colId xmlns:a16="http://schemas.microsoft.com/office/drawing/2014/main" val="3835685042"/>
+                    </a:ext>
+                  </a:extLst>
+                </a:gridCol>
+                <a:gridCol w="1950944">
+                  <a:extLst>
+                    <a:ext uri="{9D8B030D-6E8A-4147-A177-3AD203B41FA5}">
+                      <a16:colId xmlns:a16="http://schemas.microsoft.com/office/drawing/2014/main" val="1373760785"/>
+                    </a:ext>
+                  </a:extLst>
+                </a:gridCol>
+              </a:tblGrid>
+              <a:tr h="984316">
+                <a:tc>
+                  <a:txBody>
+                    <a:bodyPr/>
+                    <a:lstStyle/>
+                    <a:p>
+                      <a:endParaRPr lang="de-DE" sz="2800" b="1">
+                        <a:solidFill>
+                          <a:srgbClr val="FFFFFF"/>
+                        </a:solidFill>
+                      </a:endParaRPr>
+                    </a:p>
+                  </a:txBody>
+                  <a:tcPr marL="405625" marR="243375" marT="243375" marB="243375">
+                    <a:lnL w="12700" cmpd="sng">
+                      <a:noFill/>
+                      <a:prstDash val="solid"/>
+                    </a:lnL>
+                    <a:lnR w="38100" cap="flat" cmpd="sng" algn="ctr">
+                      <a:solidFill>
+                        <a:srgbClr val="FFFFFF"/>
+                      </a:solidFill>
+                      <a:prstDash val="solid"/>
+                    </a:lnR>
+                    <a:lnT w="12700" cmpd="sng">
+                      <a:noFill/>
+                      <a:prstDash val="solid"/>
+                    </a:lnT>
+                    <a:lnB w="38100" cap="flat" cmpd="sng" algn="ctr">
+                      <a:solidFill>
+                        <a:srgbClr val="FFFFFF"/>
+                      </a:solidFill>
+                      <a:prstDash val="solid"/>
+                    </a:lnB>
+                    <a:solidFill>
+                      <a:srgbClr val="636B68">
+                        <a:alpha val="69804"/>
+                      </a:srgbClr>
+                    </a:solidFill>
+                  </a:tcPr>
+                </a:tc>
+                <a:tc>
+                  <a:txBody>
+                    <a:bodyPr/>
+                    <a:lstStyle/>
+                    <a:p>
+                      <a:r>
+                        <a:rPr lang="en-US" sz="2800" b="1">
+                          <a:solidFill>
+                            <a:srgbClr val="FFFFFF"/>
+                          </a:solidFill>
+                        </a:rPr>
+                        <a:t>1000</a:t>
+                      </a:r>
+                      <a:endParaRPr lang="de-DE" sz="2800" b="1">
+                        <a:solidFill>
+                          <a:srgbClr val="FFFFFF"/>
+                        </a:solidFill>
+                      </a:endParaRPr>
+                    </a:p>
+                  </a:txBody>
+                  <a:tcPr marL="405625" marR="243375" marT="243375" marB="243375">
+                    <a:lnL w="38100" cap="flat" cmpd="sng" algn="ctr">
+                      <a:solidFill>
+                        <a:srgbClr val="FFFFFF"/>
+                      </a:solidFill>
+                      <a:prstDash val="solid"/>
+                    </a:lnL>
+                    <a:lnR w="38100" cap="flat" cmpd="sng" algn="ctr">
+                      <a:solidFill>
+                        <a:srgbClr val="FFFFFF"/>
+                      </a:solidFill>
+                      <a:prstDash val="solid"/>
+                    </a:lnR>
+                    <a:lnT w="12700" cmpd="sng">
+                      <a:noFill/>
+                      <a:prstDash val="solid"/>
+                    </a:lnT>
+                    <a:lnB w="38100" cap="flat" cmpd="sng" algn="ctr">
+                      <a:solidFill>
+                        <a:srgbClr val="FFFFFF"/>
+                      </a:solidFill>
+                      <a:prstDash val="solid"/>
+                    </a:lnB>
+                    <a:solidFill>
+                      <a:srgbClr val="636B68">
+                        <a:alpha val="69804"/>
+                      </a:srgbClr>
+                    </a:solidFill>
+                  </a:tcPr>
+                </a:tc>
+                <a:tc>
+                  <a:txBody>
+                    <a:bodyPr/>
+                    <a:lstStyle/>
+                    <a:p>
+                      <a:r>
+                        <a:rPr lang="en-US" sz="2800" b="1">
+                          <a:solidFill>
+                            <a:srgbClr val="FFFFFF"/>
+                          </a:solidFill>
+                        </a:rPr>
+                        <a:t>10000</a:t>
+                      </a:r>
+                      <a:endParaRPr lang="de-DE" sz="2800" b="1">
+                        <a:solidFill>
+                          <a:srgbClr val="FFFFFF"/>
+                        </a:solidFill>
+                      </a:endParaRPr>
+                    </a:p>
+                  </a:txBody>
+                  <a:tcPr marL="405625" marR="243375" marT="243375" marB="243375">
+                    <a:lnL w="38100" cap="flat" cmpd="sng" algn="ctr">
+                      <a:solidFill>
+                        <a:srgbClr val="FFFFFF"/>
+                      </a:solidFill>
+                      <a:prstDash val="solid"/>
+                    </a:lnL>
+                    <a:lnR w="38100" cap="flat" cmpd="sng" algn="ctr">
+                      <a:solidFill>
+                        <a:srgbClr val="FFFFFF"/>
+                      </a:solidFill>
+                      <a:prstDash val="solid"/>
+                    </a:lnR>
+                    <a:lnT w="12700" cmpd="sng">
+                      <a:noFill/>
+                      <a:prstDash val="solid"/>
+                    </a:lnT>
+                    <a:lnB w="38100" cap="flat" cmpd="sng" algn="ctr">
+                      <a:solidFill>
+                        <a:srgbClr val="FFFFFF"/>
+                      </a:solidFill>
+                      <a:prstDash val="solid"/>
+                    </a:lnB>
+                    <a:solidFill>
+                      <a:srgbClr val="636B68">
+                        <a:alpha val="69804"/>
+                      </a:srgbClr>
+                    </a:solidFill>
+                  </a:tcPr>
+                </a:tc>
+                <a:tc>
+                  <a:txBody>
+                    <a:bodyPr/>
+                    <a:lstStyle/>
+                    <a:p>
+                      <a:r>
+                        <a:rPr lang="en-US" sz="2800" b="1" dirty="0">
+                          <a:solidFill>
+                            <a:srgbClr val="FFFFFF"/>
+                          </a:solidFill>
+                        </a:rPr>
+                        <a:t>50000</a:t>
+                      </a:r>
+                      <a:endParaRPr lang="de-DE" sz="2800" b="1" dirty="0">
+                        <a:solidFill>
+                          <a:srgbClr val="FFFFFF"/>
+                        </a:solidFill>
+                      </a:endParaRPr>
+                    </a:p>
+                  </a:txBody>
+                  <a:tcPr marL="405625" marR="243375" marT="243375" marB="243375">
+                    <a:lnL w="38100" cap="flat" cmpd="sng" algn="ctr">
+                      <a:solidFill>
+                        <a:srgbClr val="FFFFFF"/>
+                      </a:solidFill>
+                      <a:prstDash val="solid"/>
+                    </a:lnL>
+                    <a:lnR w="38100" cap="flat" cmpd="sng" algn="ctr">
+                      <a:solidFill>
+                        <a:srgbClr val="FFFFFF"/>
+                      </a:solidFill>
+                      <a:prstDash val="solid"/>
+                    </a:lnR>
+                    <a:lnT w="12700" cmpd="sng">
+                      <a:noFill/>
+                      <a:prstDash val="solid"/>
+                    </a:lnT>
+                    <a:lnB w="38100" cap="flat" cmpd="sng" algn="ctr">
+                      <a:solidFill>
+                        <a:srgbClr val="FFFFFF"/>
+                      </a:solidFill>
+                      <a:prstDash val="solid"/>
+                    </a:lnB>
+                    <a:solidFill>
+                      <a:srgbClr val="636B68">
+                        <a:alpha val="69804"/>
+                      </a:srgbClr>
+                    </a:solidFill>
+                  </a:tcPr>
+                </a:tc>
+                <a:tc>
+                  <a:txBody>
+                    <a:bodyPr/>
+                    <a:lstStyle/>
+                    <a:p>
+                      <a:r>
+                        <a:rPr lang="en-US" sz="2800" b="1" dirty="0">
+                          <a:solidFill>
+                            <a:srgbClr val="FFFFFF"/>
+                          </a:solidFill>
+                        </a:rPr>
+                        <a:t>200000</a:t>
+                      </a:r>
+                      <a:endParaRPr lang="de-DE" sz="2800" b="1" dirty="0">
+                        <a:solidFill>
+                          <a:srgbClr val="FFFFFF"/>
+                        </a:solidFill>
+                      </a:endParaRPr>
+                    </a:p>
+                  </a:txBody>
+                  <a:tcPr marL="405625" marR="243375" marT="243375" marB="243375">
+                    <a:lnL w="38100" cap="flat" cmpd="sng" algn="ctr">
+                      <a:solidFill>
+                        <a:srgbClr val="FFFFFF"/>
+                      </a:solidFill>
+                      <a:prstDash val="solid"/>
+                    </a:lnL>
+                    <a:lnR w="38100" cap="flat" cmpd="sng" algn="ctr">
+                      <a:solidFill>
+                        <a:srgbClr val="FFFFFF"/>
+                      </a:solidFill>
+                      <a:prstDash val="solid"/>
+                    </a:lnR>
+                    <a:lnT w="12700" cmpd="sng">
+                      <a:noFill/>
+                      <a:prstDash val="solid"/>
+                    </a:lnT>
+                    <a:lnB w="38100" cap="flat" cmpd="sng" algn="ctr">
+                      <a:solidFill>
+                        <a:srgbClr val="FFFFFF"/>
+                      </a:solidFill>
+                      <a:prstDash val="solid"/>
+                    </a:lnB>
+                    <a:solidFill>
+                      <a:srgbClr val="636B68">
+                        <a:alpha val="69804"/>
+                      </a:srgbClr>
+                    </a:solidFill>
+                  </a:tcPr>
+                </a:tc>
+                <a:tc>
+                  <a:txBody>
+                    <a:bodyPr/>
+                    <a:lstStyle/>
+                    <a:p>
+                      <a:r>
+                        <a:rPr lang="en-US" sz="2800" b="1" dirty="0">
+                          <a:solidFill>
+                            <a:srgbClr val="FFFFFF"/>
+                          </a:solidFill>
+                        </a:rPr>
+                        <a:t>2000000</a:t>
+                      </a:r>
+                      <a:endParaRPr lang="de-DE" sz="2800" b="1" dirty="0">
+                        <a:solidFill>
+                          <a:srgbClr val="FFFFFF"/>
+                        </a:solidFill>
+                      </a:endParaRPr>
+                    </a:p>
+                  </a:txBody>
+                  <a:tcPr marL="405625" marR="243375" marT="243375" marB="243375">
+                    <a:lnL w="38100" cap="flat" cmpd="sng" algn="ctr">
+                      <a:solidFill>
+                        <a:srgbClr val="FFFFFF"/>
+                      </a:solidFill>
+                      <a:prstDash val="solid"/>
+                    </a:lnL>
+                    <a:lnR w="12700" cmpd="sng">
+                      <a:noFill/>
+                      <a:prstDash val="solid"/>
+                    </a:lnR>
+                    <a:lnT w="12700" cmpd="sng">
+                      <a:noFill/>
+                      <a:prstDash val="solid"/>
+                    </a:lnT>
+                    <a:lnB w="38100" cap="flat" cmpd="sng" algn="ctr">
+                      <a:solidFill>
+                        <a:srgbClr val="FFFFFF"/>
+                      </a:solidFill>
+                      <a:prstDash val="solid"/>
+                    </a:lnB>
+                    <a:solidFill>
+                      <a:srgbClr val="636B68">
+                        <a:alpha val="69804"/>
+                      </a:srgbClr>
+                    </a:solidFill>
+                  </a:tcPr>
+                </a:tc>
+                <a:extLst>
+                  <a:ext uri="{0D108BD9-81ED-4DB2-BD59-A6C34878D82A}">
+                    <a16:rowId xmlns:a16="http://schemas.microsoft.com/office/drawing/2014/main" val="2114500752"/>
+                  </a:ext>
+                </a:extLst>
+              </a:tr>
+              <a:tr h="984316">
+                <a:tc>
+                  <a:txBody>
+                    <a:bodyPr/>
+                    <a:lstStyle/>
+                    <a:p>
+                      <a:r>
+                        <a:rPr lang="en-US" sz="2800">
+                          <a:solidFill>
+                            <a:schemeClr val="tx1">
+                              <a:lumMod val="85000"/>
+                              <a:lumOff val="15000"/>
+                            </a:schemeClr>
+                          </a:solidFill>
+                        </a:rPr>
+                        <a:t>Normal</a:t>
+                      </a:r>
+                      <a:endParaRPr lang="de-DE" sz="2800">
+                        <a:solidFill>
+                          <a:schemeClr val="tx1">
+                            <a:lumMod val="85000"/>
+                            <a:lumOff val="15000"/>
+                          </a:schemeClr>
+                        </a:solidFill>
+                      </a:endParaRPr>
+                    </a:p>
+                  </a:txBody>
+                  <a:tcPr marL="405625" marR="243375" marT="243375" marB="243375">
+                    <a:lnL w="12700" cmpd="sng">
+                      <a:noFill/>
+                      <a:prstDash val="solid"/>
+                    </a:lnL>
+                    <a:lnR w="38100" cap="flat" cmpd="sng" algn="ctr">
+                      <a:solidFill>
+                        <a:srgbClr val="FFFFFF"/>
+                      </a:solidFill>
+                      <a:prstDash val="solid"/>
+                    </a:lnR>
+                    <a:lnT w="38100" cap="flat" cmpd="sng" algn="ctr">
+                      <a:solidFill>
+                        <a:srgbClr val="FFFFFF"/>
+                      </a:solidFill>
+                      <a:prstDash val="solid"/>
+                    </a:lnT>
+                    <a:lnB w="38100" cap="flat" cmpd="sng" algn="ctr">
+                      <a:solidFill>
+                        <a:srgbClr val="FFFFFF"/>
+                      </a:solidFill>
+                      <a:prstDash val="solid"/>
+                    </a:lnB>
+                    <a:solidFill>
+                      <a:srgbClr val="878E8B">
+                        <a:alpha val="14902"/>
+                      </a:srgbClr>
+                    </a:solidFill>
+                  </a:tcPr>
+                </a:tc>
+                <a:tc>
+                  <a:txBody>
+                    <a:bodyPr/>
+                    <a:lstStyle/>
+                    <a:p>
+                      <a:r>
+                        <a:rPr lang="en-US" sz="2800" dirty="0">
+                          <a:solidFill>
+                            <a:schemeClr val="tx1">
+                              <a:lumMod val="85000"/>
+                              <a:lumOff val="15000"/>
+                            </a:schemeClr>
+                          </a:solidFill>
+                        </a:rPr>
+                        <a:t>0</a:t>
+                      </a:r>
+                      <a:endParaRPr lang="de-DE" sz="2800" dirty="0">
+                        <a:solidFill>
+                          <a:schemeClr val="tx1">
+                            <a:lumMod val="85000"/>
+                            <a:lumOff val="15000"/>
+                          </a:schemeClr>
+                        </a:solidFill>
+                      </a:endParaRPr>
+                    </a:p>
+                  </a:txBody>
+                  <a:tcPr marL="405625" marR="243375" marT="243375" marB="243375">
+                    <a:lnL w="38100" cap="flat" cmpd="sng" algn="ctr">
+                      <a:solidFill>
+                        <a:srgbClr val="FFFFFF"/>
+                      </a:solidFill>
+                      <a:prstDash val="solid"/>
+                    </a:lnL>
+                    <a:lnR w="38100" cap="flat" cmpd="sng" algn="ctr">
+                      <a:solidFill>
+                        <a:srgbClr val="FFFFFF"/>
+                      </a:solidFill>
+                      <a:prstDash val="solid"/>
+                    </a:lnR>
+                    <a:lnT w="38100" cap="flat" cmpd="sng" algn="ctr">
+                      <a:solidFill>
+                        <a:srgbClr val="FFFFFF"/>
+                      </a:solidFill>
+                      <a:prstDash val="solid"/>
+                    </a:lnT>
+                    <a:lnB w="38100" cap="flat" cmpd="sng" algn="ctr">
+                      <a:solidFill>
+                        <a:srgbClr val="FFFFFF"/>
+                      </a:solidFill>
+                      <a:prstDash val="solid"/>
+                    </a:lnB>
+                    <a:solidFill>
+                      <a:srgbClr val="878E8B">
+                        <a:alpha val="14902"/>
+                      </a:srgbClr>
+                    </a:solidFill>
+                  </a:tcPr>
+                </a:tc>
+                <a:tc>
+                  <a:txBody>
+                    <a:bodyPr/>
+                    <a:lstStyle/>
+                    <a:p>
+                      <a:r>
+                        <a:rPr lang="en-US" sz="2800" dirty="0">
+                          <a:solidFill>
+                            <a:schemeClr val="tx1">
+                              <a:lumMod val="85000"/>
+                              <a:lumOff val="15000"/>
+                            </a:schemeClr>
+                          </a:solidFill>
+                        </a:rPr>
+                        <a:t>0</a:t>
+                      </a:r>
+                      <a:endParaRPr lang="de-DE" sz="2800" dirty="0">
+                        <a:solidFill>
+                          <a:schemeClr val="tx1">
+                            <a:lumMod val="85000"/>
+                            <a:lumOff val="15000"/>
+                          </a:schemeClr>
+                        </a:solidFill>
+                      </a:endParaRPr>
+                    </a:p>
+                  </a:txBody>
+                  <a:tcPr marL="405625" marR="243375" marT="243375" marB="243375">
+                    <a:lnL w="38100" cap="flat" cmpd="sng" algn="ctr">
+                      <a:solidFill>
+                        <a:srgbClr val="FFFFFF"/>
+                      </a:solidFill>
+                      <a:prstDash val="solid"/>
+                    </a:lnL>
+                    <a:lnR w="38100" cap="flat" cmpd="sng" algn="ctr">
+                      <a:solidFill>
+                        <a:srgbClr val="FFFFFF"/>
+                      </a:solidFill>
+                      <a:prstDash val="solid"/>
+                    </a:lnR>
+                    <a:lnT w="38100" cap="flat" cmpd="sng" algn="ctr">
+                      <a:solidFill>
+                        <a:srgbClr val="FFFFFF"/>
+                      </a:solidFill>
+                      <a:prstDash val="solid"/>
+                    </a:lnT>
+                    <a:lnB w="38100" cap="flat" cmpd="sng" algn="ctr">
+                      <a:solidFill>
+                        <a:srgbClr val="FFFFFF"/>
+                      </a:solidFill>
+                      <a:prstDash val="solid"/>
+                    </a:lnB>
+                    <a:solidFill>
+                      <a:srgbClr val="878E8B">
+                        <a:alpha val="14902"/>
+                      </a:srgbClr>
+                    </a:solidFill>
+                  </a:tcPr>
+                </a:tc>
+                <a:tc>
+                  <a:txBody>
+                    <a:bodyPr/>
+                    <a:lstStyle/>
+                    <a:p>
+                      <a:r>
+                        <a:rPr lang="en-US" sz="2800" dirty="0">
+                          <a:solidFill>
+                            <a:schemeClr val="tx1">
+                              <a:lumMod val="85000"/>
+                              <a:lumOff val="15000"/>
+                            </a:schemeClr>
+                          </a:solidFill>
+                        </a:rPr>
+                        <a:t>0</a:t>
+                      </a:r>
+                      <a:endParaRPr lang="de-DE" sz="2800" dirty="0">
+                        <a:solidFill>
+                          <a:schemeClr val="tx1">
+                            <a:lumMod val="85000"/>
+                            <a:lumOff val="15000"/>
+                          </a:schemeClr>
+                        </a:solidFill>
+                      </a:endParaRPr>
+                    </a:p>
+                  </a:txBody>
+                  <a:tcPr marL="405625" marR="243375" marT="243375" marB="243375">
+                    <a:lnL w="38100" cap="flat" cmpd="sng" algn="ctr">
+                      <a:solidFill>
+                        <a:srgbClr val="FFFFFF"/>
+                      </a:solidFill>
+                      <a:prstDash val="solid"/>
+                    </a:lnL>
+                    <a:lnR w="38100" cap="flat" cmpd="sng" algn="ctr">
+                      <a:solidFill>
+                        <a:srgbClr val="FFFFFF"/>
+                      </a:solidFill>
+                      <a:prstDash val="solid"/>
+                    </a:lnR>
+                    <a:lnT w="38100" cap="flat" cmpd="sng" algn="ctr">
+                      <a:solidFill>
+                        <a:srgbClr val="FFFFFF"/>
+                      </a:solidFill>
+                      <a:prstDash val="solid"/>
+                    </a:lnT>
+                    <a:lnB w="38100" cap="flat" cmpd="sng" algn="ctr">
+                      <a:solidFill>
+                        <a:srgbClr val="FFFFFF"/>
+                      </a:solidFill>
+                      <a:prstDash val="solid"/>
+                    </a:lnB>
+                    <a:solidFill>
+                      <a:srgbClr val="878E8B">
+                        <a:alpha val="14902"/>
+                      </a:srgbClr>
+                    </a:solidFill>
+                  </a:tcPr>
+                </a:tc>
+                <a:tc>
+                  <a:txBody>
+                    <a:bodyPr/>
+                    <a:lstStyle/>
+                    <a:p>
+                      <a:r>
+                        <a:rPr lang="en-US" sz="2800" dirty="0">
+                          <a:solidFill>
+                            <a:schemeClr val="tx1">
+                              <a:lumMod val="85000"/>
+                              <a:lumOff val="15000"/>
+                            </a:schemeClr>
+                          </a:solidFill>
+                        </a:rPr>
+                        <a:t>0</a:t>
+                      </a:r>
+                      <a:endParaRPr lang="de-DE" sz="2800" dirty="0">
+                        <a:solidFill>
+                          <a:schemeClr val="tx1">
+                            <a:lumMod val="85000"/>
+                            <a:lumOff val="15000"/>
+                          </a:schemeClr>
+                        </a:solidFill>
+                      </a:endParaRPr>
+                    </a:p>
+                  </a:txBody>
+                  <a:tcPr marL="405625" marR="243375" marT="243375" marB="243375">
+                    <a:lnL w="38100" cap="flat" cmpd="sng" algn="ctr">
+                      <a:solidFill>
+                        <a:srgbClr val="FFFFFF"/>
+                      </a:solidFill>
+                      <a:prstDash val="solid"/>
+                    </a:lnL>
+                    <a:lnR w="38100" cap="flat" cmpd="sng" algn="ctr">
+                      <a:solidFill>
+                        <a:srgbClr val="FFFFFF"/>
+                      </a:solidFill>
+                      <a:prstDash val="solid"/>
+                    </a:lnR>
+                    <a:lnT w="38100" cap="flat" cmpd="sng" algn="ctr">
+                      <a:solidFill>
+                        <a:srgbClr val="FFFFFF"/>
+                      </a:solidFill>
+                      <a:prstDash val="solid"/>
+                    </a:lnT>
+                    <a:lnB w="38100" cap="flat" cmpd="sng" algn="ctr">
+                      <a:solidFill>
+                        <a:srgbClr val="FFFFFF"/>
+                      </a:solidFill>
+                      <a:prstDash val="solid"/>
+                    </a:lnB>
+                    <a:solidFill>
+                      <a:srgbClr val="878E8B">
+                        <a:alpha val="14902"/>
+                      </a:srgbClr>
+                    </a:solidFill>
+                  </a:tcPr>
+                </a:tc>
+                <a:tc>
+                  <a:txBody>
+                    <a:bodyPr/>
+                    <a:lstStyle/>
+                    <a:p>
+                      <a:r>
+                        <a:rPr lang="en-US" sz="2800" dirty="0">
+                          <a:solidFill>
+                            <a:schemeClr val="tx1">
+                              <a:lumMod val="85000"/>
+                              <a:lumOff val="15000"/>
+                            </a:schemeClr>
+                          </a:solidFill>
+                        </a:rPr>
+                        <a:t>0</a:t>
+                      </a:r>
+                      <a:endParaRPr lang="de-DE" sz="2800" dirty="0">
+                        <a:solidFill>
+                          <a:schemeClr val="tx1">
+                            <a:lumMod val="85000"/>
+                            <a:lumOff val="15000"/>
+                          </a:schemeClr>
+                        </a:solidFill>
+                      </a:endParaRPr>
+                    </a:p>
+                  </a:txBody>
+                  <a:tcPr marL="405625" marR="243375" marT="243375" marB="243375">
+                    <a:lnL w="38100" cap="flat" cmpd="sng" algn="ctr">
+                      <a:solidFill>
+                        <a:srgbClr val="FFFFFF"/>
+                      </a:solidFill>
+                      <a:prstDash val="solid"/>
+                    </a:lnL>
+                    <a:lnR w="12700" cmpd="sng">
+                      <a:noFill/>
+                      <a:prstDash val="solid"/>
+                    </a:lnR>
+                    <a:lnT w="38100" cap="flat" cmpd="sng" algn="ctr">
+                      <a:solidFill>
+                        <a:srgbClr val="FFFFFF"/>
+                      </a:solidFill>
+                      <a:prstDash val="solid"/>
+                    </a:lnT>
+                    <a:lnB w="38100" cap="flat" cmpd="sng" algn="ctr">
+                      <a:solidFill>
+                        <a:srgbClr val="FFFFFF"/>
+                      </a:solidFill>
+                      <a:prstDash val="solid"/>
+                    </a:lnB>
+                    <a:solidFill>
+                      <a:srgbClr val="878E8B">
+                        <a:alpha val="14902"/>
+                      </a:srgbClr>
+                    </a:solidFill>
+                  </a:tcPr>
+                </a:tc>
+                <a:extLst>
+                  <a:ext uri="{0D108BD9-81ED-4DB2-BD59-A6C34878D82A}">
+                    <a16:rowId xmlns:a16="http://schemas.microsoft.com/office/drawing/2014/main" val="4031426376"/>
+                  </a:ext>
+                </a:extLst>
+              </a:tr>
+              <a:tr h="984316">
+                <a:tc>
+                  <a:txBody>
+                    <a:bodyPr/>
+                    <a:lstStyle/>
+                    <a:p>
+                      <a:r>
+                        <a:rPr lang="en-US" sz="2800">
+                          <a:solidFill>
+                            <a:schemeClr val="tx1">
+                              <a:lumMod val="85000"/>
+                              <a:lumOff val="15000"/>
+                            </a:schemeClr>
+                          </a:solidFill>
+                        </a:rPr>
+                        <a:t>OpenMP</a:t>
+                      </a:r>
+                      <a:endParaRPr lang="de-DE" sz="2800">
+                        <a:solidFill>
+                          <a:schemeClr val="tx1">
+                            <a:lumMod val="85000"/>
+                            <a:lumOff val="15000"/>
+                          </a:schemeClr>
+                        </a:solidFill>
+                      </a:endParaRPr>
+                    </a:p>
+                  </a:txBody>
+                  <a:tcPr marL="405625" marR="243375" marT="243375" marB="243375">
+                    <a:lnL w="12700" cmpd="sng">
+                      <a:noFill/>
+                      <a:prstDash val="solid"/>
+                    </a:lnL>
+                    <a:lnR w="38100" cap="flat" cmpd="sng" algn="ctr">
+                      <a:solidFill>
+                        <a:srgbClr val="FFFFFF"/>
+                      </a:solidFill>
+                      <a:prstDash val="solid"/>
+                    </a:lnR>
+                    <a:lnT w="38100" cap="flat" cmpd="sng" algn="ctr">
+                      <a:solidFill>
+                        <a:srgbClr val="FFFFFF"/>
+                      </a:solidFill>
+                      <a:prstDash val="solid"/>
+                    </a:lnT>
+                    <a:lnB w="12700" cmpd="sng">
+                      <a:noFill/>
+                      <a:prstDash val="solid"/>
+                    </a:lnB>
+                    <a:solidFill>
+                      <a:srgbClr val="878E8B">
+                        <a:alpha val="30196"/>
+                      </a:srgbClr>
+                    </a:solidFill>
+                  </a:tcPr>
+                </a:tc>
+                <a:tc>
+                  <a:txBody>
+                    <a:bodyPr/>
+                    <a:lstStyle/>
+                    <a:p>
+                      <a:r>
+                        <a:rPr lang="en-US" sz="2800" dirty="0">
+                          <a:solidFill>
+                            <a:schemeClr val="tx1">
+                              <a:lumMod val="85000"/>
+                              <a:lumOff val="15000"/>
+                            </a:schemeClr>
+                          </a:solidFill>
+                        </a:rPr>
+                        <a:t>260</a:t>
+                      </a:r>
+                      <a:endParaRPr lang="de-DE" sz="2800" dirty="0">
+                        <a:solidFill>
+                          <a:schemeClr val="tx1">
+                            <a:lumMod val="85000"/>
+                            <a:lumOff val="15000"/>
+                          </a:schemeClr>
+                        </a:solidFill>
+                      </a:endParaRPr>
+                    </a:p>
+                  </a:txBody>
+                  <a:tcPr marL="405625" marR="243375" marT="243375" marB="243375">
+                    <a:lnL w="38100" cap="flat" cmpd="sng" algn="ctr">
+                      <a:solidFill>
+                        <a:srgbClr val="FFFFFF"/>
+                      </a:solidFill>
+                      <a:prstDash val="solid"/>
+                    </a:lnL>
+                    <a:lnR w="38100" cap="flat" cmpd="sng" algn="ctr">
+                      <a:solidFill>
+                        <a:srgbClr val="FFFFFF"/>
+                      </a:solidFill>
+                      <a:prstDash val="solid"/>
+                    </a:lnR>
+                    <a:lnT w="38100" cap="flat" cmpd="sng" algn="ctr">
+                      <a:solidFill>
+                        <a:srgbClr val="FFFFFF"/>
+                      </a:solidFill>
+                      <a:prstDash val="solid"/>
+                    </a:lnT>
+                    <a:lnB w="12700" cmpd="sng">
+                      <a:noFill/>
+                      <a:prstDash val="solid"/>
+                    </a:lnB>
+                    <a:solidFill>
+                      <a:srgbClr val="878E8B">
+                        <a:alpha val="30196"/>
+                      </a:srgbClr>
+                    </a:solidFill>
+                  </a:tcPr>
+                </a:tc>
+                <a:tc>
+                  <a:txBody>
+                    <a:bodyPr/>
+                    <a:lstStyle/>
+                    <a:p>
+                      <a:r>
+                        <a:rPr lang="en-US" sz="2800" dirty="0">
+                          <a:solidFill>
+                            <a:schemeClr val="tx1">
+                              <a:lumMod val="85000"/>
+                              <a:lumOff val="15000"/>
+                            </a:schemeClr>
+                          </a:solidFill>
+                        </a:rPr>
+                        <a:t>500</a:t>
+                      </a:r>
+                      <a:endParaRPr lang="de-DE" sz="2800" dirty="0">
+                        <a:solidFill>
+                          <a:schemeClr val="tx1">
+                            <a:lumMod val="85000"/>
+                            <a:lumOff val="15000"/>
+                          </a:schemeClr>
+                        </a:solidFill>
+                      </a:endParaRPr>
+                    </a:p>
+                  </a:txBody>
+                  <a:tcPr marL="405625" marR="243375" marT="243375" marB="243375">
+                    <a:lnL w="38100" cap="flat" cmpd="sng" algn="ctr">
+                      <a:solidFill>
+                        <a:srgbClr val="FFFFFF"/>
+                      </a:solidFill>
+                      <a:prstDash val="solid"/>
+                    </a:lnL>
+                    <a:lnR w="38100" cap="flat" cmpd="sng" algn="ctr">
+                      <a:solidFill>
+                        <a:srgbClr val="FFFFFF"/>
+                      </a:solidFill>
+                      <a:prstDash val="solid"/>
+                    </a:lnR>
+                    <a:lnT w="38100" cap="flat" cmpd="sng" algn="ctr">
+                      <a:solidFill>
+                        <a:srgbClr val="FFFFFF"/>
+                      </a:solidFill>
+                      <a:prstDash val="solid"/>
+                    </a:lnT>
+                    <a:lnB w="12700" cmpd="sng">
+                      <a:noFill/>
+                      <a:prstDash val="solid"/>
+                    </a:lnB>
+                    <a:solidFill>
+                      <a:srgbClr val="878E8B">
+                        <a:alpha val="30196"/>
+                      </a:srgbClr>
+                    </a:solidFill>
+                  </a:tcPr>
+                </a:tc>
+                <a:tc>
+                  <a:txBody>
+                    <a:bodyPr/>
+                    <a:lstStyle/>
+                    <a:p>
+                      <a:r>
+                        <a:rPr lang="en-US" sz="2800" dirty="0">
+                          <a:solidFill>
+                            <a:schemeClr val="tx1">
+                              <a:lumMod val="85000"/>
+                              <a:lumOff val="15000"/>
+                            </a:schemeClr>
+                          </a:solidFill>
+                        </a:rPr>
+                        <a:t>1210</a:t>
+                      </a:r>
+                      <a:endParaRPr lang="de-DE" sz="2800" dirty="0">
+                        <a:solidFill>
+                          <a:schemeClr val="tx1">
+                            <a:lumMod val="85000"/>
+                            <a:lumOff val="15000"/>
+                          </a:schemeClr>
+                        </a:solidFill>
+                      </a:endParaRPr>
+                    </a:p>
+                  </a:txBody>
+                  <a:tcPr marL="405625" marR="243375" marT="243375" marB="243375">
+                    <a:lnL w="38100" cap="flat" cmpd="sng" algn="ctr">
+                      <a:solidFill>
+                        <a:srgbClr val="FFFFFF"/>
+                      </a:solidFill>
+                      <a:prstDash val="solid"/>
+                    </a:lnL>
+                    <a:lnR w="38100" cap="flat" cmpd="sng" algn="ctr">
+                      <a:solidFill>
+                        <a:srgbClr val="FFFFFF"/>
+                      </a:solidFill>
+                      <a:prstDash val="solid"/>
+                    </a:lnR>
+                    <a:lnT w="38100" cap="flat" cmpd="sng" algn="ctr">
+                      <a:solidFill>
+                        <a:srgbClr val="FFFFFF"/>
+                      </a:solidFill>
+                      <a:prstDash val="solid"/>
+                    </a:lnT>
+                    <a:lnB w="12700" cmpd="sng">
+                      <a:noFill/>
+                      <a:prstDash val="solid"/>
+                    </a:lnB>
+                    <a:solidFill>
+                      <a:srgbClr val="878E8B">
+                        <a:alpha val="30196"/>
+                      </a:srgbClr>
+                    </a:solidFill>
+                  </a:tcPr>
+                </a:tc>
+                <a:tc>
+                  <a:txBody>
+                    <a:bodyPr/>
+                    <a:lstStyle/>
+                    <a:p>
+                      <a:r>
+                        <a:rPr lang="en-US" sz="2800" dirty="0">
+                          <a:solidFill>
+                            <a:schemeClr val="tx1">
+                              <a:lumMod val="85000"/>
+                              <a:lumOff val="15000"/>
+                            </a:schemeClr>
+                          </a:solidFill>
+                        </a:rPr>
+                        <a:t>4530</a:t>
+                      </a:r>
+                      <a:endParaRPr lang="de-DE" sz="2800" dirty="0">
+                        <a:solidFill>
+                          <a:schemeClr val="tx1">
+                            <a:lumMod val="85000"/>
+                            <a:lumOff val="15000"/>
+                          </a:schemeClr>
+                        </a:solidFill>
+                      </a:endParaRPr>
+                    </a:p>
+                  </a:txBody>
+                  <a:tcPr marL="405625" marR="243375" marT="243375" marB="243375">
+                    <a:lnL w="38100" cap="flat" cmpd="sng" algn="ctr">
+                      <a:solidFill>
+                        <a:srgbClr val="FFFFFF"/>
+                      </a:solidFill>
+                      <a:prstDash val="solid"/>
+                    </a:lnL>
+                    <a:lnR w="38100" cap="flat" cmpd="sng" algn="ctr">
+                      <a:solidFill>
+                        <a:srgbClr val="FFFFFF"/>
+                      </a:solidFill>
+                      <a:prstDash val="solid"/>
+                    </a:lnR>
+                    <a:lnT w="38100" cap="flat" cmpd="sng" algn="ctr">
+                      <a:solidFill>
+                        <a:srgbClr val="FFFFFF"/>
+                      </a:solidFill>
+                      <a:prstDash val="solid"/>
+                    </a:lnT>
+                    <a:lnB w="12700" cmpd="sng">
+                      <a:noFill/>
+                      <a:prstDash val="solid"/>
+                    </a:lnB>
+                    <a:solidFill>
+                      <a:srgbClr val="878E8B">
+                        <a:alpha val="30196"/>
+                      </a:srgbClr>
+                    </a:solidFill>
+                  </a:tcPr>
+                </a:tc>
+                <a:tc>
+                  <a:txBody>
+                    <a:bodyPr/>
+                    <a:lstStyle/>
+                    <a:p>
+                      <a:r>
+                        <a:rPr lang="en-US" sz="2800" dirty="0">
+                          <a:solidFill>
+                            <a:schemeClr val="tx1">
+                              <a:lumMod val="85000"/>
+                              <a:lumOff val="15000"/>
+                            </a:schemeClr>
+                          </a:solidFill>
+                        </a:rPr>
+                        <a:t>33393</a:t>
+                      </a:r>
+                      <a:endParaRPr lang="de-DE" sz="2800" dirty="0">
+                        <a:solidFill>
+                          <a:schemeClr val="tx1">
+                            <a:lumMod val="85000"/>
+                            <a:lumOff val="15000"/>
+                          </a:schemeClr>
+                        </a:solidFill>
+                      </a:endParaRPr>
+                    </a:p>
+                  </a:txBody>
+                  <a:tcPr marL="405625" marR="243375" marT="243375" marB="243375">
+                    <a:lnL w="38100" cap="flat" cmpd="sng" algn="ctr">
+                      <a:solidFill>
+                        <a:srgbClr val="FFFFFF"/>
+                      </a:solidFill>
+                      <a:prstDash val="solid"/>
+                    </a:lnL>
+                    <a:lnR w="12700" cmpd="sng">
+                      <a:noFill/>
+                      <a:prstDash val="solid"/>
+                    </a:lnR>
+                    <a:lnT w="38100" cap="flat" cmpd="sng" algn="ctr">
+                      <a:solidFill>
+                        <a:srgbClr val="FFFFFF"/>
+                      </a:solidFill>
+                      <a:prstDash val="solid"/>
+                    </a:lnT>
+                    <a:lnB w="12700" cmpd="sng">
+                      <a:noFill/>
+                      <a:prstDash val="solid"/>
+                    </a:lnB>
+                    <a:solidFill>
+                      <a:srgbClr val="878E8B">
+                        <a:alpha val="30196"/>
+                      </a:srgbClr>
+                    </a:solidFill>
+                  </a:tcPr>
+                </a:tc>
+                <a:extLst>
+                  <a:ext uri="{0D108BD9-81ED-4DB2-BD59-A6C34878D82A}">
+                    <a16:rowId xmlns:a16="http://schemas.microsoft.com/office/drawing/2014/main" val="4186416659"/>
+                  </a:ext>
+                </a:extLst>
+              </a:tr>
+            </a:tbl>
+          </a:graphicData>
+        </a:graphic>
+      </p:graphicFrame>
+      <p:sp>
+        <p:nvSpPr>
+          <p:cNvPr id="3" name="Textfeld 2">
+            <a:extLst>
+              <a:ext uri="{FF2B5EF4-FFF2-40B4-BE49-F238E27FC236}">
+                <a16:creationId xmlns:a16="http://schemas.microsoft.com/office/drawing/2014/main" id="{246C933C-1B19-4985-B3C9-EBD53957CEB3}"/>
+              </a:ext>
+            </a:extLst>
+          </p:cNvPr>
+          <p:cNvSpPr txBox="1"/>
+          <p:nvPr/>
+        </p:nvSpPr>
+        <p:spPr>
+          <a:xfrm>
+            <a:off x="2698044" y="3656210"/>
+            <a:ext cx="7382934" cy="369332"/>
+          </a:xfrm>
+          <a:prstGeom prst="rect">
+            <a:avLst/>
+          </a:prstGeom>
+          <a:noFill/>
+        </p:spPr>
+        <p:txBody>
+          <a:bodyPr wrap="square" rtlCol="0">
+            <a:spAutoFit/>
+          </a:bodyPr>
+          <a:lstStyle/>
+          <a:p>
+            <a:pPr algn="r"/>
+            <a:r>
+              <a:rPr lang="en-US" dirty="0"/>
+              <a:t>Intel I5 8600K @ 4 x 3,6 GHZ</a:t>
+            </a:r>
+            <a:endParaRPr lang="de-DE" dirty="0"/>
+          </a:p>
+        </p:txBody>
+      </p:sp>
+    </p:spTree>
+    <p:extLst>
+      <p:ext uri="{BB962C8B-B14F-4D97-AF65-F5344CB8AC3E}">
+        <p14:creationId xmlns:p14="http://schemas.microsoft.com/office/powerpoint/2010/main" val="3384895520"/>
+      </p:ext>
+    </p:extLst>
+  </p:cSld>
+  <p:clrMapOvr>
+    <a:masterClrMapping/>
+  </p:clrMapOvr>
+</p:sld>
+</file>
+
+<file path=ppt/slides/slide15.xml><?xml version="1.0" encoding="utf-8"?>
 <p:sld xmlns:a="http://schemas.openxmlformats.org/drawingml/2006/main" xmlns:r="http://schemas.openxmlformats.org/officeDocument/2006/relationships" xmlns:p="http://schemas.openxmlformats.org/presentationml/2006/main">
   <p:cSld>
     <p:bg>
@@ -7408,12 +9002,12 @@
           <a:p>
             <a:pPr algn="r"/>
             <a:r>
-              <a:rPr lang="en-US" dirty="0">
+              <a:rPr lang="en-US" sz="4100" dirty="0">
                 <a:solidFill>
                   <a:schemeClr val="accent1"/>
                 </a:solidFill>
               </a:rPr>
-              <a:t>Exercise 2 Game of Life</a:t>
+              <a:t>Exercise 1 Parallelization of Addition</a:t>
             </a:r>
           </a:p>
         </p:txBody>
@@ -7503,6 +9097,263 @@
           <a:p>
             <a:r>
               <a:rPr lang="en-US" sz="2400" dirty="0"/>
+              <a:t>Why is there the same performance in the Release configuration?</a:t>
+            </a:r>
+          </a:p>
+          <a:p>
+            <a:endParaRPr lang="en-US" sz="2400" dirty="0"/>
+          </a:p>
+          <a:p>
+            <a:endParaRPr lang="en-US" sz="2400" dirty="0"/>
+          </a:p>
+          <a:p>
+            <a:r>
+              <a:rPr lang="en-US" sz="2400" dirty="0"/>
+              <a:t>Are there differences between the results with a Debug and a Release build?</a:t>
+            </a:r>
+          </a:p>
+          <a:p>
+            <a:endParaRPr lang="en-US" sz="2400" dirty="0"/>
+          </a:p>
+          <a:p>
+            <a:endParaRPr lang="en-US" sz="2400" dirty="0"/>
+          </a:p>
+          <a:p>
+            <a:r>
+              <a:rPr lang="en-US" sz="2400" dirty="0"/>
+              <a:t>How many resources are occupied by your system during execution?</a:t>
+            </a:r>
+          </a:p>
+        </p:txBody>
+      </p:sp>
+    </p:spTree>
+    <p:extLst>
+      <p:ext uri="{BB962C8B-B14F-4D97-AF65-F5344CB8AC3E}">
+        <p14:creationId xmlns:p14="http://schemas.microsoft.com/office/powerpoint/2010/main" val="2737949822"/>
+      </p:ext>
+    </p:extLst>
+  </p:cSld>
+  <p:clrMapOvr>
+    <a:masterClrMapping/>
+  </p:clrMapOvr>
+</p:sld>
+</file>
+
+<file path=ppt/slides/slide16.xml><?xml version="1.0" encoding="utf-8"?>
+<p:sld xmlns:a="http://schemas.openxmlformats.org/drawingml/2006/main" xmlns:r="http://schemas.openxmlformats.org/officeDocument/2006/relationships" xmlns:p="http://schemas.openxmlformats.org/presentationml/2006/main">
+  <p:cSld>
+    <p:bg>
+      <p:bgPr>
+        <a:solidFill>
+          <a:schemeClr val="bg1"/>
+        </a:solidFill>
+        <a:effectLst/>
+      </p:bgPr>
+    </p:bg>
+    <p:spTree>
+      <p:nvGrpSpPr>
+        <p:cNvPr id="1" name=""/>
+        <p:cNvGrpSpPr/>
+        <p:nvPr/>
+      </p:nvGrpSpPr>
+      <p:grpSpPr>
+        <a:xfrm>
+          <a:off x="0" y="0"/>
+          <a:ext cx="0" cy="0"/>
+          <a:chOff x="0" y="0"/>
+          <a:chExt cx="0" cy="0"/>
+        </a:xfrm>
+      </p:grpSpPr>
+      <p:sp>
+        <p:nvSpPr>
+          <p:cNvPr id="8" name="Rectangle 7">
+            <a:extLst>
+              <a:ext uri="{FF2B5EF4-FFF2-40B4-BE49-F238E27FC236}">
+                <a16:creationId xmlns:a16="http://schemas.microsoft.com/office/drawing/2014/main" id="{8D70B121-56F4-4848-B38B-182089D909FA}"/>
+              </a:ext>
+              <a:ext uri="{C183D7F6-B498-43B3-948B-1728B52AA6E4}">
+                <adec:decorative xmlns:adec="http://schemas.microsoft.com/office/drawing/2017/decorative" val="1"/>
+              </a:ext>
+            </a:extLst>
+          </p:cNvPr>
+          <p:cNvSpPr>
+            <a:spLocks noGrp="1" noRot="1" noChangeAspect="1" noMove="1" noResize="1" noEditPoints="1" noAdjustHandles="1" noChangeArrowheads="1" noChangeShapeType="1" noTextEdit="1"/>
+          </p:cNvSpPr>
+          <p:nvPr>
+            <p:extLst>
+              <p:ext uri="{386F3935-93C4-4BCD-93E2-E3B085C9AB24}">
+                <p16:designElem xmlns:p16="http://schemas.microsoft.com/office/powerpoint/2015/main" val="1"/>
+              </p:ext>
+            </p:extLst>
+          </p:nvPr>
+        </p:nvSpPr>
+        <p:spPr bwMode="ltGray">
+          <a:xfrm>
+            <a:off x="321564" y="320040"/>
+            <a:ext cx="11548872" cy="6217920"/>
+          </a:xfrm>
+          <a:prstGeom prst="rect">
+            <a:avLst/>
+          </a:prstGeom>
+          <a:solidFill>
+            <a:schemeClr val="tx1">
+              <a:alpha val="8000"/>
+            </a:schemeClr>
+          </a:solidFill>
+          <a:ln w="127000" cap="sq" cmpd="thinThick">
+            <a:noFill/>
+          </a:ln>
+        </p:spPr>
+        <p:style>
+          <a:lnRef idx="2">
+            <a:schemeClr val="accent1">
+              <a:shade val="50000"/>
+            </a:schemeClr>
+          </a:lnRef>
+          <a:fillRef idx="1">
+            <a:schemeClr val="accent1"/>
+          </a:fillRef>
+          <a:effectRef idx="0">
+            <a:schemeClr val="accent1"/>
+          </a:effectRef>
+          <a:fontRef idx="minor">
+            <a:schemeClr val="lt1"/>
+          </a:fontRef>
+        </p:style>
+        <p:txBody>
+          <a:bodyPr rtlCol="0" anchor="ctr"/>
+          <a:lstStyle/>
+          <a:p>
+            <a:pPr algn="ctr"/>
+            <a:endParaRPr lang="en-US"/>
+          </a:p>
+        </p:txBody>
+      </p:sp>
+      <p:sp>
+        <p:nvSpPr>
+          <p:cNvPr id="2" name="Titel 1">
+            <a:extLst>
+              <a:ext uri="{FF2B5EF4-FFF2-40B4-BE49-F238E27FC236}">
+                <a16:creationId xmlns:a16="http://schemas.microsoft.com/office/drawing/2014/main" id="{C7E3F825-1918-451E-B3AB-EE354B6B60AF}"/>
+              </a:ext>
+            </a:extLst>
+          </p:cNvPr>
+          <p:cNvSpPr>
+            <a:spLocks noGrp="1"/>
+          </p:cNvSpPr>
+          <p:nvPr>
+            <p:ph type="title"/>
+          </p:nvPr>
+        </p:nvSpPr>
+        <p:spPr>
+          <a:xfrm>
+            <a:off x="838200" y="963877"/>
+            <a:ext cx="3494362" cy="4930246"/>
+          </a:xfrm>
+        </p:spPr>
+        <p:txBody>
+          <a:bodyPr>
+            <a:normAutofit/>
+          </a:bodyPr>
+          <a:lstStyle/>
+          <a:p>
+            <a:pPr algn="r"/>
+            <a:r>
+              <a:rPr lang="en-US" dirty="0">
+                <a:solidFill>
+                  <a:schemeClr val="accent1"/>
+                </a:solidFill>
+              </a:rPr>
+              <a:t>Exercise 2 Game of Life</a:t>
+            </a:r>
+          </a:p>
+        </p:txBody>
+      </p:sp>
+      <p:cxnSp>
+        <p:nvCxnSpPr>
+          <p:cNvPr id="10" name="Straight Connector 9">
+            <a:extLst>
+              <a:ext uri="{FF2B5EF4-FFF2-40B4-BE49-F238E27FC236}">
+                <a16:creationId xmlns:a16="http://schemas.microsoft.com/office/drawing/2014/main" id="{2D72A2C9-F3CA-4216-8BAD-FA4C970C3C4E}"/>
+              </a:ext>
+              <a:ext uri="{C183D7F6-B498-43B3-948B-1728B52AA6E4}">
+                <adec:decorative xmlns:adec="http://schemas.microsoft.com/office/drawing/2017/decorative" val="1"/>
+              </a:ext>
+            </a:extLst>
+          </p:cNvPr>
+          <p:cNvCxnSpPr>
+            <a:cxnSpLocks noGrp="1" noRot="1" noChangeAspect="1" noMove="1" noResize="1" noEditPoints="1" noAdjustHandles="1" noChangeArrowheads="1" noChangeShapeType="1"/>
+          </p:cNvCxnSpPr>
+          <p:nvPr>
+            <p:extLst>
+              <p:ext uri="{386F3935-93C4-4BCD-93E2-E3B085C9AB24}">
+                <p16:designElem xmlns:p16="http://schemas.microsoft.com/office/powerpoint/2015/main" val="1"/>
+              </p:ext>
+            </p:extLst>
+          </p:nvPr>
+        </p:nvCxnSpPr>
+        <p:spPr>
+          <a:xfrm>
+            <a:off x="4654296" y="2057400"/>
+            <a:ext cx="0" cy="2743200"/>
+          </a:xfrm>
+          <a:prstGeom prst="line">
+            <a:avLst/>
+          </a:prstGeom>
+          <a:ln w="19050">
+            <a:solidFill>
+              <a:schemeClr val="tx1">
+                <a:lumMod val="85000"/>
+                <a:lumOff val="15000"/>
+              </a:schemeClr>
+            </a:solidFill>
+          </a:ln>
+        </p:spPr>
+        <p:style>
+          <a:lnRef idx="1">
+            <a:schemeClr val="accent1"/>
+          </a:lnRef>
+          <a:fillRef idx="0">
+            <a:schemeClr val="accent1"/>
+          </a:fillRef>
+          <a:effectRef idx="0">
+            <a:schemeClr val="accent1"/>
+          </a:effectRef>
+          <a:fontRef idx="minor">
+            <a:schemeClr val="tx1"/>
+          </a:fontRef>
+        </p:style>
+      </p:cxnSp>
+      <p:sp>
+        <p:nvSpPr>
+          <p:cNvPr id="3" name="Inhaltsplatzhalter 2">
+            <a:extLst>
+              <a:ext uri="{FF2B5EF4-FFF2-40B4-BE49-F238E27FC236}">
+                <a16:creationId xmlns:a16="http://schemas.microsoft.com/office/drawing/2014/main" id="{6EFFB83E-507E-4C9F-B3D5-EF05AE455650}"/>
+              </a:ext>
+            </a:extLst>
+          </p:cNvPr>
+          <p:cNvSpPr>
+            <a:spLocks noGrp="1"/>
+          </p:cNvSpPr>
+          <p:nvPr>
+            <p:ph idx="1"/>
+          </p:nvPr>
+        </p:nvSpPr>
+        <p:spPr>
+          <a:xfrm>
+            <a:off x="4976031" y="963877"/>
+            <a:ext cx="6377769" cy="4930246"/>
+          </a:xfrm>
+        </p:spPr>
+        <p:txBody>
+          <a:bodyPr anchor="ctr">
+            <a:normAutofit/>
+          </a:bodyPr>
+          <a:lstStyle/>
+          <a:p>
+            <a:r>
+              <a:rPr lang="en-US" sz="2400" dirty="0"/>
               <a:t>Which approach seemed to work best when optimizing?</a:t>
             </a:r>
           </a:p>
@@ -7545,7 +9396,7 @@
 </p:sld>
 </file>
 
-<file path=ppt/slides/slide15.xml><?xml version="1.0" encoding="utf-8"?>
+<file path=ppt/slides/slide17.xml><?xml version="1.0" encoding="utf-8"?>
 <p:sld xmlns:a="http://schemas.openxmlformats.org/drawingml/2006/main" xmlns:r="http://schemas.openxmlformats.org/officeDocument/2006/relationships" xmlns:p="http://schemas.openxmlformats.org/presentationml/2006/main">
   <p:cSld>
     <p:bg>
@@ -7766,7 +9617,22 @@
                 <a:ea typeface="+mj-ea"/>
                 <a:cs typeface="+mj-cs"/>
               </a:rPr>
-              <a:t>Exercise 3 Quicksort Parallelization of Sections</a:t>
+              <a:t>Exercise 3 Quicksort Parallelization </a:t>
+            </a:r>
+            <a:r>
+              <a:rPr lang="en-US" sz="3200" dirty="0"/>
+              <a:t>with</a:t>
+            </a:r>
+            <a:r>
+              <a:rPr lang="en-US" sz="3200" kern="1200" dirty="0">
+                <a:solidFill>
+                  <a:schemeClr val="tx1"/>
+                </a:solidFill>
+                <a:latin typeface="+mj-lt"/>
+                <a:ea typeface="+mj-ea"/>
+                <a:cs typeface="+mj-cs"/>
+              </a:rPr>
+              <a:t> Sections</a:t>
             </a:r>
           </a:p>
         </p:txBody>
@@ -9067,7 +10933,7 @@
 </p:sld>
 </file>
 
-<file path=ppt/slides/slide16.xml><?xml version="1.0" encoding="utf-8"?>
+<file path=ppt/slides/slide18.xml><?xml version="1.0" encoding="utf-8"?>
 <p:sld xmlns:a="http://schemas.openxmlformats.org/drawingml/2006/main" xmlns:r="http://schemas.openxmlformats.org/officeDocument/2006/relationships" xmlns:p="http://schemas.openxmlformats.org/presentationml/2006/main">
   <p:cSld>
     <p:bg>
@@ -9358,7 +11224,7 @@
 </p:sld>
 </file>
 
-<file path=ppt/slides/slide17.xml><?xml version="1.0" encoding="utf-8"?>
+<file path=ppt/slides/slide19.xml><?xml version="1.0" encoding="utf-8"?>
 <p:sld xmlns:a="http://schemas.openxmlformats.org/drawingml/2006/main" xmlns:r="http://schemas.openxmlformats.org/officeDocument/2006/relationships" xmlns:p="http://schemas.openxmlformats.org/presentationml/2006/main">
   <p:cSld>
     <p:spTree>
@@ -9542,7 +11408,277 @@
 </p:sld>
 </file>
 
-<file path=ppt/slides/slide18.xml><?xml version="1.0" encoding="utf-8"?>
+<file path=ppt/slides/slide2.xml><?xml version="1.0" encoding="utf-8"?>
+<p:sld xmlns:a="http://schemas.openxmlformats.org/drawingml/2006/main" xmlns:r="http://schemas.openxmlformats.org/officeDocument/2006/relationships" xmlns:p="http://schemas.openxmlformats.org/presentationml/2006/main">
+  <p:cSld>
+    <p:bg>
+      <p:bgPr>
+        <a:solidFill>
+          <a:schemeClr val="bg1"/>
+        </a:solidFill>
+        <a:effectLst/>
+      </p:bgPr>
+    </p:bg>
+    <p:spTree>
+      <p:nvGrpSpPr>
+        <p:cNvPr id="1" name=""/>
+        <p:cNvGrpSpPr/>
+        <p:nvPr/>
+      </p:nvGrpSpPr>
+      <p:grpSpPr>
+        <a:xfrm>
+          <a:off x="0" y="0"/>
+          <a:ext cx="0" cy="0"/>
+          <a:chOff x="0" y="0"/>
+          <a:chExt cx="0" cy="0"/>
+        </a:xfrm>
+      </p:grpSpPr>
+      <p:sp>
+        <p:nvSpPr>
+          <p:cNvPr id="8" name="Rectangle 7">
+            <a:extLst>
+              <a:ext uri="{FF2B5EF4-FFF2-40B4-BE49-F238E27FC236}">
+                <a16:creationId xmlns:a16="http://schemas.microsoft.com/office/drawing/2014/main" id="{8D70B121-56F4-4848-B38B-182089D909FA}"/>
+              </a:ext>
+              <a:ext uri="{C183D7F6-B498-43B3-948B-1728B52AA6E4}">
+                <adec:decorative xmlns:adec="http://schemas.microsoft.com/office/drawing/2017/decorative" val="1"/>
+              </a:ext>
+            </a:extLst>
+          </p:cNvPr>
+          <p:cNvSpPr>
+            <a:spLocks noGrp="1" noRot="1" noChangeAspect="1" noMove="1" noResize="1" noEditPoints="1" noAdjustHandles="1" noChangeArrowheads="1" noChangeShapeType="1" noTextEdit="1"/>
+          </p:cNvSpPr>
+          <p:nvPr>
+            <p:extLst>
+              <p:ext uri="{386F3935-93C4-4BCD-93E2-E3B085C9AB24}">
+                <p16:designElem xmlns:p16="http://schemas.microsoft.com/office/powerpoint/2015/main" val="1"/>
+              </p:ext>
+            </p:extLst>
+          </p:nvPr>
+        </p:nvSpPr>
+        <p:spPr bwMode="ltGray">
+          <a:xfrm>
+            <a:off x="321564" y="320040"/>
+            <a:ext cx="11548872" cy="6217920"/>
+          </a:xfrm>
+          <a:prstGeom prst="rect">
+            <a:avLst/>
+          </a:prstGeom>
+          <a:solidFill>
+            <a:schemeClr val="tx1">
+              <a:alpha val="8000"/>
+            </a:schemeClr>
+          </a:solidFill>
+          <a:ln w="127000" cap="sq" cmpd="thinThick">
+            <a:noFill/>
+          </a:ln>
+        </p:spPr>
+        <p:style>
+          <a:lnRef idx="2">
+            <a:schemeClr val="accent1">
+              <a:shade val="50000"/>
+            </a:schemeClr>
+          </a:lnRef>
+          <a:fillRef idx="1">
+            <a:schemeClr val="accent1"/>
+          </a:fillRef>
+          <a:effectRef idx="0">
+            <a:schemeClr val="accent1"/>
+          </a:effectRef>
+          <a:fontRef idx="minor">
+            <a:schemeClr val="lt1"/>
+          </a:fontRef>
+        </p:style>
+        <p:txBody>
+          <a:bodyPr rtlCol="0" anchor="ctr"/>
+          <a:lstStyle/>
+          <a:p>
+            <a:pPr algn="ctr"/>
+            <a:endParaRPr lang="en-US"/>
+          </a:p>
+        </p:txBody>
+      </p:sp>
+      <p:sp>
+        <p:nvSpPr>
+          <p:cNvPr id="2" name="Titel 1">
+            <a:extLst>
+              <a:ext uri="{FF2B5EF4-FFF2-40B4-BE49-F238E27FC236}">
+                <a16:creationId xmlns:a16="http://schemas.microsoft.com/office/drawing/2014/main" id="{CB83ABEE-60E2-E743-A0C5-E2EE437604EF}"/>
+              </a:ext>
+            </a:extLst>
+          </p:cNvPr>
+          <p:cNvSpPr>
+            <a:spLocks noGrp="1"/>
+          </p:cNvSpPr>
+          <p:nvPr>
+            <p:ph type="title"/>
+          </p:nvPr>
+        </p:nvSpPr>
+        <p:spPr>
+          <a:xfrm>
+            <a:off x="838200" y="963877"/>
+            <a:ext cx="3494362" cy="4930246"/>
+          </a:xfrm>
+        </p:spPr>
+        <p:txBody>
+          <a:bodyPr>
+            <a:normAutofit/>
+          </a:bodyPr>
+          <a:lstStyle/>
+          <a:p>
+            <a:pPr algn="r"/>
+            <a:r>
+              <a:rPr lang="en-US" sz="3700" dirty="0">
+                <a:solidFill>
+                  <a:schemeClr val="accent1"/>
+                </a:solidFill>
+              </a:rPr>
+              <a:t>Why are parallel programs important?</a:t>
+            </a:r>
+          </a:p>
+        </p:txBody>
+      </p:sp>
+      <p:cxnSp>
+        <p:nvCxnSpPr>
+          <p:cNvPr id="10" name="Straight Connector 9">
+            <a:extLst>
+              <a:ext uri="{FF2B5EF4-FFF2-40B4-BE49-F238E27FC236}">
+                <a16:creationId xmlns:a16="http://schemas.microsoft.com/office/drawing/2014/main" id="{2D72A2C9-F3CA-4216-8BAD-FA4C970C3C4E}"/>
+              </a:ext>
+              <a:ext uri="{C183D7F6-B498-43B3-948B-1728B52AA6E4}">
+                <adec:decorative xmlns:adec="http://schemas.microsoft.com/office/drawing/2017/decorative" val="1"/>
+              </a:ext>
+            </a:extLst>
+          </p:cNvPr>
+          <p:cNvCxnSpPr>
+            <a:cxnSpLocks noGrp="1" noRot="1" noChangeAspect="1" noMove="1" noResize="1" noEditPoints="1" noAdjustHandles="1" noChangeArrowheads="1" noChangeShapeType="1"/>
+          </p:cNvCxnSpPr>
+          <p:nvPr>
+            <p:extLst>
+              <p:ext uri="{386F3935-93C4-4BCD-93E2-E3B085C9AB24}">
+                <p16:designElem xmlns:p16="http://schemas.microsoft.com/office/powerpoint/2015/main" val="1"/>
+              </p:ext>
+            </p:extLst>
+          </p:nvPr>
+        </p:nvCxnSpPr>
+        <p:spPr>
+          <a:xfrm>
+            <a:off x="4654296" y="2057400"/>
+            <a:ext cx="0" cy="2743200"/>
+          </a:xfrm>
+          <a:prstGeom prst="line">
+            <a:avLst/>
+          </a:prstGeom>
+          <a:ln w="19050">
+            <a:solidFill>
+              <a:schemeClr val="tx1">
+                <a:lumMod val="85000"/>
+                <a:lumOff val="15000"/>
+              </a:schemeClr>
+            </a:solidFill>
+          </a:ln>
+        </p:spPr>
+        <p:style>
+          <a:lnRef idx="1">
+            <a:schemeClr val="accent1"/>
+          </a:lnRef>
+          <a:fillRef idx="0">
+            <a:schemeClr val="accent1"/>
+          </a:fillRef>
+          <a:effectRef idx="0">
+            <a:schemeClr val="accent1"/>
+          </a:effectRef>
+          <a:fontRef idx="minor">
+            <a:schemeClr val="tx1"/>
+          </a:fontRef>
+        </p:style>
+      </p:cxnSp>
+      <p:sp>
+        <p:nvSpPr>
+          <p:cNvPr id="3" name="Inhaltsplatzhalter 2">
+            <a:extLst>
+              <a:ext uri="{FF2B5EF4-FFF2-40B4-BE49-F238E27FC236}">
+                <a16:creationId xmlns:a16="http://schemas.microsoft.com/office/drawing/2014/main" id="{A17B0A23-234F-F84F-961D-07333D62CC8E}"/>
+              </a:ext>
+            </a:extLst>
+          </p:cNvPr>
+          <p:cNvSpPr>
+            <a:spLocks noGrp="1"/>
+          </p:cNvSpPr>
+          <p:nvPr>
+            <p:ph idx="1"/>
+          </p:nvPr>
+        </p:nvSpPr>
+        <p:spPr>
+          <a:xfrm>
+            <a:off x="4976031" y="963877"/>
+            <a:ext cx="6377769" cy="4930246"/>
+          </a:xfrm>
+        </p:spPr>
+        <p:txBody>
+          <a:bodyPr anchor="ctr">
+            <a:normAutofit/>
+          </a:bodyPr>
+          <a:lstStyle/>
+          <a:p>
+            <a:r>
+              <a:rPr lang="en-US" sz="2400" dirty="0"/>
+              <a:t>Moore‘s Law -&gt; Every 18 months the transistor density doubles</a:t>
+            </a:r>
+          </a:p>
+          <a:p>
+            <a:r>
+              <a:rPr lang="en-US" sz="2400" dirty="0"/>
+              <a:t>Higher power demand and more heat output</a:t>
+            </a:r>
+          </a:p>
+          <a:p>
+            <a:r>
+              <a:rPr lang="en-US" sz="2400" dirty="0"/>
+              <a:t>Even more performance?</a:t>
+            </a:r>
+          </a:p>
+          <a:p>
+            <a:pPr lvl="1"/>
+            <a:r>
+              <a:rPr lang="en-US" dirty="0"/>
+              <a:t>Higher frequency =&gt; shorter life span of processors</a:t>
+            </a:r>
+          </a:p>
+          <a:p>
+            <a:r>
+              <a:rPr lang="en-US" sz="2400" dirty="0"/>
+              <a:t>Or simply: </a:t>
+            </a:r>
+            <a:r>
+              <a:rPr lang="en-US" sz="2400" b="1" dirty="0"/>
+              <a:t>Use more processors</a:t>
+            </a:r>
+            <a:r>
+              <a:rPr lang="en-US" sz="2400" dirty="0"/>
+              <a:t>!</a:t>
+            </a:r>
+          </a:p>
+          <a:p>
+            <a:pPr lvl="1"/>
+            <a:endParaRPr lang="en-US" dirty="0"/>
+          </a:p>
+        </p:txBody>
+      </p:sp>
+    </p:spTree>
+    <p:extLst>
+      <p:ext uri="{BB962C8B-B14F-4D97-AF65-F5344CB8AC3E}">
+        <p14:creationId xmlns:p14="http://schemas.microsoft.com/office/powerpoint/2010/main" val="400010253"/>
+      </p:ext>
+    </p:extLst>
+  </p:cSld>
+  <p:clrMapOvr>
+    <a:masterClrMapping/>
+  </p:clrMapOvr>
+</p:sld>
+</file>
+
+<file path=ppt/slides/slide20.xml><?xml version="1.0" encoding="utf-8"?>
 <p:sld xmlns:a="http://schemas.openxmlformats.org/drawingml/2006/main" xmlns:r="http://schemas.openxmlformats.org/officeDocument/2006/relationships" xmlns:p="http://schemas.openxmlformats.org/presentationml/2006/main">
   <p:cSld>
     <p:spTree>
@@ -9726,7 +11862,7 @@
 </p:sld>
 </file>
 
-<file path=ppt/slides/slide19.xml><?xml version="1.0" encoding="utf-8"?>
+<file path=ppt/slides/slide21.xml><?xml version="1.0" encoding="utf-8"?>
 <p:sld xmlns:a="http://schemas.openxmlformats.org/drawingml/2006/main" xmlns:r="http://schemas.openxmlformats.org/officeDocument/2006/relationships" xmlns:p="http://schemas.openxmlformats.org/presentationml/2006/main">
   <p:cSld>
     <p:bg>
@@ -9987,7 +12123,7 @@
 </p:sld>
 </file>
 
-<file path=ppt/slides/slide2.xml><?xml version="1.0" encoding="utf-8"?>
+<file path=ppt/slides/slide3.xml><?xml version="1.0" encoding="utf-8"?>
 <p:sld xmlns:a="http://schemas.openxmlformats.org/drawingml/2006/main" xmlns:r="http://schemas.openxmlformats.org/officeDocument/2006/relationships" xmlns:p="http://schemas.openxmlformats.org/presentationml/2006/main">
   <p:cSld>
     <p:bg>
@@ -10082,7 +12218,7 @@
           <p:cNvPr id="2" name="Titel 1">
             <a:extLst>
               <a:ext uri="{FF2B5EF4-FFF2-40B4-BE49-F238E27FC236}">
-                <a16:creationId xmlns:a16="http://schemas.microsoft.com/office/drawing/2014/main" id="{CB83ABEE-60E2-E743-A0C5-E2EE437604EF}"/>
+                <a16:creationId xmlns:a16="http://schemas.microsoft.com/office/drawing/2014/main" id="{F5B0C704-E40E-CA4D-951F-C2C4E1529125}"/>
               </a:ext>
             </a:extLst>
           </p:cNvPr>
@@ -10107,286 +12243,12 @@
           <a:p>
             <a:pPr algn="r"/>
             <a:r>
-              <a:rPr lang="en-US" sz="3700" dirty="0">
-                <a:solidFill>
-                  <a:schemeClr val="accent1"/>
-                </a:solidFill>
-              </a:rPr>
-              <a:t>Why are parallel programs important?</a:t>
-            </a:r>
-          </a:p>
-        </p:txBody>
-      </p:sp>
-      <p:cxnSp>
-        <p:nvCxnSpPr>
-          <p:cNvPr id="10" name="Straight Connector 9">
-            <a:extLst>
-              <a:ext uri="{FF2B5EF4-FFF2-40B4-BE49-F238E27FC236}">
-                <a16:creationId xmlns:a16="http://schemas.microsoft.com/office/drawing/2014/main" id="{2D72A2C9-F3CA-4216-8BAD-FA4C970C3C4E}"/>
-              </a:ext>
-              <a:ext uri="{C183D7F6-B498-43B3-948B-1728B52AA6E4}">
-                <adec:decorative xmlns:adec="http://schemas.microsoft.com/office/drawing/2017/decorative" val="1"/>
-              </a:ext>
-            </a:extLst>
-          </p:cNvPr>
-          <p:cNvCxnSpPr>
-            <a:cxnSpLocks noGrp="1" noRot="1" noChangeAspect="1" noMove="1" noResize="1" noEditPoints="1" noAdjustHandles="1" noChangeArrowheads="1" noChangeShapeType="1"/>
-          </p:cNvCxnSpPr>
-          <p:nvPr>
-            <p:extLst>
-              <p:ext uri="{386F3935-93C4-4BCD-93E2-E3B085C9AB24}">
-                <p16:designElem xmlns:p16="http://schemas.microsoft.com/office/powerpoint/2015/main" val="1"/>
-              </p:ext>
-            </p:extLst>
-          </p:nvPr>
-        </p:nvCxnSpPr>
-        <p:spPr>
-          <a:xfrm>
-            <a:off x="4654296" y="2057400"/>
-            <a:ext cx="0" cy="2743200"/>
-          </a:xfrm>
-          <a:prstGeom prst="line">
-            <a:avLst/>
-          </a:prstGeom>
-          <a:ln w="19050">
-            <a:solidFill>
-              <a:schemeClr val="tx1">
-                <a:lumMod val="85000"/>
-                <a:lumOff val="15000"/>
-              </a:schemeClr>
-            </a:solidFill>
-          </a:ln>
-        </p:spPr>
-        <p:style>
-          <a:lnRef idx="1">
-            <a:schemeClr val="accent1"/>
-          </a:lnRef>
-          <a:fillRef idx="0">
-            <a:schemeClr val="accent1"/>
-          </a:fillRef>
-          <a:effectRef idx="0">
-            <a:schemeClr val="accent1"/>
-          </a:effectRef>
-          <a:fontRef idx="minor">
-            <a:schemeClr val="tx1"/>
-          </a:fontRef>
-        </p:style>
-      </p:cxnSp>
-      <p:sp>
-        <p:nvSpPr>
-          <p:cNvPr id="3" name="Inhaltsplatzhalter 2">
-            <a:extLst>
-              <a:ext uri="{FF2B5EF4-FFF2-40B4-BE49-F238E27FC236}">
-                <a16:creationId xmlns:a16="http://schemas.microsoft.com/office/drawing/2014/main" id="{A17B0A23-234F-F84F-961D-07333D62CC8E}"/>
-              </a:ext>
-            </a:extLst>
-          </p:cNvPr>
-          <p:cNvSpPr>
-            <a:spLocks noGrp="1"/>
-          </p:cNvSpPr>
-          <p:nvPr>
-            <p:ph idx="1"/>
-          </p:nvPr>
-        </p:nvSpPr>
-        <p:spPr>
-          <a:xfrm>
-            <a:off x="4976031" y="963877"/>
-            <a:ext cx="6377769" cy="4930246"/>
-          </a:xfrm>
-        </p:spPr>
-        <p:txBody>
-          <a:bodyPr anchor="ctr">
-            <a:normAutofit/>
-          </a:bodyPr>
-          <a:lstStyle/>
-          <a:p>
-            <a:r>
-              <a:rPr lang="de-DE" sz="2400" dirty="0" err="1"/>
-              <a:t>Moore‘s</a:t>
-            </a:r>
-            <a:r>
-              <a:rPr lang="de-DE" sz="2400" dirty="0"/>
-              <a:t> Law -&gt; Alle 18 Monate verdoppelt sich die Transistoren-Dichte in Chips &amp; Prozessoren</a:t>
-            </a:r>
-          </a:p>
-          <a:p>
-            <a:r>
-              <a:rPr lang="de-DE" sz="2400" dirty="0"/>
-              <a:t>Höherer Leistungsbedarf für Chips und mehr Wärmeentwicklung</a:t>
-            </a:r>
-          </a:p>
-          <a:p>
-            <a:r>
-              <a:rPr lang="de-DE" sz="2400" dirty="0"/>
-              <a:t>Noch mehr Leistung?</a:t>
-            </a:r>
-          </a:p>
-          <a:p>
-            <a:pPr lvl="1"/>
-            <a:r>
-              <a:rPr lang="de-DE" dirty="0"/>
-              <a:t>Höhere Frequenz =&gt; kürzere Lebensdauer der Prozessoren</a:t>
-            </a:r>
-          </a:p>
-          <a:p>
-            <a:r>
-              <a:rPr lang="de-DE" sz="2400" dirty="0"/>
-              <a:t>Oder eben: </a:t>
-            </a:r>
-            <a:r>
-              <a:rPr lang="de-DE" sz="2400" b="1" dirty="0"/>
-              <a:t>mehr Prozessoren</a:t>
-            </a:r>
-            <a:r>
-              <a:rPr lang="de-DE" sz="2400" dirty="0"/>
-              <a:t>!</a:t>
-            </a:r>
-          </a:p>
-          <a:p>
-            <a:pPr lvl="1"/>
-            <a:endParaRPr lang="de-DE" dirty="0"/>
-          </a:p>
-        </p:txBody>
-      </p:sp>
-    </p:spTree>
-    <p:extLst>
-      <p:ext uri="{BB962C8B-B14F-4D97-AF65-F5344CB8AC3E}">
-        <p14:creationId xmlns:p14="http://schemas.microsoft.com/office/powerpoint/2010/main" val="400010253"/>
-      </p:ext>
-    </p:extLst>
-  </p:cSld>
-  <p:clrMapOvr>
-    <a:masterClrMapping/>
-  </p:clrMapOvr>
-</p:sld>
-</file>
-
-<file path=ppt/slides/slide3.xml><?xml version="1.0" encoding="utf-8"?>
-<p:sld xmlns:a="http://schemas.openxmlformats.org/drawingml/2006/main" xmlns:r="http://schemas.openxmlformats.org/officeDocument/2006/relationships" xmlns:p="http://schemas.openxmlformats.org/presentationml/2006/main">
-  <p:cSld>
-    <p:bg>
-      <p:bgPr>
-        <a:solidFill>
-          <a:schemeClr val="bg1"/>
-        </a:solidFill>
-        <a:effectLst/>
-      </p:bgPr>
-    </p:bg>
-    <p:spTree>
-      <p:nvGrpSpPr>
-        <p:cNvPr id="1" name=""/>
-        <p:cNvGrpSpPr/>
-        <p:nvPr/>
-      </p:nvGrpSpPr>
-      <p:grpSpPr>
-        <a:xfrm>
-          <a:off x="0" y="0"/>
-          <a:ext cx="0" cy="0"/>
-          <a:chOff x="0" y="0"/>
-          <a:chExt cx="0" cy="0"/>
-        </a:xfrm>
-      </p:grpSpPr>
-      <p:sp>
-        <p:nvSpPr>
-          <p:cNvPr id="8" name="Rectangle 7">
-            <a:extLst>
-              <a:ext uri="{FF2B5EF4-FFF2-40B4-BE49-F238E27FC236}">
-                <a16:creationId xmlns:a16="http://schemas.microsoft.com/office/drawing/2014/main" id="{8D70B121-56F4-4848-B38B-182089D909FA}"/>
-              </a:ext>
-              <a:ext uri="{C183D7F6-B498-43B3-948B-1728B52AA6E4}">
-                <adec:decorative xmlns:adec="http://schemas.microsoft.com/office/drawing/2017/decorative" val="1"/>
-              </a:ext>
-            </a:extLst>
-          </p:cNvPr>
-          <p:cNvSpPr>
-            <a:spLocks noGrp="1" noRot="1" noChangeAspect="1" noMove="1" noResize="1" noEditPoints="1" noAdjustHandles="1" noChangeArrowheads="1" noChangeShapeType="1" noTextEdit="1"/>
-          </p:cNvSpPr>
-          <p:nvPr>
-            <p:extLst>
-              <p:ext uri="{386F3935-93C4-4BCD-93E2-E3B085C9AB24}">
-                <p16:designElem xmlns:p16="http://schemas.microsoft.com/office/powerpoint/2015/main" val="1"/>
-              </p:ext>
-            </p:extLst>
-          </p:nvPr>
-        </p:nvSpPr>
-        <p:spPr bwMode="ltGray">
-          <a:xfrm>
-            <a:off x="321564" y="320040"/>
-            <a:ext cx="11548872" cy="6217920"/>
-          </a:xfrm>
-          <a:prstGeom prst="rect">
-            <a:avLst/>
-          </a:prstGeom>
-          <a:solidFill>
-            <a:schemeClr val="tx1">
-              <a:alpha val="8000"/>
-            </a:schemeClr>
-          </a:solidFill>
-          <a:ln w="127000" cap="sq" cmpd="thinThick">
-            <a:noFill/>
-          </a:ln>
-        </p:spPr>
-        <p:style>
-          <a:lnRef idx="2">
-            <a:schemeClr val="accent1">
-              <a:shade val="50000"/>
-            </a:schemeClr>
-          </a:lnRef>
-          <a:fillRef idx="1">
-            <a:schemeClr val="accent1"/>
-          </a:fillRef>
-          <a:effectRef idx="0">
-            <a:schemeClr val="accent1"/>
-          </a:effectRef>
-          <a:fontRef idx="minor">
-            <a:schemeClr val="lt1"/>
-          </a:fontRef>
-        </p:style>
-        <p:txBody>
-          <a:bodyPr rtlCol="0" anchor="ctr"/>
-          <a:lstStyle/>
-          <a:p>
-            <a:pPr algn="ctr"/>
-            <a:endParaRPr lang="en-US"/>
-          </a:p>
-        </p:txBody>
-      </p:sp>
-      <p:sp>
-        <p:nvSpPr>
-          <p:cNvPr id="2" name="Titel 1">
-            <a:extLst>
-              <a:ext uri="{FF2B5EF4-FFF2-40B4-BE49-F238E27FC236}">
-                <a16:creationId xmlns:a16="http://schemas.microsoft.com/office/drawing/2014/main" id="{F5B0C704-E40E-CA4D-951F-C2C4E1529125}"/>
-              </a:ext>
-            </a:extLst>
-          </p:cNvPr>
-          <p:cNvSpPr>
-            <a:spLocks noGrp="1"/>
-          </p:cNvSpPr>
-          <p:nvPr>
-            <p:ph type="title"/>
-          </p:nvPr>
-        </p:nvSpPr>
-        <p:spPr>
-          <a:xfrm>
-            <a:off x="838200" y="963877"/>
-            <a:ext cx="3494362" cy="4930246"/>
-          </a:xfrm>
-        </p:spPr>
-        <p:txBody>
-          <a:bodyPr>
-            <a:normAutofit/>
-          </a:bodyPr>
-          <a:lstStyle/>
-          <a:p>
-            <a:pPr algn="r"/>
-            <a:r>
               <a:rPr lang="en-US" dirty="0">
                 <a:solidFill>
                   <a:schemeClr val="accent1"/>
                 </a:solidFill>
               </a:rPr>
-              <a:t>Automotive as an OpenMP Application</a:t>
+              <a:t>Automotive as a parallelized Application</a:t>
             </a:r>
             <a:endParaRPr lang="de-DE" dirty="0">
               <a:solidFill>
@@ -10827,7 +12689,7 @@
                   <a:schemeClr val="accent1"/>
                 </a:solidFill>
               </a:rPr>
-              <a:t>Automotive as an OpenMP Application</a:t>
+              <a:t>Automotive as a parallelized Application</a:t>
             </a:r>
           </a:p>
         </p:txBody>

</xml_diff>